<commit_message>
Support display jpg and png image
</commit_message>
<xml_diff>
--- a/files/test.pptx
+++ b/files/test.pptx
@@ -7,6 +7,7 @@
   <p:sldIdLst>
     <p:sldId id="256" r:id="rId2"/>
     <p:sldId id="257" r:id="rId3"/>
+    <p:sldId id="258" r:id="rId4"/>
   </p:sldIdLst>
   <p:sldSz cx="9144000" cy="6858000" type="screen4x3"/>
   <p:notesSz cx="6858000" cy="9144000"/>
@@ -105,6 +106,11 @@
       </a:defRPr>
     </a:lvl9pPr>
   </p:defaultTextStyle>
+  <p:extLst>
+    <p:ext uri="{EFAFB233-063F-42B5-8137-9DF3F51BA10A}">
+      <p15:sldGuideLst xmlns:p15="http://schemas.microsoft.com/office/powerpoint/2012/main"/>
+    </p:ext>
+  </p:extLst>
 </p:presentation>
 </file>
 
@@ -239,7 +245,7 @@
           <a:p>
             <a:fld id="{AFE9894A-2643-443E-82D2-AA330BF13E28}" type="datetimeFigureOut">
               <a:rPr lang="zh-TW" altLang="en-US" smtClean="0"/>
-              <a:t>2015/10/17</a:t>
+              <a:t>2015/10/21</a:t>
             </a:fld>
             <a:endParaRPr lang="zh-TW" altLang="en-US"/>
           </a:p>
@@ -409,7 +415,7 @@
           <a:p>
             <a:fld id="{AFE9894A-2643-443E-82D2-AA330BF13E28}" type="datetimeFigureOut">
               <a:rPr lang="zh-TW" altLang="en-US" smtClean="0"/>
-              <a:t>2015/10/17</a:t>
+              <a:t>2015/10/21</a:t>
             </a:fld>
             <a:endParaRPr lang="zh-TW" altLang="en-US"/>
           </a:p>
@@ -589,7 +595,7 @@
           <a:p>
             <a:fld id="{AFE9894A-2643-443E-82D2-AA330BF13E28}" type="datetimeFigureOut">
               <a:rPr lang="zh-TW" altLang="en-US" smtClean="0"/>
-              <a:t>2015/10/17</a:t>
+              <a:t>2015/10/21</a:t>
             </a:fld>
             <a:endParaRPr lang="zh-TW" altLang="en-US"/>
           </a:p>
@@ -759,7 +765,7 @@
           <a:p>
             <a:fld id="{AFE9894A-2643-443E-82D2-AA330BF13E28}" type="datetimeFigureOut">
               <a:rPr lang="zh-TW" altLang="en-US" smtClean="0"/>
-              <a:t>2015/10/17</a:t>
+              <a:t>2015/10/21</a:t>
             </a:fld>
             <a:endParaRPr lang="zh-TW" altLang="en-US"/>
           </a:p>
@@ -1003,7 +1009,7 @@
           <a:p>
             <a:fld id="{AFE9894A-2643-443E-82D2-AA330BF13E28}" type="datetimeFigureOut">
               <a:rPr lang="zh-TW" altLang="en-US" smtClean="0"/>
-              <a:t>2015/10/17</a:t>
+              <a:t>2015/10/21</a:t>
             </a:fld>
             <a:endParaRPr lang="zh-TW" altLang="en-US"/>
           </a:p>
@@ -1235,7 +1241,7 @@
           <a:p>
             <a:fld id="{AFE9894A-2643-443E-82D2-AA330BF13E28}" type="datetimeFigureOut">
               <a:rPr lang="zh-TW" altLang="en-US" smtClean="0"/>
-              <a:t>2015/10/17</a:t>
+              <a:t>2015/10/21</a:t>
             </a:fld>
             <a:endParaRPr lang="zh-TW" altLang="en-US"/>
           </a:p>
@@ -1602,7 +1608,7 @@
           <a:p>
             <a:fld id="{AFE9894A-2643-443E-82D2-AA330BF13E28}" type="datetimeFigureOut">
               <a:rPr lang="zh-TW" altLang="en-US" smtClean="0"/>
-              <a:t>2015/10/17</a:t>
+              <a:t>2015/10/21</a:t>
             </a:fld>
             <a:endParaRPr lang="zh-TW" altLang="en-US"/>
           </a:p>
@@ -1720,7 +1726,7 @@
           <a:p>
             <a:fld id="{AFE9894A-2643-443E-82D2-AA330BF13E28}" type="datetimeFigureOut">
               <a:rPr lang="zh-TW" altLang="en-US" smtClean="0"/>
-              <a:t>2015/10/17</a:t>
+              <a:t>2015/10/21</a:t>
             </a:fld>
             <a:endParaRPr lang="zh-TW" altLang="en-US"/>
           </a:p>
@@ -1815,7 +1821,7 @@
           <a:p>
             <a:fld id="{AFE9894A-2643-443E-82D2-AA330BF13E28}" type="datetimeFigureOut">
               <a:rPr lang="zh-TW" altLang="en-US" smtClean="0"/>
-              <a:t>2015/10/17</a:t>
+              <a:t>2015/10/21</a:t>
             </a:fld>
             <a:endParaRPr lang="zh-TW" altLang="en-US"/>
           </a:p>
@@ -2092,7 +2098,7 @@
           <a:p>
             <a:fld id="{AFE9894A-2643-443E-82D2-AA330BF13E28}" type="datetimeFigureOut">
               <a:rPr lang="zh-TW" altLang="en-US" smtClean="0"/>
-              <a:t>2015/10/17</a:t>
+              <a:t>2015/10/21</a:t>
             </a:fld>
             <a:endParaRPr lang="zh-TW" altLang="en-US"/>
           </a:p>
@@ -2349,7 +2355,7 @@
           <a:p>
             <a:fld id="{AFE9894A-2643-443E-82D2-AA330BF13E28}" type="datetimeFigureOut">
               <a:rPr lang="zh-TW" altLang="en-US" smtClean="0"/>
-              <a:t>2015/10/17</a:t>
+              <a:t>2015/10/21</a:t>
             </a:fld>
             <a:endParaRPr lang="zh-TW" altLang="en-US"/>
           </a:p>
@@ -2562,7 +2568,7 @@
           <a:p>
             <a:fld id="{AFE9894A-2643-443E-82D2-AA330BF13E28}" type="datetimeFigureOut">
               <a:rPr lang="zh-TW" altLang="en-US" smtClean="0"/>
-              <a:t>2015/10/17</a:t>
+              <a:t>2015/10/21</a:t>
             </a:fld>
             <a:endParaRPr lang="zh-TW" altLang="en-US"/>
           </a:p>
@@ -3114,6 +3120,94 @@
 </p:sld>
 </file>
 
+<file path=ppt/slides/slide3.xml><?xml version="1.0" encoding="utf-8"?>
+<p:sld xmlns:a="http://schemas.openxmlformats.org/drawingml/2006/main" xmlns:r="http://schemas.openxmlformats.org/officeDocument/2006/relationships" xmlns:p="http://schemas.openxmlformats.org/presentationml/2006/main">
+  <p:cSld>
+    <p:spTree>
+      <p:nvGrpSpPr>
+        <p:cNvPr id="1" name=""/>
+        <p:cNvGrpSpPr/>
+        <p:nvPr/>
+      </p:nvGrpSpPr>
+      <p:grpSpPr>
+        <a:xfrm>
+          <a:off x="0" y="0"/>
+          <a:ext cx="0" cy="0"/>
+          <a:chOff x="0" y="0"/>
+          <a:chExt cx="0" cy="0"/>
+        </a:xfrm>
+      </p:grpSpPr>
+      <p:sp>
+        <p:nvSpPr>
+          <p:cNvPr id="2" name="標題 1"/>
+          <p:cNvSpPr>
+            <a:spLocks noGrp="1"/>
+          </p:cNvSpPr>
+          <p:nvPr>
+            <p:ph type="title"/>
+          </p:nvPr>
+        </p:nvSpPr>
+        <p:spPr/>
+        <p:txBody>
+          <a:bodyPr/>
+          <a:lstStyle/>
+          <a:p>
+            <a:r>
+              <a:rPr lang="zh-TW" altLang="en-US" i="1" u="sng" dirty="0" smtClean="0">
+                <a:latin typeface="標楷體" panose="03000509000000000000" pitchFamily="65" charset="-120"/>
+                <a:ea typeface="標楷體" panose="03000509000000000000" pitchFamily="65" charset="-120"/>
+              </a:rPr>
+              <a:t>圖片測試</a:t>
+            </a:r>
+            <a:endParaRPr lang="zh-TW" altLang="en-US" i="1" u="sng" dirty="0">
+              <a:latin typeface="標楷體" panose="03000509000000000000" pitchFamily="65" charset="-120"/>
+              <a:ea typeface="標楷體" panose="03000509000000000000" pitchFamily="65" charset="-120"/>
+            </a:endParaRPr>
+          </a:p>
+        </p:txBody>
+      </p:sp>
+      <p:pic>
+        <p:nvPicPr>
+          <p:cNvPr id="4" name="內容版面配置區 3"/>
+          <p:cNvPicPr>
+            <a:picLocks noGrp="1" noChangeAspect="1"/>
+          </p:cNvPicPr>
+          <p:nvPr>
+            <p:ph idx="1"/>
+          </p:nvPr>
+        </p:nvPicPr>
+        <p:blipFill>
+          <a:blip r:embed="rId2">
+            <a:extLst>
+              <a:ext uri="{28A0092B-C50C-407E-A947-70E740481C1C}">
+                <a14:useLocalDpi xmlns:a14="http://schemas.microsoft.com/office/drawing/2010/main" val="0"/>
+              </a:ext>
+            </a:extLst>
+          </a:blip>
+          <a:stretch>
+            <a:fillRect/>
+          </a:stretch>
+        </p:blipFill>
+        <p:spPr>
+          <a:xfrm>
+            <a:off x="628650" y="1957762"/>
+            <a:ext cx="7886700" cy="4087063"/>
+          </a:xfrm>
+        </p:spPr>
+      </p:pic>
+    </p:spTree>
+    <p:extLst>
+      <p:ext uri="{BB962C8B-B14F-4D97-AF65-F5344CB8AC3E}">
+        <p14:creationId xmlns:p14="http://schemas.microsoft.com/office/powerpoint/2010/main" val="2831287719"/>
+      </p:ext>
+    </p:extLst>
+  </p:cSld>
+  <p:clrMapOvr>
+    <a:masterClrMapping/>
+  </p:clrMapOvr>
+</p:sld>
+</file>
+
 <file path=ppt/theme/theme1.xml><?xml version="1.0" encoding="utf-8"?>
 <a:theme xmlns:a="http://schemas.openxmlformats.org/drawingml/2006/main" name="Office 佈景主題">
   <a:themeElements>

</xml_diff>

<commit_message>
Support alignment and basic border of textbox
</commit_message>
<xml_diff>
--- a/files/test.pptx
+++ b/files/test.pptx
@@ -8,6 +8,7 @@
     <p:sldId id="256" r:id="rId2"/>
     <p:sldId id="257" r:id="rId3"/>
     <p:sldId id="258" r:id="rId4"/>
+    <p:sldId id="259" r:id="rId5"/>
   </p:sldIdLst>
   <p:sldSz cx="9144000" cy="6858000" type="screen4x3"/>
   <p:notesSz cx="6858000" cy="9144000"/>
@@ -245,7 +246,7 @@
           <a:p>
             <a:fld id="{AFE9894A-2643-443E-82D2-AA330BF13E28}" type="datetimeFigureOut">
               <a:rPr lang="zh-TW" altLang="en-US" smtClean="0"/>
-              <a:t>2015/10/21</a:t>
+              <a:t>2015/10/22</a:t>
             </a:fld>
             <a:endParaRPr lang="zh-TW" altLang="en-US"/>
           </a:p>
@@ -415,7 +416,7 @@
           <a:p>
             <a:fld id="{AFE9894A-2643-443E-82D2-AA330BF13E28}" type="datetimeFigureOut">
               <a:rPr lang="zh-TW" altLang="en-US" smtClean="0"/>
-              <a:t>2015/10/21</a:t>
+              <a:t>2015/10/22</a:t>
             </a:fld>
             <a:endParaRPr lang="zh-TW" altLang="en-US"/>
           </a:p>
@@ -595,7 +596,7 @@
           <a:p>
             <a:fld id="{AFE9894A-2643-443E-82D2-AA330BF13E28}" type="datetimeFigureOut">
               <a:rPr lang="zh-TW" altLang="en-US" smtClean="0"/>
-              <a:t>2015/10/21</a:t>
+              <a:t>2015/10/22</a:t>
             </a:fld>
             <a:endParaRPr lang="zh-TW" altLang="en-US"/>
           </a:p>
@@ -765,7 +766,7 @@
           <a:p>
             <a:fld id="{AFE9894A-2643-443E-82D2-AA330BF13E28}" type="datetimeFigureOut">
               <a:rPr lang="zh-TW" altLang="en-US" smtClean="0"/>
-              <a:t>2015/10/21</a:t>
+              <a:t>2015/10/22</a:t>
             </a:fld>
             <a:endParaRPr lang="zh-TW" altLang="en-US"/>
           </a:p>
@@ -1009,7 +1010,7 @@
           <a:p>
             <a:fld id="{AFE9894A-2643-443E-82D2-AA330BF13E28}" type="datetimeFigureOut">
               <a:rPr lang="zh-TW" altLang="en-US" smtClean="0"/>
-              <a:t>2015/10/21</a:t>
+              <a:t>2015/10/22</a:t>
             </a:fld>
             <a:endParaRPr lang="zh-TW" altLang="en-US"/>
           </a:p>
@@ -1241,7 +1242,7 @@
           <a:p>
             <a:fld id="{AFE9894A-2643-443E-82D2-AA330BF13E28}" type="datetimeFigureOut">
               <a:rPr lang="zh-TW" altLang="en-US" smtClean="0"/>
-              <a:t>2015/10/21</a:t>
+              <a:t>2015/10/22</a:t>
             </a:fld>
             <a:endParaRPr lang="zh-TW" altLang="en-US"/>
           </a:p>
@@ -1608,7 +1609,7 @@
           <a:p>
             <a:fld id="{AFE9894A-2643-443E-82D2-AA330BF13E28}" type="datetimeFigureOut">
               <a:rPr lang="zh-TW" altLang="en-US" smtClean="0"/>
-              <a:t>2015/10/21</a:t>
+              <a:t>2015/10/22</a:t>
             </a:fld>
             <a:endParaRPr lang="zh-TW" altLang="en-US"/>
           </a:p>
@@ -1726,7 +1727,7 @@
           <a:p>
             <a:fld id="{AFE9894A-2643-443E-82D2-AA330BF13E28}" type="datetimeFigureOut">
               <a:rPr lang="zh-TW" altLang="en-US" smtClean="0"/>
-              <a:t>2015/10/21</a:t>
+              <a:t>2015/10/22</a:t>
             </a:fld>
             <a:endParaRPr lang="zh-TW" altLang="en-US"/>
           </a:p>
@@ -1821,7 +1822,7 @@
           <a:p>
             <a:fld id="{AFE9894A-2643-443E-82D2-AA330BF13E28}" type="datetimeFigureOut">
               <a:rPr lang="zh-TW" altLang="en-US" smtClean="0"/>
-              <a:t>2015/10/21</a:t>
+              <a:t>2015/10/22</a:t>
             </a:fld>
             <a:endParaRPr lang="zh-TW" altLang="en-US"/>
           </a:p>
@@ -2098,7 +2099,7 @@
           <a:p>
             <a:fld id="{AFE9894A-2643-443E-82D2-AA330BF13E28}" type="datetimeFigureOut">
               <a:rPr lang="zh-TW" altLang="en-US" smtClean="0"/>
-              <a:t>2015/10/21</a:t>
+              <a:t>2015/10/22</a:t>
             </a:fld>
             <a:endParaRPr lang="zh-TW" altLang="en-US"/>
           </a:p>
@@ -2355,7 +2356,7 @@
           <a:p>
             <a:fld id="{AFE9894A-2643-443E-82D2-AA330BF13E28}" type="datetimeFigureOut">
               <a:rPr lang="zh-TW" altLang="en-US" smtClean="0"/>
-              <a:t>2015/10/21</a:t>
+              <a:t>2015/10/22</a:t>
             </a:fld>
             <a:endParaRPr lang="zh-TW" altLang="en-US"/>
           </a:p>
@@ -2568,7 +2569,7 @@
           <a:p>
             <a:fld id="{AFE9894A-2643-443E-82D2-AA330BF13E28}" type="datetimeFigureOut">
               <a:rPr lang="zh-TW" altLang="en-US" smtClean="0"/>
-              <a:t>2015/10/21</a:t>
+              <a:t>2015/10/22</a:t>
             </a:fld>
             <a:endParaRPr lang="zh-TW" altLang="en-US"/>
           </a:p>
@@ -3152,6 +3153,7 @@
           <a:bodyPr/>
           <a:lstStyle/>
           <a:p>
+            <a:pPr algn="ctr"/>
             <a:r>
               <a:rPr lang="zh-TW" altLang="en-US" i="1" u="sng" dirty="0" smtClean="0">
                 <a:latin typeface="標楷體" panose="03000509000000000000" pitchFamily="65" charset="-120"/>
@@ -3199,6 +3201,439 @@
     <p:extLst>
       <p:ext uri="{BB962C8B-B14F-4D97-AF65-F5344CB8AC3E}">
         <p14:creationId xmlns:p14="http://schemas.microsoft.com/office/powerpoint/2010/main" val="2831287719"/>
+      </p:ext>
+    </p:extLst>
+  </p:cSld>
+  <p:clrMapOvr>
+    <a:masterClrMapping/>
+  </p:clrMapOvr>
+</p:sld>
+</file>
+
+<file path=ppt/slides/slide4.xml><?xml version="1.0" encoding="utf-8"?>
+<p:sld xmlns:a="http://schemas.openxmlformats.org/drawingml/2006/main" xmlns:r="http://schemas.openxmlformats.org/officeDocument/2006/relationships" xmlns:p="http://schemas.openxmlformats.org/presentationml/2006/main">
+  <p:cSld>
+    <p:spTree>
+      <p:nvGrpSpPr>
+        <p:cNvPr id="1" name=""/>
+        <p:cNvGrpSpPr/>
+        <p:nvPr/>
+      </p:nvGrpSpPr>
+      <p:grpSpPr>
+        <a:xfrm>
+          <a:off x="0" y="0"/>
+          <a:ext cx="0" cy="0"/>
+          <a:chOff x="0" y="0"/>
+          <a:chExt cx="0" cy="0"/>
+        </a:xfrm>
+      </p:grpSpPr>
+      <p:sp>
+        <p:nvSpPr>
+          <p:cNvPr id="4" name="文字方塊 3"/>
+          <p:cNvSpPr txBox="1"/>
+          <p:nvPr/>
+        </p:nvSpPr>
+        <p:spPr>
+          <a:xfrm>
+            <a:off x="848299" y="870333"/>
+            <a:ext cx="2115239" cy="1046602"/>
+          </a:xfrm>
+          <a:prstGeom prst="rect">
+            <a:avLst/>
+          </a:prstGeom>
+          <a:solidFill>
+            <a:schemeClr val="accent4">
+              <a:lumMod val="20000"/>
+              <a:lumOff val="80000"/>
+            </a:schemeClr>
+          </a:solidFill>
+          <a:ln>
+            <a:noFill/>
+          </a:ln>
+        </p:spPr>
+        <p:txBody>
+          <a:bodyPr wrap="square" rtlCol="0">
+            <a:noAutofit/>
+          </a:bodyPr>
+          <a:lstStyle/>
+          <a:p>
+            <a:r>
+              <a:rPr lang="zh-TW" altLang="en-US" dirty="0" smtClean="0"/>
+              <a:t>上 左</a:t>
+            </a:r>
+            <a:endParaRPr lang="zh-TW" altLang="en-US" dirty="0"/>
+          </a:p>
+        </p:txBody>
+      </p:sp>
+      <p:sp>
+        <p:nvSpPr>
+          <p:cNvPr id="5" name="文字方塊 4"/>
+          <p:cNvSpPr txBox="1"/>
+          <p:nvPr/>
+        </p:nvSpPr>
+        <p:spPr>
+          <a:xfrm>
+            <a:off x="3514381" y="870333"/>
+            <a:ext cx="2115239" cy="1046602"/>
+          </a:xfrm>
+          <a:prstGeom prst="rect">
+            <a:avLst/>
+          </a:prstGeom>
+          <a:solidFill>
+            <a:schemeClr val="accent5">
+              <a:lumMod val="20000"/>
+              <a:lumOff val="80000"/>
+            </a:schemeClr>
+          </a:solidFill>
+          <a:ln>
+            <a:solidFill>
+              <a:schemeClr val="tx1"/>
+            </a:solidFill>
+            <a:prstDash val="sysDot"/>
+          </a:ln>
+        </p:spPr>
+        <p:txBody>
+          <a:bodyPr wrap="square" rtlCol="0">
+            <a:noAutofit/>
+          </a:bodyPr>
+          <a:lstStyle/>
+          <a:p>
+            <a:pPr algn="ctr"/>
+            <a:r>
+              <a:rPr lang="zh-TW" altLang="en-US" dirty="0" smtClean="0"/>
+              <a:t>上 中</a:t>
+            </a:r>
+            <a:endParaRPr lang="zh-TW" altLang="en-US" dirty="0"/>
+          </a:p>
+        </p:txBody>
+      </p:sp>
+      <p:sp>
+        <p:nvSpPr>
+          <p:cNvPr id="6" name="文字方塊 5"/>
+          <p:cNvSpPr txBox="1"/>
+          <p:nvPr/>
+        </p:nvSpPr>
+        <p:spPr>
+          <a:xfrm>
+            <a:off x="6180463" y="870333"/>
+            <a:ext cx="2115239" cy="1046602"/>
+          </a:xfrm>
+          <a:prstGeom prst="rect">
+            <a:avLst/>
+          </a:prstGeom>
+          <a:solidFill>
+            <a:schemeClr val="accent6">
+              <a:lumMod val="60000"/>
+              <a:lumOff val="40000"/>
+            </a:schemeClr>
+          </a:solidFill>
+          <a:ln>
+            <a:solidFill>
+              <a:schemeClr val="tx1"/>
+            </a:solidFill>
+            <a:prstDash val="sysDash"/>
+          </a:ln>
+        </p:spPr>
+        <p:txBody>
+          <a:bodyPr wrap="square" rtlCol="0">
+            <a:noAutofit/>
+          </a:bodyPr>
+          <a:lstStyle/>
+          <a:p>
+            <a:pPr algn="r"/>
+            <a:r>
+              <a:rPr lang="zh-TW" altLang="en-US" dirty="0" smtClean="0"/>
+              <a:t>上 右</a:t>
+            </a:r>
+            <a:endParaRPr lang="zh-TW" altLang="en-US" dirty="0"/>
+          </a:p>
+        </p:txBody>
+      </p:sp>
+      <p:sp>
+        <p:nvSpPr>
+          <p:cNvPr id="7" name="文字方塊 6"/>
+          <p:cNvSpPr txBox="1"/>
+          <p:nvPr/>
+        </p:nvSpPr>
+        <p:spPr>
+          <a:xfrm>
+            <a:off x="848298" y="2565095"/>
+            <a:ext cx="2115239" cy="1046602"/>
+          </a:xfrm>
+          <a:prstGeom prst="rect">
+            <a:avLst/>
+          </a:prstGeom>
+          <a:solidFill>
+            <a:srgbClr val="0066FF"/>
+          </a:solidFill>
+          <a:ln>
+            <a:solidFill>
+              <a:schemeClr val="tx1"/>
+            </a:solidFill>
+            <a:prstDash val="dash"/>
+          </a:ln>
+        </p:spPr>
+        <p:txBody>
+          <a:bodyPr wrap="square" rtlCol="0" anchor="ctr">
+            <a:noAutofit/>
+          </a:bodyPr>
+          <a:lstStyle/>
+          <a:p>
+            <a:r>
+              <a:rPr lang="zh-TW" altLang="en-US" dirty="0" smtClean="0"/>
+              <a:t>中 左</a:t>
+            </a:r>
+            <a:endParaRPr lang="zh-TW" altLang="en-US" dirty="0"/>
+          </a:p>
+        </p:txBody>
+      </p:sp>
+      <p:sp>
+        <p:nvSpPr>
+          <p:cNvPr id="8" name="文字方塊 7"/>
+          <p:cNvSpPr txBox="1"/>
+          <p:nvPr/>
+        </p:nvSpPr>
+        <p:spPr>
+          <a:xfrm>
+            <a:off x="3514381" y="2565095"/>
+            <a:ext cx="2115239" cy="1046602"/>
+          </a:xfrm>
+          <a:prstGeom prst="rect">
+            <a:avLst/>
+          </a:prstGeom>
+          <a:solidFill>
+            <a:srgbClr val="546374"/>
+          </a:solidFill>
+          <a:ln>
+            <a:solidFill>
+              <a:schemeClr val="tx1"/>
+            </a:solidFill>
+            <a:prstDash val="dashDot"/>
+          </a:ln>
+        </p:spPr>
+        <p:txBody>
+          <a:bodyPr wrap="square" rtlCol="0" anchor="ctr">
+            <a:noAutofit/>
+          </a:bodyPr>
+          <a:lstStyle/>
+          <a:p>
+            <a:pPr algn="ctr"/>
+            <a:r>
+              <a:rPr lang="zh-TW" altLang="en-US" dirty="0" smtClean="0">
+                <a:solidFill>
+                  <a:schemeClr val="bg1"/>
+                </a:solidFill>
+              </a:rPr>
+              <a:t>中 中</a:t>
+            </a:r>
+            <a:endParaRPr lang="zh-TW" altLang="en-US" dirty="0">
+              <a:solidFill>
+                <a:schemeClr val="bg1"/>
+              </a:solidFill>
+            </a:endParaRPr>
+          </a:p>
+        </p:txBody>
+      </p:sp>
+      <p:sp>
+        <p:nvSpPr>
+          <p:cNvPr id="9" name="文字方塊 8"/>
+          <p:cNvSpPr txBox="1"/>
+          <p:nvPr/>
+        </p:nvSpPr>
+        <p:spPr>
+          <a:xfrm>
+            <a:off x="6180463" y="2565095"/>
+            <a:ext cx="2115239" cy="1046602"/>
+          </a:xfrm>
+          <a:prstGeom prst="rect">
+            <a:avLst/>
+          </a:prstGeom>
+          <a:solidFill>
+            <a:schemeClr val="accent4">
+              <a:lumMod val="20000"/>
+              <a:lumOff val="80000"/>
+            </a:schemeClr>
+          </a:solidFill>
+          <a:ln>
+            <a:solidFill>
+              <a:schemeClr val="tx1"/>
+            </a:solidFill>
+            <a:prstDash val="lgDash"/>
+          </a:ln>
+        </p:spPr>
+        <p:txBody>
+          <a:bodyPr wrap="square" rtlCol="0" anchor="ctr">
+            <a:noAutofit/>
+          </a:bodyPr>
+          <a:lstStyle/>
+          <a:p>
+            <a:pPr algn="r"/>
+            <a:r>
+              <a:rPr lang="zh-TW" altLang="en-US" u="sng" dirty="0" smtClean="0"/>
+              <a:t>中 右</a:t>
+            </a:r>
+            <a:endParaRPr lang="zh-TW" altLang="en-US" u="sng" dirty="0"/>
+          </a:p>
+        </p:txBody>
+      </p:sp>
+      <p:sp>
+        <p:nvSpPr>
+          <p:cNvPr id="10" name="文字方塊 9"/>
+          <p:cNvSpPr txBox="1"/>
+          <p:nvPr/>
+        </p:nvSpPr>
+        <p:spPr>
+          <a:xfrm>
+            <a:off x="848297" y="4259857"/>
+            <a:ext cx="2115239" cy="1046602"/>
+          </a:xfrm>
+          <a:prstGeom prst="rect">
+            <a:avLst/>
+          </a:prstGeom>
+          <a:solidFill>
+            <a:schemeClr val="accent4">
+              <a:lumMod val="20000"/>
+              <a:lumOff val="80000"/>
+            </a:schemeClr>
+          </a:solidFill>
+          <a:ln w="12700">
+            <a:solidFill>
+              <a:schemeClr val="tx1"/>
+            </a:solidFill>
+            <a:prstDash val="lgDashDot"/>
+          </a:ln>
+        </p:spPr>
+        <p:txBody>
+          <a:bodyPr wrap="square" rtlCol="0" anchor="b">
+            <a:noAutofit/>
+          </a:bodyPr>
+          <a:lstStyle/>
+          <a:p>
+            <a:r>
+              <a:rPr lang="zh-TW" altLang="en-US" i="1" dirty="0" smtClean="0"/>
+              <a:t>下 左</a:t>
+            </a:r>
+            <a:endParaRPr lang="zh-TW" altLang="en-US" i="1" dirty="0"/>
+          </a:p>
+        </p:txBody>
+      </p:sp>
+      <p:sp>
+        <p:nvSpPr>
+          <p:cNvPr id="11" name="文字方塊 10"/>
+          <p:cNvSpPr txBox="1"/>
+          <p:nvPr/>
+        </p:nvSpPr>
+        <p:spPr>
+          <a:xfrm>
+            <a:off x="3514381" y="4259857"/>
+            <a:ext cx="2115239" cy="1046602"/>
+          </a:xfrm>
+          <a:prstGeom prst="rect">
+            <a:avLst/>
+          </a:prstGeom>
+          <a:solidFill>
+            <a:schemeClr val="accent4">
+              <a:lumMod val="20000"/>
+              <a:lumOff val="80000"/>
+            </a:schemeClr>
+          </a:solidFill>
+          <a:ln w="38100">
+            <a:solidFill>
+              <a:schemeClr val="tx1"/>
+            </a:solidFill>
+            <a:prstDash val="lgDashDotDot"/>
+          </a:ln>
+        </p:spPr>
+        <p:txBody>
+          <a:bodyPr wrap="square" rtlCol="0" anchor="b">
+            <a:noAutofit/>
+          </a:bodyPr>
+          <a:lstStyle/>
+          <a:p>
+            <a:pPr algn="ctr"/>
+            <a:r>
+              <a:rPr lang="zh-TW" altLang="en-US" b="1" dirty="0" smtClean="0"/>
+              <a:t>下 中</a:t>
+            </a:r>
+            <a:endParaRPr lang="zh-TW" altLang="en-US" b="1" dirty="0"/>
+          </a:p>
+        </p:txBody>
+      </p:sp>
+      <p:sp>
+        <p:nvSpPr>
+          <p:cNvPr id="12" name="文字方塊 11"/>
+          <p:cNvSpPr txBox="1"/>
+          <p:nvPr/>
+        </p:nvSpPr>
+        <p:spPr>
+          <a:xfrm>
+            <a:off x="6180462" y="4259857"/>
+            <a:ext cx="2115239" cy="1046602"/>
+          </a:xfrm>
+          <a:prstGeom prst="rect">
+            <a:avLst/>
+          </a:prstGeom>
+          <a:gradFill flip="none" rotWithShape="1">
+            <a:gsLst>
+              <a:gs pos="0">
+                <a:schemeClr val="accent4">
+                  <a:lumMod val="20000"/>
+                  <a:lumOff val="80000"/>
+                  <a:shade val="30000"/>
+                  <a:satMod val="115000"/>
+                </a:schemeClr>
+              </a:gs>
+              <a:gs pos="50000">
+                <a:schemeClr val="accent4">
+                  <a:lumMod val="20000"/>
+                  <a:lumOff val="80000"/>
+                  <a:shade val="67500"/>
+                  <a:satMod val="115000"/>
+                </a:schemeClr>
+              </a:gs>
+              <a:gs pos="100000">
+                <a:schemeClr val="accent4">
+                  <a:lumMod val="20000"/>
+                  <a:lumOff val="80000"/>
+                  <a:shade val="100000"/>
+                  <a:satMod val="115000"/>
+                </a:schemeClr>
+              </a:gs>
+            </a:gsLst>
+            <a:path path="circle">
+              <a:fillToRect l="50000" t="50000" r="50000" b="50000"/>
+            </a:path>
+            <a:tileRect/>
+          </a:gradFill>
+          <a:ln w="57150">
+            <a:solidFill>
+              <a:schemeClr val="tx1"/>
+            </a:solidFill>
+            <a:prstDash val="dash"/>
+          </a:ln>
+        </p:spPr>
+        <p:txBody>
+          <a:bodyPr wrap="square" rtlCol="0" anchor="b">
+            <a:noAutofit/>
+          </a:bodyPr>
+          <a:lstStyle/>
+          <a:p>
+            <a:pPr algn="r"/>
+            <a:r>
+              <a:rPr lang="zh-TW" altLang="en-US" dirty="0" smtClean="0"/>
+              <a:t>下 </a:t>
+            </a:r>
+            <a:r>
+              <a:rPr lang="zh-TW" altLang="en-US" dirty="0"/>
+              <a:t>右</a:t>
+            </a:r>
+          </a:p>
+        </p:txBody>
+      </p:sp>
+    </p:spTree>
+    <p:extLst>
+      <p:ext uri="{BB962C8B-B14F-4D97-AF65-F5344CB8AC3E}">
+        <p14:creationId xmlns:p14="http://schemas.microsoft.com/office/powerpoint/2010/main" val="3615924654"/>
       </p:ext>
     </p:extLst>
   </p:cSld>

</xml_diff>

<commit_message>
Support basic group object
</commit_message>
<xml_diff>
--- a/files/test.pptx
+++ b/files/test.pptx
@@ -9,6 +9,7 @@
     <p:sldId id="257" r:id="rId3"/>
     <p:sldId id="258" r:id="rId4"/>
     <p:sldId id="259" r:id="rId5"/>
+    <p:sldId id="260" r:id="rId6"/>
   </p:sldIdLst>
   <p:sldSz cx="9144000" cy="6858000" type="screen4x3"/>
   <p:notesSz cx="6858000" cy="9144000"/>
@@ -3643,6 +3644,365 @@
 </p:sld>
 </file>
 
+<file path=ppt/slides/slide5.xml><?xml version="1.0" encoding="utf-8"?>
+<p:sld xmlns:a="http://schemas.openxmlformats.org/drawingml/2006/main" xmlns:r="http://schemas.openxmlformats.org/officeDocument/2006/relationships" xmlns:p="http://schemas.openxmlformats.org/presentationml/2006/main">
+  <p:cSld>
+    <p:spTree>
+      <p:nvGrpSpPr>
+        <p:cNvPr id="1" name=""/>
+        <p:cNvGrpSpPr/>
+        <p:nvPr/>
+      </p:nvGrpSpPr>
+      <p:grpSpPr>
+        <a:xfrm>
+          <a:off x="0" y="0"/>
+          <a:ext cx="0" cy="0"/>
+          <a:chOff x="0" y="0"/>
+          <a:chExt cx="0" cy="0"/>
+        </a:xfrm>
+      </p:grpSpPr>
+      <p:sp>
+        <p:nvSpPr>
+          <p:cNvPr id="2" name="標題 1"/>
+          <p:cNvSpPr>
+            <a:spLocks noGrp="1"/>
+          </p:cNvSpPr>
+          <p:nvPr>
+            <p:ph type="title"/>
+          </p:nvPr>
+        </p:nvSpPr>
+        <p:spPr/>
+        <p:txBody>
+          <a:bodyPr/>
+          <a:lstStyle/>
+          <a:p>
+            <a:r>
+              <a:rPr lang="zh-TW" altLang="en-US" dirty="0" smtClean="0"/>
+              <a:t>群組測試</a:t>
+            </a:r>
+            <a:endParaRPr lang="zh-TW" altLang="en-US" dirty="0"/>
+          </a:p>
+        </p:txBody>
+      </p:sp>
+      <p:grpSp>
+        <p:nvGrpSpPr>
+          <p:cNvPr id="7" name="群組 6"/>
+          <p:cNvGrpSpPr/>
+          <p:nvPr/>
+        </p:nvGrpSpPr>
+        <p:grpSpPr>
+          <a:xfrm>
+            <a:off x="848299" y="2147591"/>
+            <a:ext cx="7447403" cy="1046602"/>
+            <a:chOff x="920870" y="2147591"/>
+            <a:chExt cx="7447403" cy="1046602"/>
+          </a:xfrm>
+        </p:grpSpPr>
+        <p:sp>
+          <p:nvSpPr>
+            <p:cNvPr id="4" name="文字方塊 3"/>
+            <p:cNvSpPr txBox="1"/>
+            <p:nvPr/>
+          </p:nvSpPr>
+          <p:spPr>
+            <a:xfrm>
+              <a:off x="920870" y="2147591"/>
+              <a:ext cx="2115239" cy="1046602"/>
+            </a:xfrm>
+            <a:prstGeom prst="rect">
+              <a:avLst/>
+            </a:prstGeom>
+            <a:solidFill>
+              <a:schemeClr val="accent4">
+                <a:lumMod val="20000"/>
+                <a:lumOff val="80000"/>
+              </a:schemeClr>
+            </a:solidFill>
+            <a:ln>
+              <a:noFill/>
+            </a:ln>
+          </p:spPr>
+          <p:txBody>
+            <a:bodyPr wrap="square" rtlCol="0">
+              <a:noAutofit/>
+            </a:bodyPr>
+            <a:lstStyle/>
+            <a:p>
+              <a:r>
+                <a:rPr lang="zh-TW" altLang="en-US" dirty="0" smtClean="0"/>
+                <a:t>上 左</a:t>
+              </a:r>
+              <a:endParaRPr lang="zh-TW" altLang="en-US" dirty="0"/>
+            </a:p>
+          </p:txBody>
+        </p:sp>
+        <p:sp>
+          <p:nvSpPr>
+            <p:cNvPr id="5" name="文字方塊 4"/>
+            <p:cNvSpPr txBox="1"/>
+            <p:nvPr/>
+          </p:nvSpPr>
+          <p:spPr>
+            <a:xfrm>
+              <a:off x="3586952" y="2147591"/>
+              <a:ext cx="2115239" cy="1046602"/>
+            </a:xfrm>
+            <a:prstGeom prst="rect">
+              <a:avLst/>
+            </a:prstGeom>
+            <a:solidFill>
+              <a:schemeClr val="accent5">
+                <a:lumMod val="20000"/>
+                <a:lumOff val="80000"/>
+              </a:schemeClr>
+            </a:solidFill>
+            <a:ln>
+              <a:solidFill>
+                <a:schemeClr val="tx1"/>
+              </a:solidFill>
+              <a:prstDash val="sysDot"/>
+            </a:ln>
+          </p:spPr>
+          <p:txBody>
+            <a:bodyPr wrap="square" rtlCol="0">
+              <a:noAutofit/>
+            </a:bodyPr>
+            <a:lstStyle/>
+            <a:p>
+              <a:pPr algn="ctr"/>
+              <a:r>
+                <a:rPr lang="zh-TW" altLang="en-US" dirty="0" smtClean="0"/>
+                <a:t>上 中</a:t>
+              </a:r>
+              <a:endParaRPr lang="zh-TW" altLang="en-US" dirty="0"/>
+            </a:p>
+          </p:txBody>
+        </p:sp>
+        <p:sp>
+          <p:nvSpPr>
+            <p:cNvPr id="6" name="文字方塊 5"/>
+            <p:cNvSpPr txBox="1"/>
+            <p:nvPr/>
+          </p:nvSpPr>
+          <p:spPr>
+            <a:xfrm>
+              <a:off x="6253034" y="2147591"/>
+              <a:ext cx="2115239" cy="1046602"/>
+            </a:xfrm>
+            <a:prstGeom prst="rect">
+              <a:avLst/>
+            </a:prstGeom>
+            <a:solidFill>
+              <a:schemeClr val="accent6">
+                <a:lumMod val="60000"/>
+                <a:lumOff val="40000"/>
+              </a:schemeClr>
+            </a:solidFill>
+            <a:ln>
+              <a:solidFill>
+                <a:schemeClr val="tx1"/>
+              </a:solidFill>
+              <a:prstDash val="sysDash"/>
+            </a:ln>
+          </p:spPr>
+          <p:txBody>
+            <a:bodyPr wrap="square" rtlCol="0">
+              <a:noAutofit/>
+            </a:bodyPr>
+            <a:lstStyle/>
+            <a:p>
+              <a:pPr algn="r"/>
+              <a:r>
+                <a:rPr lang="zh-TW" altLang="en-US" dirty="0" smtClean="0"/>
+                <a:t>上 右</a:t>
+              </a:r>
+              <a:endParaRPr lang="zh-TW" altLang="en-US" dirty="0"/>
+            </a:p>
+          </p:txBody>
+        </p:sp>
+      </p:grpSp>
+      <p:grpSp>
+        <p:nvGrpSpPr>
+          <p:cNvPr id="11" name="群組 10"/>
+          <p:cNvGrpSpPr/>
+          <p:nvPr/>
+        </p:nvGrpSpPr>
+        <p:grpSpPr>
+          <a:xfrm>
+            <a:off x="0" y="5760000"/>
+            <a:ext cx="7447404" cy="1046602"/>
+            <a:chOff x="848297" y="4259857"/>
+            <a:chExt cx="7447404" cy="1046602"/>
+          </a:xfrm>
+        </p:grpSpPr>
+        <p:sp>
+          <p:nvSpPr>
+            <p:cNvPr id="8" name="文字方塊 7"/>
+            <p:cNvSpPr txBox="1"/>
+            <p:nvPr/>
+          </p:nvSpPr>
+          <p:spPr>
+            <a:xfrm>
+              <a:off x="848297" y="4259857"/>
+              <a:ext cx="2115239" cy="1046602"/>
+            </a:xfrm>
+            <a:prstGeom prst="rect">
+              <a:avLst/>
+            </a:prstGeom>
+            <a:solidFill>
+              <a:schemeClr val="accent4">
+                <a:lumMod val="20000"/>
+                <a:lumOff val="80000"/>
+              </a:schemeClr>
+            </a:solidFill>
+            <a:ln w="12700">
+              <a:solidFill>
+                <a:schemeClr val="tx1"/>
+              </a:solidFill>
+              <a:prstDash val="lgDashDot"/>
+            </a:ln>
+          </p:spPr>
+          <p:txBody>
+            <a:bodyPr wrap="square" rtlCol="0" anchor="b">
+              <a:noAutofit/>
+            </a:bodyPr>
+            <a:lstStyle/>
+            <a:p>
+              <a:r>
+                <a:rPr lang="zh-TW" altLang="en-US" i="1" dirty="0" smtClean="0"/>
+                <a:t>下 左</a:t>
+              </a:r>
+              <a:endParaRPr lang="zh-TW" altLang="en-US" i="1" dirty="0"/>
+            </a:p>
+          </p:txBody>
+        </p:sp>
+        <p:sp>
+          <p:nvSpPr>
+            <p:cNvPr id="9" name="文字方塊 8"/>
+            <p:cNvSpPr txBox="1"/>
+            <p:nvPr/>
+          </p:nvSpPr>
+          <p:spPr>
+            <a:xfrm>
+              <a:off x="3514381" y="4259857"/>
+              <a:ext cx="2115239" cy="1046602"/>
+            </a:xfrm>
+            <a:prstGeom prst="rect">
+              <a:avLst/>
+            </a:prstGeom>
+            <a:solidFill>
+              <a:schemeClr val="accent4">
+                <a:lumMod val="20000"/>
+                <a:lumOff val="80000"/>
+              </a:schemeClr>
+            </a:solidFill>
+            <a:ln w="38100">
+              <a:solidFill>
+                <a:schemeClr val="tx1"/>
+              </a:solidFill>
+              <a:prstDash val="lgDashDotDot"/>
+            </a:ln>
+          </p:spPr>
+          <p:txBody>
+            <a:bodyPr wrap="square" rtlCol="0" anchor="b">
+              <a:noAutofit/>
+            </a:bodyPr>
+            <a:lstStyle/>
+            <a:p>
+              <a:pPr algn="ctr"/>
+              <a:r>
+                <a:rPr lang="zh-TW" altLang="en-US" b="1" dirty="0" smtClean="0"/>
+                <a:t>下 中</a:t>
+              </a:r>
+              <a:endParaRPr lang="zh-TW" altLang="en-US" b="1" dirty="0"/>
+            </a:p>
+          </p:txBody>
+        </p:sp>
+        <p:sp>
+          <p:nvSpPr>
+            <p:cNvPr id="10" name="文字方塊 9"/>
+            <p:cNvSpPr txBox="1"/>
+            <p:nvPr/>
+          </p:nvSpPr>
+          <p:spPr>
+            <a:xfrm>
+              <a:off x="6180462" y="4259857"/>
+              <a:ext cx="2115239" cy="1046602"/>
+            </a:xfrm>
+            <a:prstGeom prst="rect">
+              <a:avLst/>
+            </a:prstGeom>
+            <a:gradFill flip="none" rotWithShape="1">
+              <a:gsLst>
+                <a:gs pos="0">
+                  <a:schemeClr val="accent4">
+                    <a:lumMod val="20000"/>
+                    <a:lumOff val="80000"/>
+                    <a:shade val="30000"/>
+                    <a:satMod val="115000"/>
+                  </a:schemeClr>
+                </a:gs>
+                <a:gs pos="50000">
+                  <a:schemeClr val="accent4">
+                    <a:lumMod val="20000"/>
+                    <a:lumOff val="80000"/>
+                    <a:shade val="67500"/>
+                    <a:satMod val="115000"/>
+                  </a:schemeClr>
+                </a:gs>
+                <a:gs pos="100000">
+                  <a:schemeClr val="accent4">
+                    <a:lumMod val="20000"/>
+                    <a:lumOff val="80000"/>
+                    <a:shade val="100000"/>
+                    <a:satMod val="115000"/>
+                  </a:schemeClr>
+                </a:gs>
+              </a:gsLst>
+              <a:path path="circle">
+                <a:fillToRect l="50000" t="50000" r="50000" b="50000"/>
+              </a:path>
+              <a:tileRect/>
+            </a:gradFill>
+            <a:ln w="57150">
+              <a:solidFill>
+                <a:schemeClr val="tx1"/>
+              </a:solidFill>
+              <a:prstDash val="dash"/>
+            </a:ln>
+          </p:spPr>
+          <p:txBody>
+            <a:bodyPr wrap="square" rtlCol="0" anchor="b">
+              <a:noAutofit/>
+            </a:bodyPr>
+            <a:lstStyle/>
+            <a:p>
+              <a:pPr algn="r"/>
+              <a:r>
+                <a:rPr lang="zh-TW" altLang="en-US" dirty="0" smtClean="0"/>
+                <a:t>下 </a:t>
+              </a:r>
+              <a:r>
+                <a:rPr lang="zh-TW" altLang="en-US" dirty="0"/>
+                <a:t>右</a:t>
+              </a:r>
+            </a:p>
+          </p:txBody>
+        </p:sp>
+      </p:grpSp>
+    </p:spTree>
+    <p:extLst>
+      <p:ext uri="{BB962C8B-B14F-4D97-AF65-F5344CB8AC3E}">
+        <p14:creationId xmlns:p14="http://schemas.microsoft.com/office/powerpoint/2010/main" val="2148235969"/>
+      </p:ext>
+    </p:extLst>
+  </p:cSld>
+  <p:clrMapOvr>
+    <a:masterClrMapping/>
+  </p:clrMapOvr>
+</p:sld>
+</file>
+
 <file path=ppt/theme/theme1.xml><?xml version="1.0" encoding="utf-8"?>
 <a:theme xmlns:a="http://schemas.openxmlformats.org/drawingml/2006/main" name="Office 佈景主題">
   <a:themeElements>

</xml_diff>

<commit_message>
Fix fill and border styles
</commit_message>
<xml_diff>
--- a/files/test.pptx
+++ b/files/test.pptx
@@ -5,7 +5,7 @@
     <p:sldMasterId id="2147483660" r:id="rId1"/>
   </p:sldMasterIdLst>
   <p:notesMasterIdLst>
-    <p:notesMasterId r:id="rId9"/>
+    <p:notesMasterId r:id="rId10"/>
   </p:notesMasterIdLst>
   <p:sldIdLst>
     <p:sldId id="256" r:id="rId2"/>
@@ -15,6 +15,7 @@
     <p:sldId id="260" r:id="rId6"/>
     <p:sldId id="261" r:id="rId7"/>
     <p:sldId id="262" r:id="rId8"/>
+    <p:sldId id="263" r:id="rId9"/>
   </p:sldIdLst>
   <p:sldSz cx="9144000" cy="6858000" type="screen4x3"/>
   <p:notesSz cx="6858000" cy="9144000"/>
@@ -203,7 +204,7 @@
           <a:p>
             <a:fld id="{F80196F6-7584-4650-82DD-1A823E372E93}" type="datetimeFigureOut">
               <a:rPr lang="zh-TW" altLang="en-US" smtClean="0"/>
-              <a:t>2015/10/27</a:t>
+              <a:t>2015/11/12</a:t>
             </a:fld>
             <a:endParaRPr lang="zh-TW" altLang="en-US"/>
           </a:p>
@@ -686,7 +687,7 @@
           <a:p>
             <a:fld id="{E7A87A2D-0523-400E-8364-8FCFDAAEE150}" type="datetime1">
               <a:rPr lang="zh-TW" altLang="en-US" smtClean="0"/>
-              <a:t>2015/10/27</a:t>
+              <a:t>2015/11/12</a:t>
             </a:fld>
             <a:endParaRPr lang="zh-TW" altLang="en-US"/>
           </a:p>
@@ -856,7 +857,7 @@
           <a:p>
             <a:fld id="{4470E85D-BD6F-4D26-B110-7E28230C593F}" type="datetime1">
               <a:rPr lang="zh-TW" altLang="en-US" smtClean="0"/>
-              <a:t>2015/10/27</a:t>
+              <a:t>2015/11/12</a:t>
             </a:fld>
             <a:endParaRPr lang="zh-TW" altLang="en-US"/>
           </a:p>
@@ -1036,7 +1037,7 @@
           <a:p>
             <a:fld id="{D6E993F5-55DB-4F1A-9A97-9192FB5AEB42}" type="datetime1">
               <a:rPr lang="zh-TW" altLang="en-US" smtClean="0"/>
-              <a:t>2015/10/27</a:t>
+              <a:t>2015/11/12</a:t>
             </a:fld>
             <a:endParaRPr lang="zh-TW" altLang="en-US"/>
           </a:p>
@@ -1206,7 +1207,7 @@
           <a:p>
             <a:fld id="{C60B81E8-7334-464F-8B48-45CA70843E0C}" type="datetime1">
               <a:rPr lang="zh-TW" altLang="en-US" smtClean="0"/>
-              <a:t>2015/10/27</a:t>
+              <a:t>2015/11/12</a:t>
             </a:fld>
             <a:endParaRPr lang="zh-TW" altLang="en-US"/>
           </a:p>
@@ -1450,7 +1451,7 @@
           <a:p>
             <a:fld id="{D47ED321-95FB-497B-BD7E-3BD909DE64AD}" type="datetime1">
               <a:rPr lang="zh-TW" altLang="en-US" smtClean="0"/>
-              <a:t>2015/10/27</a:t>
+              <a:t>2015/11/12</a:t>
             </a:fld>
             <a:endParaRPr lang="zh-TW" altLang="en-US"/>
           </a:p>
@@ -1682,7 +1683,7 @@
           <a:p>
             <a:fld id="{497E4E27-12DC-43A4-A531-93F92B4B5AEB}" type="datetime1">
               <a:rPr lang="zh-TW" altLang="en-US" smtClean="0"/>
-              <a:t>2015/10/27</a:t>
+              <a:t>2015/11/12</a:t>
             </a:fld>
             <a:endParaRPr lang="zh-TW" altLang="en-US"/>
           </a:p>
@@ -2049,7 +2050,7 @@
           <a:p>
             <a:fld id="{C11F5D98-A40D-4F6A-B778-B48D2F7EC464}" type="datetime1">
               <a:rPr lang="zh-TW" altLang="en-US" smtClean="0"/>
-              <a:t>2015/10/27</a:t>
+              <a:t>2015/11/12</a:t>
             </a:fld>
             <a:endParaRPr lang="zh-TW" altLang="en-US"/>
           </a:p>
@@ -2167,7 +2168,7 @@
           <a:p>
             <a:fld id="{37540F8D-04B0-4510-8208-7A8AB7D75261}" type="datetime1">
               <a:rPr lang="zh-TW" altLang="en-US" smtClean="0"/>
-              <a:t>2015/10/27</a:t>
+              <a:t>2015/11/12</a:t>
             </a:fld>
             <a:endParaRPr lang="zh-TW" altLang="en-US"/>
           </a:p>
@@ -2262,7 +2263,7 @@
           <a:p>
             <a:fld id="{ED8E83AE-CBBB-4AB3-9A7C-32D18F7AB593}" type="datetime1">
               <a:rPr lang="zh-TW" altLang="en-US" smtClean="0"/>
-              <a:t>2015/10/27</a:t>
+              <a:t>2015/11/12</a:t>
             </a:fld>
             <a:endParaRPr lang="zh-TW" altLang="en-US"/>
           </a:p>
@@ -2539,7 +2540,7 @@
           <a:p>
             <a:fld id="{CF1BA43A-76D7-43A7-8042-3520281B1840}" type="datetime1">
               <a:rPr lang="zh-TW" altLang="en-US" smtClean="0"/>
-              <a:t>2015/10/27</a:t>
+              <a:t>2015/11/12</a:t>
             </a:fld>
             <a:endParaRPr lang="zh-TW" altLang="en-US"/>
           </a:p>
@@ -2796,7 +2797,7 @@
           <a:p>
             <a:fld id="{BB28C0ED-AAF8-4DB2-AF56-EE0DC21174BB}" type="datetime1">
               <a:rPr lang="zh-TW" altLang="en-US" smtClean="0"/>
-              <a:t>2015/10/27</a:t>
+              <a:t>2015/11/12</a:t>
             </a:fld>
             <a:endParaRPr lang="zh-TW" altLang="en-US"/>
           </a:p>
@@ -3009,7 +3010,7 @@
           <a:p>
             <a:fld id="{991B9CC3-7329-43C8-BC56-DBF8F15634F0}" type="datetime1">
               <a:rPr lang="zh-TW" altLang="en-US" smtClean="0"/>
-              <a:t>2015/10/27</a:t>
+              <a:t>2015/11/12</a:t>
             </a:fld>
             <a:endParaRPr lang="zh-TW" altLang="en-US"/>
           </a:p>
@@ -3478,7 +3479,7 @@
           <a:p>
             <a:fld id="{E49FC7B0-3E75-4441-B63F-4CC3A5531728}" type="datetime1">
               <a:rPr lang="zh-TW" altLang="en-US" smtClean="0"/>
-              <a:t>2015/10/27</a:t>
+              <a:t>2015/11/12</a:t>
             </a:fld>
             <a:endParaRPr lang="zh-TW" altLang="en-US"/>
           </a:p>
@@ -3612,7 +3613,7 @@
           <a:p>
             <a:fld id="{7D259E43-2377-4BD5-9EF1-8A04A4F66F0C}" type="datetime1">
               <a:rPr lang="zh-TW" altLang="en-US" smtClean="0"/>
-              <a:t>2015/10/27</a:t>
+              <a:t>2015/11/12</a:t>
             </a:fld>
             <a:endParaRPr lang="zh-TW" altLang="en-US"/>
           </a:p>
@@ -3747,7 +3748,7 @@
           <a:p>
             <a:fld id="{3E86548D-D54C-4064-8B18-89FB2D942122}" type="datetime1">
               <a:rPr lang="zh-TW" altLang="en-US" smtClean="0"/>
-              <a:t>2015/10/27</a:t>
+              <a:t>2015/11/12</a:t>
             </a:fld>
             <a:endParaRPr lang="zh-TW" altLang="en-US"/>
           </a:p>
@@ -4226,7 +4227,7 @@
           <a:p>
             <a:fld id="{94FA48B1-D508-49FA-BBA0-5047EEF68D44}" type="datetime1">
               <a:rPr lang="zh-TW" altLang="en-US" smtClean="0"/>
-              <a:t>2015/10/27</a:t>
+              <a:t>2015/11/12</a:t>
             </a:fld>
             <a:endParaRPr lang="zh-TW" altLang="en-US"/>
           </a:p>
@@ -4445,6 +4446,707 @@
           </p:txBody>
         </p:sp>
       </p:grpSp>
+      <p:sp>
+        <p:nvSpPr>
+          <p:cNvPr id="3" name="日期版面配置區 2"/>
+          <p:cNvSpPr>
+            <a:spLocks noGrp="1"/>
+          </p:cNvSpPr>
+          <p:nvPr>
+            <p:ph type="dt" sz="half" idx="10"/>
+          </p:nvPr>
+        </p:nvSpPr>
+        <p:spPr/>
+        <p:txBody>
+          <a:bodyPr/>
+          <a:lstStyle/>
+          <a:p>
+            <a:fld id="{E0EFF268-3616-48FD-9778-BBA6A4676333}" type="datetime1">
+              <a:rPr lang="zh-TW" altLang="en-US" smtClean="0"/>
+              <a:t>2015/11/12</a:t>
+            </a:fld>
+            <a:endParaRPr lang="zh-TW" altLang="en-US"/>
+          </a:p>
+        </p:txBody>
+      </p:sp>
+      <p:sp>
+        <p:nvSpPr>
+          <p:cNvPr id="12" name="投影片編號版面配置區 11"/>
+          <p:cNvSpPr>
+            <a:spLocks noGrp="1"/>
+          </p:cNvSpPr>
+          <p:nvPr>
+            <p:ph type="sldNum" sz="quarter" idx="12"/>
+          </p:nvPr>
+        </p:nvSpPr>
+        <p:spPr/>
+        <p:txBody>
+          <a:bodyPr/>
+          <a:lstStyle/>
+          <a:p>
+            <a:fld id="{6923F3CB-4711-4FC8-9867-5888834CD7FE}" type="slidenum">
+              <a:rPr lang="zh-TW" altLang="en-US" smtClean="0"/>
+              <a:t>5</a:t>
+            </a:fld>
+            <a:endParaRPr lang="zh-TW" altLang="en-US"/>
+          </a:p>
+        </p:txBody>
+      </p:sp>
+      <p:sp>
+        <p:nvSpPr>
+          <p:cNvPr id="19" name="文字方塊 18"/>
+          <p:cNvSpPr txBox="1"/>
+          <p:nvPr/>
+        </p:nvSpPr>
+        <p:spPr>
+          <a:xfrm>
+            <a:off x="3819181" y="2452391"/>
+            <a:ext cx="2115239" cy="1046602"/>
+          </a:xfrm>
+          <a:prstGeom prst="rect">
+            <a:avLst/>
+          </a:prstGeom>
+          <a:solidFill>
+            <a:schemeClr val="accent5">
+              <a:lumMod val="20000"/>
+              <a:lumOff val="80000"/>
+            </a:schemeClr>
+          </a:solidFill>
+          <a:ln>
+            <a:solidFill>
+              <a:schemeClr val="tx1"/>
+            </a:solidFill>
+            <a:prstDash val="sysDot"/>
+          </a:ln>
+        </p:spPr>
+        <p:txBody>
+          <a:bodyPr wrap="square" rtlCol="0">
+            <a:noAutofit/>
+          </a:bodyPr>
+          <a:lstStyle/>
+          <a:p>
+            <a:pPr algn="ctr"/>
+            <a:r>
+              <a:rPr lang="zh-TW" altLang="en-US" dirty="0" smtClean="0"/>
+              <a:t>上 中</a:t>
+            </a:r>
+            <a:endParaRPr lang="zh-TW" altLang="en-US" dirty="0"/>
+          </a:p>
+        </p:txBody>
+      </p:sp>
+      <p:sp>
+        <p:nvSpPr>
+          <p:cNvPr id="23" name="文字方塊 22"/>
+          <p:cNvSpPr txBox="1"/>
+          <p:nvPr/>
+        </p:nvSpPr>
+        <p:spPr>
+          <a:xfrm>
+            <a:off x="3971581" y="2604791"/>
+            <a:ext cx="2115239" cy="1046602"/>
+          </a:xfrm>
+          <a:prstGeom prst="rect">
+            <a:avLst/>
+          </a:prstGeom>
+          <a:solidFill>
+            <a:schemeClr val="accent5">
+              <a:lumMod val="20000"/>
+              <a:lumOff val="80000"/>
+            </a:schemeClr>
+          </a:solidFill>
+          <a:ln>
+            <a:solidFill>
+              <a:schemeClr val="tx1"/>
+            </a:solidFill>
+            <a:prstDash val="sysDot"/>
+          </a:ln>
+        </p:spPr>
+        <p:txBody>
+          <a:bodyPr wrap="square" rtlCol="0">
+            <a:noAutofit/>
+          </a:bodyPr>
+          <a:lstStyle/>
+          <a:p>
+            <a:pPr algn="ctr"/>
+            <a:r>
+              <a:rPr lang="zh-TW" altLang="en-US" dirty="0" smtClean="0"/>
+              <a:t>上 中</a:t>
+            </a:r>
+            <a:endParaRPr lang="zh-TW" altLang="en-US" dirty="0"/>
+          </a:p>
+        </p:txBody>
+      </p:sp>
+      <p:sp>
+        <p:nvSpPr>
+          <p:cNvPr id="27" name="文字方塊 26"/>
+          <p:cNvSpPr txBox="1"/>
+          <p:nvPr/>
+        </p:nvSpPr>
+        <p:spPr>
+          <a:xfrm>
+            <a:off x="4123981" y="2757191"/>
+            <a:ext cx="2115239" cy="1046602"/>
+          </a:xfrm>
+          <a:prstGeom prst="rect">
+            <a:avLst/>
+          </a:prstGeom>
+          <a:solidFill>
+            <a:schemeClr val="accent5">
+              <a:lumMod val="20000"/>
+              <a:lumOff val="80000"/>
+            </a:schemeClr>
+          </a:solidFill>
+          <a:ln>
+            <a:solidFill>
+              <a:schemeClr val="tx1"/>
+            </a:solidFill>
+            <a:prstDash val="sysDot"/>
+          </a:ln>
+        </p:spPr>
+        <p:txBody>
+          <a:bodyPr wrap="square" rtlCol="0">
+            <a:noAutofit/>
+          </a:bodyPr>
+          <a:lstStyle/>
+          <a:p>
+            <a:pPr algn="ctr"/>
+            <a:r>
+              <a:rPr lang="zh-TW" altLang="en-US" dirty="0" smtClean="0"/>
+              <a:t>上 中</a:t>
+            </a:r>
+            <a:endParaRPr lang="zh-TW" altLang="en-US" dirty="0"/>
+          </a:p>
+        </p:txBody>
+      </p:sp>
+      <p:grpSp>
+        <p:nvGrpSpPr>
+          <p:cNvPr id="38" name="群組 37"/>
+          <p:cNvGrpSpPr/>
+          <p:nvPr/>
+        </p:nvGrpSpPr>
+        <p:grpSpPr>
+          <a:xfrm>
+            <a:off x="6485263" y="2452391"/>
+            <a:ext cx="2420039" cy="1351402"/>
+            <a:chOff x="6485263" y="2452391"/>
+            <a:chExt cx="2420039" cy="1351402"/>
+          </a:xfrm>
+        </p:grpSpPr>
+        <p:sp>
+          <p:nvSpPr>
+            <p:cNvPr id="20" name="文字方塊 19"/>
+            <p:cNvSpPr txBox="1"/>
+            <p:nvPr/>
+          </p:nvSpPr>
+          <p:spPr>
+            <a:xfrm>
+              <a:off x="6485263" y="2452391"/>
+              <a:ext cx="2115239" cy="1046602"/>
+            </a:xfrm>
+            <a:prstGeom prst="rect">
+              <a:avLst/>
+            </a:prstGeom>
+            <a:solidFill>
+              <a:schemeClr val="accent6">
+                <a:lumMod val="60000"/>
+                <a:lumOff val="40000"/>
+              </a:schemeClr>
+            </a:solidFill>
+            <a:ln>
+              <a:solidFill>
+                <a:schemeClr val="tx1"/>
+              </a:solidFill>
+              <a:prstDash val="sysDash"/>
+            </a:ln>
+          </p:spPr>
+          <p:txBody>
+            <a:bodyPr wrap="square" rtlCol="0">
+              <a:noAutofit/>
+            </a:bodyPr>
+            <a:lstStyle/>
+            <a:p>
+              <a:pPr algn="r"/>
+              <a:r>
+                <a:rPr lang="zh-TW" altLang="en-US" dirty="0" smtClean="0"/>
+                <a:t>上 右</a:t>
+              </a:r>
+              <a:endParaRPr lang="zh-TW" altLang="en-US" dirty="0"/>
+            </a:p>
+          </p:txBody>
+        </p:sp>
+        <p:sp>
+          <p:nvSpPr>
+            <p:cNvPr id="24" name="文字方塊 23"/>
+            <p:cNvSpPr txBox="1"/>
+            <p:nvPr/>
+          </p:nvSpPr>
+          <p:spPr>
+            <a:xfrm>
+              <a:off x="6637663" y="2604791"/>
+              <a:ext cx="2115239" cy="1046602"/>
+            </a:xfrm>
+            <a:prstGeom prst="rect">
+              <a:avLst/>
+            </a:prstGeom>
+            <a:solidFill>
+              <a:schemeClr val="accent6">
+                <a:lumMod val="60000"/>
+                <a:lumOff val="40000"/>
+              </a:schemeClr>
+            </a:solidFill>
+            <a:ln>
+              <a:solidFill>
+                <a:schemeClr val="tx1"/>
+              </a:solidFill>
+              <a:prstDash val="sysDash"/>
+            </a:ln>
+          </p:spPr>
+          <p:txBody>
+            <a:bodyPr wrap="square" rtlCol="0">
+              <a:noAutofit/>
+            </a:bodyPr>
+            <a:lstStyle/>
+            <a:p>
+              <a:pPr algn="r"/>
+              <a:r>
+                <a:rPr lang="zh-TW" altLang="en-US" dirty="0" smtClean="0"/>
+                <a:t>上 右</a:t>
+              </a:r>
+              <a:endParaRPr lang="zh-TW" altLang="en-US" dirty="0"/>
+            </a:p>
+          </p:txBody>
+        </p:sp>
+        <p:sp>
+          <p:nvSpPr>
+            <p:cNvPr id="28" name="文字方塊 27"/>
+            <p:cNvSpPr txBox="1"/>
+            <p:nvPr/>
+          </p:nvSpPr>
+          <p:spPr>
+            <a:xfrm>
+              <a:off x="6790063" y="2757191"/>
+              <a:ext cx="2115239" cy="1046602"/>
+            </a:xfrm>
+            <a:prstGeom prst="rect">
+              <a:avLst/>
+            </a:prstGeom>
+            <a:solidFill>
+              <a:schemeClr val="accent6">
+                <a:lumMod val="60000"/>
+                <a:lumOff val="40000"/>
+              </a:schemeClr>
+            </a:solidFill>
+            <a:ln>
+              <a:solidFill>
+                <a:schemeClr val="tx1"/>
+              </a:solidFill>
+              <a:prstDash val="sysDash"/>
+            </a:ln>
+          </p:spPr>
+          <p:txBody>
+            <a:bodyPr wrap="square" rtlCol="0">
+              <a:noAutofit/>
+            </a:bodyPr>
+            <a:lstStyle/>
+            <a:p>
+              <a:pPr algn="r"/>
+              <a:r>
+                <a:rPr lang="zh-TW" altLang="en-US" dirty="0" smtClean="0"/>
+                <a:t>上 右</a:t>
+              </a:r>
+              <a:endParaRPr lang="zh-TW" altLang="en-US" dirty="0"/>
+            </a:p>
+          </p:txBody>
+        </p:sp>
+      </p:grpSp>
+      <p:grpSp>
+        <p:nvGrpSpPr>
+          <p:cNvPr id="37" name="群組 36"/>
+          <p:cNvGrpSpPr/>
+          <p:nvPr/>
+        </p:nvGrpSpPr>
+        <p:grpSpPr>
+          <a:xfrm>
+            <a:off x="1153099" y="2452391"/>
+            <a:ext cx="2572439" cy="1503802"/>
+            <a:chOff x="1153099" y="2452391"/>
+            <a:chExt cx="2572439" cy="1503802"/>
+          </a:xfrm>
+        </p:grpSpPr>
+        <p:sp>
+          <p:nvSpPr>
+            <p:cNvPr id="18" name="文字方塊 17"/>
+            <p:cNvSpPr txBox="1"/>
+            <p:nvPr/>
+          </p:nvSpPr>
+          <p:spPr>
+            <a:xfrm>
+              <a:off x="1153099" y="2452391"/>
+              <a:ext cx="2115239" cy="1046602"/>
+            </a:xfrm>
+            <a:prstGeom prst="rect">
+              <a:avLst/>
+            </a:prstGeom>
+            <a:solidFill>
+              <a:schemeClr val="accent4">
+                <a:lumMod val="20000"/>
+                <a:lumOff val="80000"/>
+              </a:schemeClr>
+            </a:solidFill>
+            <a:ln>
+              <a:noFill/>
+            </a:ln>
+          </p:spPr>
+          <p:txBody>
+            <a:bodyPr wrap="square" rtlCol="0">
+              <a:noAutofit/>
+            </a:bodyPr>
+            <a:lstStyle/>
+            <a:p>
+              <a:r>
+                <a:rPr lang="zh-TW" altLang="en-US" dirty="0" smtClean="0"/>
+                <a:t>上 左</a:t>
+              </a:r>
+              <a:endParaRPr lang="zh-TW" altLang="en-US" dirty="0"/>
+            </a:p>
+          </p:txBody>
+        </p:sp>
+        <p:sp>
+          <p:nvSpPr>
+            <p:cNvPr id="22" name="文字方塊 21"/>
+            <p:cNvSpPr txBox="1"/>
+            <p:nvPr/>
+          </p:nvSpPr>
+          <p:spPr>
+            <a:xfrm>
+              <a:off x="1305499" y="2604791"/>
+              <a:ext cx="2115239" cy="1046602"/>
+            </a:xfrm>
+            <a:prstGeom prst="rect">
+              <a:avLst/>
+            </a:prstGeom>
+            <a:solidFill>
+              <a:schemeClr val="accent4">
+                <a:lumMod val="20000"/>
+                <a:lumOff val="80000"/>
+              </a:schemeClr>
+            </a:solidFill>
+            <a:ln>
+              <a:noFill/>
+            </a:ln>
+          </p:spPr>
+          <p:txBody>
+            <a:bodyPr wrap="square" rtlCol="0">
+              <a:noAutofit/>
+            </a:bodyPr>
+            <a:lstStyle/>
+            <a:p>
+              <a:r>
+                <a:rPr lang="zh-TW" altLang="en-US" dirty="0" smtClean="0"/>
+                <a:t>上 左</a:t>
+              </a:r>
+              <a:endParaRPr lang="zh-TW" altLang="en-US" dirty="0"/>
+            </a:p>
+          </p:txBody>
+        </p:sp>
+        <p:sp>
+          <p:nvSpPr>
+            <p:cNvPr id="26" name="文字方塊 25"/>
+            <p:cNvSpPr txBox="1"/>
+            <p:nvPr/>
+          </p:nvSpPr>
+          <p:spPr>
+            <a:xfrm>
+              <a:off x="1457899" y="2757191"/>
+              <a:ext cx="2115239" cy="1046602"/>
+            </a:xfrm>
+            <a:prstGeom prst="rect">
+              <a:avLst/>
+            </a:prstGeom>
+            <a:solidFill>
+              <a:schemeClr val="accent4">
+                <a:lumMod val="20000"/>
+                <a:lumOff val="80000"/>
+              </a:schemeClr>
+            </a:solidFill>
+            <a:ln>
+              <a:noFill/>
+            </a:ln>
+          </p:spPr>
+          <p:txBody>
+            <a:bodyPr wrap="square" rtlCol="0">
+              <a:noAutofit/>
+            </a:bodyPr>
+            <a:lstStyle/>
+            <a:p>
+              <a:r>
+                <a:rPr lang="zh-TW" altLang="en-US" dirty="0" smtClean="0"/>
+                <a:t>上 左</a:t>
+              </a:r>
+              <a:endParaRPr lang="zh-TW" altLang="en-US" dirty="0"/>
+            </a:p>
+          </p:txBody>
+        </p:sp>
+        <p:sp>
+          <p:nvSpPr>
+            <p:cNvPr id="30" name="文字方塊 29"/>
+            <p:cNvSpPr txBox="1"/>
+            <p:nvPr/>
+          </p:nvSpPr>
+          <p:spPr>
+            <a:xfrm>
+              <a:off x="1610299" y="2909591"/>
+              <a:ext cx="2115239" cy="1046602"/>
+            </a:xfrm>
+            <a:prstGeom prst="rect">
+              <a:avLst/>
+            </a:prstGeom>
+            <a:solidFill>
+              <a:schemeClr val="accent4">
+                <a:lumMod val="20000"/>
+                <a:lumOff val="80000"/>
+              </a:schemeClr>
+            </a:solidFill>
+            <a:ln>
+              <a:noFill/>
+            </a:ln>
+          </p:spPr>
+          <p:txBody>
+            <a:bodyPr wrap="square" rtlCol="0">
+              <a:noAutofit/>
+            </a:bodyPr>
+            <a:lstStyle/>
+            <a:p>
+              <a:r>
+                <a:rPr lang="zh-TW" altLang="en-US" dirty="0" smtClean="0"/>
+                <a:t>上 左</a:t>
+              </a:r>
+              <a:endParaRPr lang="zh-TW" altLang="en-US" dirty="0"/>
+            </a:p>
+          </p:txBody>
+        </p:sp>
+      </p:grpSp>
+      <p:sp>
+        <p:nvSpPr>
+          <p:cNvPr id="31" name="文字方塊 30"/>
+          <p:cNvSpPr txBox="1"/>
+          <p:nvPr/>
+        </p:nvSpPr>
+        <p:spPr>
+          <a:xfrm>
+            <a:off x="4276381" y="2909591"/>
+            <a:ext cx="2115239" cy="1046602"/>
+          </a:xfrm>
+          <a:prstGeom prst="rect">
+            <a:avLst/>
+          </a:prstGeom>
+          <a:solidFill>
+            <a:schemeClr val="accent5">
+              <a:lumMod val="20000"/>
+              <a:lumOff val="80000"/>
+            </a:schemeClr>
+          </a:solidFill>
+          <a:ln>
+            <a:solidFill>
+              <a:schemeClr val="tx1"/>
+            </a:solidFill>
+            <a:prstDash val="sysDot"/>
+          </a:ln>
+        </p:spPr>
+        <p:txBody>
+          <a:bodyPr wrap="square" rtlCol="0">
+            <a:noAutofit/>
+          </a:bodyPr>
+          <a:lstStyle/>
+          <a:p>
+            <a:pPr algn="ctr"/>
+            <a:r>
+              <a:rPr lang="zh-TW" altLang="en-US" dirty="0" smtClean="0"/>
+              <a:t>上 中</a:t>
+            </a:r>
+            <a:endParaRPr lang="zh-TW" altLang="en-US" dirty="0"/>
+          </a:p>
+        </p:txBody>
+      </p:sp>
+      <p:sp>
+        <p:nvSpPr>
+          <p:cNvPr id="32" name="文字方塊 31"/>
+          <p:cNvSpPr txBox="1"/>
+          <p:nvPr/>
+        </p:nvSpPr>
+        <p:spPr>
+          <a:xfrm>
+            <a:off x="6942463" y="2909591"/>
+            <a:ext cx="2115239" cy="1046602"/>
+          </a:xfrm>
+          <a:prstGeom prst="rect">
+            <a:avLst/>
+          </a:prstGeom>
+          <a:solidFill>
+            <a:schemeClr val="accent6">
+              <a:lumMod val="60000"/>
+              <a:lumOff val="40000"/>
+            </a:schemeClr>
+          </a:solidFill>
+          <a:ln>
+            <a:solidFill>
+              <a:schemeClr val="tx1"/>
+            </a:solidFill>
+            <a:prstDash val="sysDash"/>
+          </a:ln>
+        </p:spPr>
+        <p:txBody>
+          <a:bodyPr wrap="square" rtlCol="0">
+            <a:noAutofit/>
+          </a:bodyPr>
+          <a:lstStyle/>
+          <a:p>
+            <a:pPr algn="r"/>
+            <a:r>
+              <a:rPr lang="zh-TW" altLang="en-US" dirty="0" smtClean="0"/>
+              <a:t>上 右</a:t>
+            </a:r>
+            <a:endParaRPr lang="zh-TW" altLang="en-US" dirty="0"/>
+          </a:p>
+        </p:txBody>
+      </p:sp>
+      <p:grpSp>
+        <p:nvGrpSpPr>
+          <p:cNvPr id="33" name="群組 32"/>
+          <p:cNvGrpSpPr/>
+          <p:nvPr/>
+        </p:nvGrpSpPr>
+        <p:grpSpPr>
+          <a:xfrm>
+            <a:off x="247879" y="5389099"/>
+            <a:ext cx="7447403" cy="1046602"/>
+            <a:chOff x="920870" y="2147591"/>
+            <a:chExt cx="7447403" cy="1046602"/>
+          </a:xfrm>
+        </p:grpSpPr>
+        <p:sp>
+          <p:nvSpPr>
+            <p:cNvPr id="34" name="文字方塊 33"/>
+            <p:cNvSpPr txBox="1"/>
+            <p:nvPr/>
+          </p:nvSpPr>
+          <p:spPr>
+            <a:xfrm>
+              <a:off x="920870" y="2147591"/>
+              <a:ext cx="2115239" cy="1046602"/>
+            </a:xfrm>
+            <a:prstGeom prst="rect">
+              <a:avLst/>
+            </a:prstGeom>
+            <a:solidFill>
+              <a:schemeClr val="accent4">
+                <a:lumMod val="20000"/>
+                <a:lumOff val="80000"/>
+              </a:schemeClr>
+            </a:solidFill>
+            <a:ln>
+              <a:noFill/>
+            </a:ln>
+          </p:spPr>
+          <p:txBody>
+            <a:bodyPr wrap="square" rtlCol="0">
+              <a:noAutofit/>
+            </a:bodyPr>
+            <a:lstStyle/>
+            <a:p>
+              <a:r>
+                <a:rPr lang="zh-TW" altLang="en-US" dirty="0" smtClean="0"/>
+                <a:t>上 左</a:t>
+              </a:r>
+              <a:endParaRPr lang="zh-TW" altLang="en-US" dirty="0"/>
+            </a:p>
+          </p:txBody>
+        </p:sp>
+        <p:sp>
+          <p:nvSpPr>
+            <p:cNvPr id="35" name="文字方塊 34"/>
+            <p:cNvSpPr txBox="1"/>
+            <p:nvPr/>
+          </p:nvSpPr>
+          <p:spPr>
+            <a:xfrm>
+              <a:off x="3586952" y="2147591"/>
+              <a:ext cx="2115239" cy="1046602"/>
+            </a:xfrm>
+            <a:prstGeom prst="rect">
+              <a:avLst/>
+            </a:prstGeom>
+            <a:solidFill>
+              <a:schemeClr val="accent5">
+                <a:lumMod val="20000"/>
+                <a:lumOff val="80000"/>
+              </a:schemeClr>
+            </a:solidFill>
+            <a:ln>
+              <a:solidFill>
+                <a:schemeClr val="tx1"/>
+              </a:solidFill>
+              <a:prstDash val="sysDot"/>
+            </a:ln>
+          </p:spPr>
+          <p:txBody>
+            <a:bodyPr wrap="square" rtlCol="0">
+              <a:noAutofit/>
+            </a:bodyPr>
+            <a:lstStyle/>
+            <a:p>
+              <a:pPr algn="ctr"/>
+              <a:r>
+                <a:rPr lang="zh-TW" altLang="en-US" dirty="0" smtClean="0"/>
+                <a:t>上 中</a:t>
+              </a:r>
+              <a:endParaRPr lang="zh-TW" altLang="en-US" dirty="0"/>
+            </a:p>
+          </p:txBody>
+        </p:sp>
+        <p:sp>
+          <p:nvSpPr>
+            <p:cNvPr id="36" name="文字方塊 35"/>
+            <p:cNvSpPr txBox="1"/>
+            <p:nvPr/>
+          </p:nvSpPr>
+          <p:spPr>
+            <a:xfrm>
+              <a:off x="6253034" y="2147591"/>
+              <a:ext cx="2115239" cy="1046602"/>
+            </a:xfrm>
+            <a:prstGeom prst="rect">
+              <a:avLst/>
+            </a:prstGeom>
+            <a:solidFill>
+              <a:schemeClr val="accent6">
+                <a:lumMod val="60000"/>
+                <a:lumOff val="40000"/>
+              </a:schemeClr>
+            </a:solidFill>
+            <a:ln>
+              <a:solidFill>
+                <a:schemeClr val="tx1"/>
+              </a:solidFill>
+              <a:prstDash val="sysDash"/>
+            </a:ln>
+          </p:spPr>
+          <p:txBody>
+            <a:bodyPr wrap="square" rtlCol="0">
+              <a:noAutofit/>
+            </a:bodyPr>
+            <a:lstStyle/>
+            <a:p>
+              <a:pPr algn="r"/>
+              <a:r>
+                <a:rPr lang="zh-TW" altLang="en-US" dirty="0" smtClean="0"/>
+                <a:t>上 右</a:t>
+              </a:r>
+              <a:endParaRPr lang="zh-TW" altLang="en-US" dirty="0"/>
+            </a:p>
+          </p:txBody>
+        </p:sp>
+      </p:grpSp>
       <p:grpSp>
         <p:nvGrpSpPr>
           <p:cNvPr id="11" name="群組 10"/>
@@ -4459,47 +5161,6 @@
             <a:chExt cx="7447404" cy="1046602"/>
           </a:xfrm>
         </p:grpSpPr>
-        <p:sp>
-          <p:nvSpPr>
-            <p:cNvPr id="8" name="文字方塊 7"/>
-            <p:cNvSpPr txBox="1"/>
-            <p:nvPr/>
-          </p:nvSpPr>
-          <p:spPr>
-            <a:xfrm>
-              <a:off x="848297" y="4259857"/>
-              <a:ext cx="2115239" cy="1046602"/>
-            </a:xfrm>
-            <a:prstGeom prst="rect">
-              <a:avLst/>
-            </a:prstGeom>
-            <a:solidFill>
-              <a:schemeClr val="accent4">
-                <a:lumMod val="20000"/>
-                <a:lumOff val="80000"/>
-              </a:schemeClr>
-            </a:solidFill>
-            <a:ln w="12700">
-              <a:solidFill>
-                <a:schemeClr val="tx1"/>
-              </a:solidFill>
-              <a:prstDash val="lgDashDot"/>
-            </a:ln>
-          </p:spPr>
-          <p:txBody>
-            <a:bodyPr wrap="square" rtlCol="0" anchor="b">
-              <a:noAutofit/>
-            </a:bodyPr>
-            <a:lstStyle/>
-            <a:p>
-              <a:r>
-                <a:rPr lang="zh-TW" altLang="en-US" i="1" dirty="0" smtClean="0"/>
-                <a:t>下 左</a:t>
-              </a:r>
-              <a:endParaRPr lang="zh-TW" altLang="en-US" i="1" dirty="0"/>
-            </a:p>
-          </p:txBody>
-        </p:sp>
         <p:sp>
           <p:nvSpPr>
             <p:cNvPr id="9" name="文字方塊 8"/>
@@ -4613,53 +5274,185 @@
             </a:p>
           </p:txBody>
         </p:sp>
+        <p:sp>
+          <p:nvSpPr>
+            <p:cNvPr id="8" name="文字方塊 7"/>
+            <p:cNvSpPr txBox="1"/>
+            <p:nvPr/>
+          </p:nvSpPr>
+          <p:spPr>
+            <a:xfrm>
+              <a:off x="848297" y="4259857"/>
+              <a:ext cx="2115239" cy="1046602"/>
+            </a:xfrm>
+            <a:prstGeom prst="rect">
+              <a:avLst/>
+            </a:prstGeom>
+            <a:solidFill>
+              <a:schemeClr val="accent4">
+                <a:lumMod val="20000"/>
+                <a:lumOff val="80000"/>
+              </a:schemeClr>
+            </a:solidFill>
+            <a:ln w="12700">
+              <a:solidFill>
+                <a:schemeClr val="tx1"/>
+              </a:solidFill>
+              <a:prstDash val="lgDashDot"/>
+            </a:ln>
+          </p:spPr>
+          <p:txBody>
+            <a:bodyPr wrap="square" rtlCol="0" anchor="b">
+              <a:noAutofit/>
+            </a:bodyPr>
+            <a:lstStyle/>
+            <a:p>
+              <a:r>
+                <a:rPr lang="zh-TW" altLang="en-US" i="1" dirty="0" smtClean="0"/>
+                <a:t>下 左</a:t>
+              </a:r>
+              <a:endParaRPr lang="zh-TW" altLang="en-US" i="1" dirty="0"/>
+            </a:p>
+          </p:txBody>
+        </p:sp>
       </p:grpSp>
-      <p:sp>
-        <p:nvSpPr>
-          <p:cNvPr id="3" name="日期版面配置區 2"/>
-          <p:cNvSpPr>
-            <a:spLocks noGrp="1"/>
-          </p:cNvSpPr>
-          <p:nvPr>
-            <p:ph type="dt" sz="half" idx="10"/>
-          </p:nvPr>
-        </p:nvSpPr>
-        <p:spPr/>
-        <p:txBody>
-          <a:bodyPr/>
-          <a:lstStyle/>
-          <a:p>
-            <a:fld id="{E0EFF268-3616-48FD-9778-BBA6A4676333}" type="datetime1">
-              <a:rPr lang="zh-TW" altLang="en-US" smtClean="0"/>
-              <a:t>2015/10/27</a:t>
-            </a:fld>
-            <a:endParaRPr lang="zh-TW" altLang="en-US"/>
-          </a:p>
-        </p:txBody>
-      </p:sp>
-      <p:sp>
-        <p:nvSpPr>
-          <p:cNvPr id="12" name="投影片編號版面配置區 11"/>
-          <p:cNvSpPr>
-            <a:spLocks noGrp="1"/>
-          </p:cNvSpPr>
-          <p:nvPr>
-            <p:ph type="sldNum" sz="quarter" idx="12"/>
-          </p:nvPr>
-        </p:nvSpPr>
-        <p:spPr/>
-        <p:txBody>
-          <a:bodyPr/>
-          <a:lstStyle/>
-          <a:p>
-            <a:fld id="{6923F3CB-4711-4FC8-9867-5888834CD7FE}" type="slidenum">
-              <a:rPr lang="zh-TW" altLang="en-US" smtClean="0"/>
-              <a:t>5</a:t>
-            </a:fld>
-            <a:endParaRPr lang="zh-TW" altLang="en-US"/>
-          </a:p>
-        </p:txBody>
-      </p:sp>
+      <p:grpSp>
+        <p:nvGrpSpPr>
+          <p:cNvPr id="13" name="群組 12"/>
+          <p:cNvGrpSpPr/>
+          <p:nvPr/>
+        </p:nvGrpSpPr>
+        <p:grpSpPr>
+          <a:xfrm>
+            <a:off x="1000699" y="2299991"/>
+            <a:ext cx="7447403" cy="1046602"/>
+            <a:chOff x="920870" y="2147591"/>
+            <a:chExt cx="7447403" cy="1046602"/>
+          </a:xfrm>
+        </p:grpSpPr>
+        <p:sp>
+          <p:nvSpPr>
+            <p:cNvPr id="14" name="文字方塊 13"/>
+            <p:cNvSpPr txBox="1"/>
+            <p:nvPr/>
+          </p:nvSpPr>
+          <p:spPr>
+            <a:xfrm>
+              <a:off x="920870" y="2147591"/>
+              <a:ext cx="2115239" cy="1046602"/>
+            </a:xfrm>
+            <a:prstGeom prst="rect">
+              <a:avLst/>
+            </a:prstGeom>
+            <a:solidFill>
+              <a:schemeClr val="accent4">
+                <a:lumMod val="20000"/>
+                <a:lumOff val="80000"/>
+              </a:schemeClr>
+            </a:solidFill>
+            <a:ln>
+              <a:noFill/>
+            </a:ln>
+          </p:spPr>
+          <p:txBody>
+            <a:bodyPr wrap="square" rtlCol="0">
+              <a:noAutofit/>
+            </a:bodyPr>
+            <a:lstStyle/>
+            <a:p>
+              <a:r>
+                <a:rPr lang="zh-TW" altLang="en-US" dirty="0" smtClean="0"/>
+                <a:t>上 左</a:t>
+              </a:r>
+              <a:endParaRPr lang="zh-TW" altLang="en-US" dirty="0"/>
+            </a:p>
+          </p:txBody>
+        </p:sp>
+        <p:sp>
+          <p:nvSpPr>
+            <p:cNvPr id="15" name="文字方塊 14"/>
+            <p:cNvSpPr txBox="1"/>
+            <p:nvPr/>
+          </p:nvSpPr>
+          <p:spPr>
+            <a:xfrm>
+              <a:off x="3586952" y="2147591"/>
+              <a:ext cx="2115239" cy="1046602"/>
+            </a:xfrm>
+            <a:prstGeom prst="rect">
+              <a:avLst/>
+            </a:prstGeom>
+            <a:solidFill>
+              <a:schemeClr val="accent5">
+                <a:lumMod val="20000"/>
+                <a:lumOff val="80000"/>
+              </a:schemeClr>
+            </a:solidFill>
+            <a:ln>
+              <a:solidFill>
+                <a:schemeClr val="tx1"/>
+              </a:solidFill>
+              <a:prstDash val="sysDot"/>
+            </a:ln>
+          </p:spPr>
+          <p:txBody>
+            <a:bodyPr wrap="square" rtlCol="0">
+              <a:noAutofit/>
+            </a:bodyPr>
+            <a:lstStyle/>
+            <a:p>
+              <a:pPr algn="ctr"/>
+              <a:r>
+                <a:rPr lang="zh-TW" altLang="en-US" dirty="0" smtClean="0"/>
+                <a:t>上 中</a:t>
+              </a:r>
+              <a:endParaRPr lang="zh-TW" altLang="en-US" dirty="0"/>
+            </a:p>
+          </p:txBody>
+        </p:sp>
+        <p:sp>
+          <p:nvSpPr>
+            <p:cNvPr id="16" name="文字方塊 15"/>
+            <p:cNvSpPr txBox="1"/>
+            <p:nvPr/>
+          </p:nvSpPr>
+          <p:spPr>
+            <a:xfrm>
+              <a:off x="6253034" y="2147591"/>
+              <a:ext cx="2115239" cy="1046602"/>
+            </a:xfrm>
+            <a:prstGeom prst="rect">
+              <a:avLst/>
+            </a:prstGeom>
+            <a:solidFill>
+              <a:schemeClr val="accent6">
+                <a:lumMod val="60000"/>
+                <a:lumOff val="40000"/>
+              </a:schemeClr>
+            </a:solidFill>
+            <a:ln>
+              <a:solidFill>
+                <a:schemeClr val="tx1"/>
+              </a:solidFill>
+              <a:prstDash val="sysDash"/>
+            </a:ln>
+          </p:spPr>
+          <p:txBody>
+            <a:bodyPr wrap="square" rtlCol="0">
+              <a:noAutofit/>
+            </a:bodyPr>
+            <a:lstStyle/>
+            <a:p>
+              <a:pPr algn="r"/>
+              <a:r>
+                <a:rPr lang="zh-TW" altLang="en-US" dirty="0" smtClean="0"/>
+                <a:t>上 右</a:t>
+              </a:r>
+              <a:endParaRPr lang="zh-TW" altLang="en-US" dirty="0"/>
+            </a:p>
+          </p:txBody>
+        </p:sp>
+      </p:grpSp>
     </p:spTree>
     <p:extLst>
       <p:ext uri="{BB962C8B-B14F-4D97-AF65-F5344CB8AC3E}">
@@ -4737,7 +5530,7 @@
             <p:ph idx="1"/>
             <p:extLst>
               <p:ext uri="{D42A27DB-BD31-4B8C-83A1-F6EECF244321}">
-                <p14:modId xmlns:p14="http://schemas.microsoft.com/office/powerpoint/2010/main" val="1530575104"/>
+                <p14:modId xmlns:p14="http://schemas.microsoft.com/office/powerpoint/2010/main" val="580866644"/>
               </p:ext>
             </p:extLst>
           </p:nvPr>
@@ -4764,6 +5557,22 @@
                     <a:bodyPr/>
                     <a:lstStyle/>
                     <a:p>
+                      <a:pPr algn="ctr"/>
+                      <a:r>
+                        <a:rPr lang="en-US" altLang="zh-TW" i="1" dirty="0" smtClean="0"/>
+                        <a:t>Header1</a:t>
+                      </a:r>
+                      <a:endParaRPr lang="zh-TW" altLang="en-US" i="1" dirty="0"/>
+                    </a:p>
+                  </a:txBody>
+                  <a:tcPr/>
+                </a:tc>
+                <a:tc>
+                  <a:txBody>
+                    <a:bodyPr/>
+                    <a:lstStyle/>
+                    <a:p>
+                      <a:pPr algn="ctr"/>
                       <a:r>
                         <a:rPr lang="en-US" altLang="zh-TW" dirty="0" smtClean="0"/>
                         <a:t>Header1</a:t>
@@ -4778,11 +5587,12 @@
                     <a:bodyPr/>
                     <a:lstStyle/>
                     <a:p>
+                      <a:pPr algn="ctr"/>
                       <a:r>
-                        <a:rPr lang="en-US" altLang="zh-TW" dirty="0" smtClean="0"/>
+                        <a:rPr lang="en-US" altLang="zh-TW" u="sng" dirty="0" smtClean="0"/>
                         <a:t>Header1</a:t>
                       </a:r>
-                      <a:endParaRPr lang="zh-TW" altLang="en-US" dirty="0"/>
+                      <a:endParaRPr lang="zh-TW" altLang="en-US" u="sng" dirty="0"/>
                     </a:p>
                   </a:txBody>
                   <a:tcPr/>
@@ -4792,25 +5602,12 @@
                     <a:bodyPr/>
                     <a:lstStyle/>
                     <a:p>
+                      <a:pPr algn="ctr"/>
                       <a:r>
-                        <a:rPr lang="en-US" altLang="zh-TW" dirty="0" smtClean="0"/>
+                        <a:rPr lang="en-US" altLang="zh-TW" u="sng" dirty="0" smtClean="0"/>
                         <a:t>Header1</a:t>
                       </a:r>
-                      <a:endParaRPr lang="zh-TW" altLang="en-US" dirty="0"/>
-                    </a:p>
-                  </a:txBody>
-                  <a:tcPr/>
-                </a:tc>
-                <a:tc>
-                  <a:txBody>
-                    <a:bodyPr/>
-                    <a:lstStyle/>
-                    <a:p>
-                      <a:r>
-                        <a:rPr lang="en-US" altLang="zh-TW" dirty="0" smtClean="0"/>
-                        <a:t>Header1</a:t>
-                      </a:r>
-                      <a:endParaRPr lang="zh-TW" altLang="en-US" dirty="0"/>
+                      <a:endParaRPr lang="zh-TW" altLang="en-US" u="sng" dirty="0"/>
                     </a:p>
                   </a:txBody>
                   <a:tcPr/>
@@ -4836,6 +5633,7 @@
                     <a:bodyPr/>
                     <a:lstStyle/>
                     <a:p>
+                      <a:pPr algn="r"/>
                       <a:r>
                         <a:rPr lang="en-US" altLang="zh-TW" dirty="0" smtClean="0"/>
                         <a:t>B</a:t>
@@ -4851,10 +5649,18 @@
                     <a:lstStyle/>
                     <a:p>
                       <a:r>
-                        <a:rPr lang="en-US" altLang="zh-TW" dirty="0" smtClean="0"/>
+                        <a:rPr lang="en-US" altLang="zh-TW" dirty="0" smtClean="0">
+                          <a:solidFill>
+                            <a:srgbClr val="FF0000"/>
+                          </a:solidFill>
+                        </a:rPr>
                         <a:t>CC</a:t>
                       </a:r>
-                      <a:endParaRPr lang="zh-TW" altLang="en-US" dirty="0"/>
+                      <a:endParaRPr lang="zh-TW" altLang="en-US" dirty="0">
+                        <a:solidFill>
+                          <a:srgbClr val="FF0000"/>
+                        </a:solidFill>
+                      </a:endParaRPr>
                     </a:p>
                   </a:txBody>
                   <a:tcPr/>
@@ -4894,6 +5700,7 @@
                     <a:bodyPr/>
                     <a:lstStyle/>
                     <a:p>
+                      <a:pPr algn="r"/>
                       <a:r>
                         <a:rPr lang="en-US" altLang="zh-TW" dirty="0" smtClean="0"/>
                         <a:t>BB</a:t>
@@ -4909,10 +5716,18 @@
                     <a:lstStyle/>
                     <a:p>
                       <a:r>
-                        <a:rPr lang="en-US" altLang="zh-TW" dirty="0" smtClean="0"/>
+                        <a:rPr lang="en-US" altLang="zh-TW" dirty="0" smtClean="0">
+                          <a:solidFill>
+                            <a:srgbClr val="FF0000"/>
+                          </a:solidFill>
+                        </a:rPr>
                         <a:t>CCC</a:t>
                       </a:r>
-                      <a:endParaRPr lang="zh-TW" altLang="en-US" dirty="0"/>
+                      <a:endParaRPr lang="zh-TW" altLang="en-US" dirty="0">
+                        <a:solidFill>
+                          <a:srgbClr val="FF0000"/>
+                        </a:solidFill>
+                      </a:endParaRPr>
                     </a:p>
                   </a:txBody>
                   <a:tcPr/>
@@ -4953,7 +5768,7 @@
           <a:p>
             <a:fld id="{5A0B17C9-1A35-4216-82FA-299D192A2D4E}" type="datetime1">
               <a:rPr lang="zh-TW" altLang="en-US" smtClean="0"/>
-              <a:t>2015/10/27</a:t>
+              <a:t>2015/11/12</a:t>
             </a:fld>
             <a:endParaRPr lang="zh-TW" altLang="en-US"/>
           </a:p>
@@ -5052,7 +5867,7 @@
           <a:p>
             <a:fld id="{C60B81E8-7334-464F-8B48-45CA70843E0C}" type="datetime1">
               <a:rPr lang="zh-TW" altLang="en-US" smtClean="0"/>
-              <a:t>2015/10/27</a:t>
+              <a:t>2015/11/12</a:t>
             </a:fld>
             <a:endParaRPr lang="zh-TW" altLang="en-US"/>
           </a:p>
@@ -5143,6 +5958,9 @@
           <a:prstGeom prst="ellipse">
             <a:avLst/>
           </a:prstGeom>
+          <a:ln>
+            <a:prstDash val="dash"/>
+          </a:ln>
         </p:spPr>
         <p:style>
           <a:lnRef idx="2">
@@ -5183,6 +6001,7 @@
           <a:prstGeom prst="roundRect">
             <a:avLst/>
           </a:prstGeom>
+          <a:ln w="76200"/>
         </p:spPr>
         <p:style>
           <a:lnRef idx="2">
@@ -5253,6 +6072,261 @@
     <p:extLst>
       <p:ext uri="{BB962C8B-B14F-4D97-AF65-F5344CB8AC3E}">
         <p14:creationId xmlns:p14="http://schemas.microsoft.com/office/powerpoint/2010/main" val="3076910671"/>
+      </p:ext>
+    </p:extLst>
+  </p:cSld>
+  <p:clrMapOvr>
+    <a:masterClrMapping/>
+  </p:clrMapOvr>
+</p:sld>
+</file>
+
+<file path=ppt/slides/slide8.xml><?xml version="1.0" encoding="utf-8"?>
+<p:sld xmlns:a="http://schemas.openxmlformats.org/drawingml/2006/main" xmlns:r="http://schemas.openxmlformats.org/officeDocument/2006/relationships" xmlns:p="http://schemas.openxmlformats.org/presentationml/2006/main">
+  <p:cSld>
+    <p:spTree>
+      <p:nvGrpSpPr>
+        <p:cNvPr id="1" name=""/>
+        <p:cNvGrpSpPr/>
+        <p:nvPr/>
+      </p:nvGrpSpPr>
+      <p:grpSpPr>
+        <a:xfrm>
+          <a:off x="0" y="0"/>
+          <a:ext cx="0" cy="0"/>
+          <a:chOff x="0" y="0"/>
+          <a:chExt cx="0" cy="0"/>
+        </a:xfrm>
+      </p:grpSpPr>
+      <p:sp>
+        <p:nvSpPr>
+          <p:cNvPr id="6" name="標題 5"/>
+          <p:cNvSpPr>
+            <a:spLocks noGrp="1"/>
+          </p:cNvSpPr>
+          <p:nvPr>
+            <p:ph type="title"/>
+          </p:nvPr>
+        </p:nvSpPr>
+        <p:spPr/>
+        <p:txBody>
+          <a:bodyPr/>
+          <a:lstStyle/>
+          <a:p>
+            <a:r>
+              <a:rPr lang="zh-TW" altLang="en-US" dirty="0" smtClean="0"/>
+              <a:t>版面</a:t>
+            </a:r>
+            <a:r>
+              <a:rPr lang="en-US" altLang="zh-TW" dirty="0"/>
+              <a:t>5</a:t>
+            </a:r>
+            <a:endParaRPr lang="zh-TW" altLang="en-US" dirty="0"/>
+          </a:p>
+        </p:txBody>
+      </p:sp>
+      <p:sp>
+        <p:nvSpPr>
+          <p:cNvPr id="7" name="文字版面配置區 6"/>
+          <p:cNvSpPr>
+            <a:spLocks noGrp="1"/>
+          </p:cNvSpPr>
+          <p:nvPr>
+            <p:ph type="body" idx="1"/>
+          </p:nvPr>
+        </p:nvSpPr>
+        <p:spPr/>
+        <p:txBody>
+          <a:bodyPr/>
+          <a:lstStyle/>
+          <a:p>
+            <a:r>
+              <a:rPr lang="en-US" altLang="zh-TW" dirty="0" smtClean="0"/>
+              <a:t>AAA</a:t>
+            </a:r>
+            <a:endParaRPr lang="zh-TW" altLang="en-US" dirty="0"/>
+          </a:p>
+        </p:txBody>
+      </p:sp>
+      <p:sp>
+        <p:nvSpPr>
+          <p:cNvPr id="8" name="內容版面配置區 7"/>
+          <p:cNvSpPr>
+            <a:spLocks noGrp="1"/>
+          </p:cNvSpPr>
+          <p:nvPr>
+            <p:ph sz="half" idx="2"/>
+          </p:nvPr>
+        </p:nvSpPr>
+        <p:spPr/>
+        <p:txBody>
+          <a:bodyPr/>
+          <a:lstStyle/>
+          <a:p>
+            <a:r>
+              <a:rPr lang="en-US" altLang="zh-TW" dirty="0" smtClean="0"/>
+              <a:t>QQQ</a:t>
+            </a:r>
+          </a:p>
+          <a:p>
+            <a:r>
+              <a:rPr lang="en-US" altLang="zh-TW" dirty="0" smtClean="0"/>
+              <a:t>BE</a:t>
+            </a:r>
+          </a:p>
+          <a:p>
+            <a:pPr lvl="1"/>
+            <a:r>
+              <a:rPr lang="en-US" altLang="zh-TW" dirty="0" smtClean="0"/>
+              <a:t>DQ</a:t>
+            </a:r>
+          </a:p>
+          <a:p>
+            <a:pPr lvl="1"/>
+            <a:r>
+              <a:rPr lang="en-US" altLang="zh-TW" dirty="0" err="1" smtClean="0"/>
+              <a:t>Fgg</a:t>
+            </a:r>
+            <a:endParaRPr lang="en-US" altLang="zh-TW" dirty="0" smtClean="0"/>
+          </a:p>
+          <a:p>
+            <a:pPr lvl="2"/>
+            <a:r>
+              <a:rPr lang="en-US" altLang="zh-TW" dirty="0" err="1" smtClean="0"/>
+              <a:t>Sfdhggfh</a:t>
+            </a:r>
+            <a:endParaRPr lang="en-US" altLang="zh-TW" dirty="0" smtClean="0"/>
+          </a:p>
+          <a:p>
+            <a:pPr lvl="2"/>
+            <a:r>
+              <a:rPr lang="en-US" altLang="zh-TW" dirty="0" err="1" smtClean="0"/>
+              <a:t>fdhdfh</a:t>
+            </a:r>
+            <a:endParaRPr lang="zh-TW" altLang="en-US" dirty="0"/>
+          </a:p>
+        </p:txBody>
+      </p:sp>
+      <p:sp>
+        <p:nvSpPr>
+          <p:cNvPr id="9" name="文字版面配置區 8"/>
+          <p:cNvSpPr>
+            <a:spLocks noGrp="1"/>
+          </p:cNvSpPr>
+          <p:nvPr>
+            <p:ph type="body" sz="quarter" idx="3"/>
+          </p:nvPr>
+        </p:nvSpPr>
+        <p:spPr/>
+        <p:txBody>
+          <a:bodyPr/>
+          <a:lstStyle/>
+          <a:p>
+            <a:r>
+              <a:rPr lang="en-US" altLang="zh-TW" dirty="0" smtClean="0"/>
+              <a:t>BBB</a:t>
+            </a:r>
+            <a:endParaRPr lang="zh-TW" altLang="en-US" dirty="0"/>
+          </a:p>
+        </p:txBody>
+      </p:sp>
+      <p:sp>
+        <p:nvSpPr>
+          <p:cNvPr id="10" name="內容版面配置區 9"/>
+          <p:cNvSpPr>
+            <a:spLocks noGrp="1"/>
+          </p:cNvSpPr>
+          <p:nvPr>
+            <p:ph sz="quarter" idx="4"/>
+          </p:nvPr>
+        </p:nvSpPr>
+        <p:spPr/>
+        <p:txBody>
+          <a:bodyPr/>
+          <a:lstStyle/>
+          <a:p>
+            <a:pPr>
+              <a:buFont typeface="Wingdings" panose="05000000000000000000" pitchFamily="2" charset="2"/>
+              <a:buChar char="Ø"/>
+            </a:pPr>
+            <a:r>
+              <a:rPr lang="en-US" altLang="zh-TW" dirty="0" smtClean="0"/>
+              <a:t>65465</a:t>
+            </a:r>
+          </a:p>
+          <a:p>
+            <a:pPr>
+              <a:buFont typeface="Wingdings" panose="05000000000000000000" pitchFamily="2" charset="2"/>
+              <a:buChar char="Ø"/>
+            </a:pPr>
+            <a:r>
+              <a:rPr lang="en-US" altLang="zh-TW" dirty="0" smtClean="0"/>
+              <a:t>65464</a:t>
+            </a:r>
+          </a:p>
+          <a:p>
+            <a:pPr>
+              <a:buFont typeface="Wingdings" panose="05000000000000000000" pitchFamily="2" charset="2"/>
+              <a:buChar char="Ø"/>
+            </a:pPr>
+            <a:r>
+              <a:rPr lang="en-US" altLang="zh-TW" dirty="0" smtClean="0"/>
+              <a:t>6546</a:t>
+            </a:r>
+            <a:endParaRPr lang="zh-TW" altLang="en-US" dirty="0"/>
+          </a:p>
+        </p:txBody>
+      </p:sp>
+      <p:sp>
+        <p:nvSpPr>
+          <p:cNvPr id="4" name="日期版面配置區 3"/>
+          <p:cNvSpPr>
+            <a:spLocks noGrp="1"/>
+          </p:cNvSpPr>
+          <p:nvPr>
+            <p:ph type="dt" sz="half" idx="10"/>
+          </p:nvPr>
+        </p:nvSpPr>
+        <p:spPr/>
+        <p:txBody>
+          <a:bodyPr/>
+          <a:lstStyle/>
+          <a:p>
+            <a:fld id="{C60B81E8-7334-464F-8B48-45CA70843E0C}" type="datetime1">
+              <a:rPr lang="zh-TW" altLang="en-US" smtClean="0"/>
+              <a:t>2015/11/12</a:t>
+            </a:fld>
+            <a:endParaRPr lang="zh-TW" altLang="en-US"/>
+          </a:p>
+        </p:txBody>
+      </p:sp>
+      <p:sp>
+        <p:nvSpPr>
+          <p:cNvPr id="5" name="投影片編號版面配置區 4"/>
+          <p:cNvSpPr>
+            <a:spLocks noGrp="1"/>
+          </p:cNvSpPr>
+          <p:nvPr>
+            <p:ph type="sldNum" sz="quarter" idx="12"/>
+          </p:nvPr>
+        </p:nvSpPr>
+        <p:spPr/>
+        <p:txBody>
+          <a:bodyPr/>
+          <a:lstStyle/>
+          <a:p>
+            <a:fld id="{6923F3CB-4711-4FC8-9867-5888834CD7FE}" type="slidenum">
+              <a:rPr lang="zh-TW" altLang="en-US" smtClean="0"/>
+              <a:t>8</a:t>
+            </a:fld>
+            <a:endParaRPr lang="zh-TW" altLang="en-US"/>
+          </a:p>
+        </p:txBody>
+      </p:sp>
+    </p:spTree>
+    <p:extLst>
+      <p:ext uri="{BB962C8B-B14F-4D97-AF65-F5344CB8AC3E}">
+        <p14:creationId xmlns:p14="http://schemas.microsoft.com/office/powerpoint/2010/main" val="2611549055"/>
       </p:ext>
     </p:extLst>
   </p:cSld>

</xml_diff>

<commit_message>
Support line and straightConnector1
</commit_message>
<xml_diff>
--- a/files/test.pptx
+++ b/files/test.pptx
@@ -6085,6 +6085,10 @@
           <a:prstGeom prst="line">
             <a:avLst/>
           </a:prstGeom>
+          <a:ln w="57150">
+            <a:headEnd type="none" w="med" len="med"/>
+            <a:tailEnd type="triangle" w="med" len="med"/>
+          </a:ln>
         </p:spPr>
         <p:style>
           <a:lnRef idx="1">
@@ -6152,6 +6156,7 @@
             <a:avLst/>
           </a:prstGeom>
           <a:ln w="76200">
+            <a:headEnd type="triangle"/>
             <a:tailEnd type="triangle"/>
           </a:ln>
         </p:spPr>

</xml_diff>

<commit_message>
Support baseline of text
</commit_message>
<xml_diff>
--- a/files/test.pptx
+++ b/files/test.pptx
@@ -5,7 +5,7 @@
     <p:sldMasterId id="2147483660" r:id="rId1"/>
   </p:sldMasterIdLst>
   <p:notesMasterIdLst>
-    <p:notesMasterId r:id="rId10"/>
+    <p:notesMasterId r:id="rId11"/>
   </p:notesMasterIdLst>
   <p:sldIdLst>
     <p:sldId id="256" r:id="rId2"/>
@@ -16,6 +16,7 @@
     <p:sldId id="261" r:id="rId7"/>
     <p:sldId id="262" r:id="rId8"/>
     <p:sldId id="263" r:id="rId9"/>
+    <p:sldId id="264" r:id="rId10"/>
   </p:sldIdLst>
   <p:sldSz cx="9144000" cy="6858000" type="screen4x3"/>
   <p:notesSz cx="6858000" cy="9144000"/>
@@ -120,6 +121,1030 @@
     </p:ext>
   </p:extLst>
 </p:presentation>
+</file>
+
+<file path=ppt/charts/chart1.xml><?xml version="1.0" encoding="utf-8"?>
+<c:chartSpace xmlns:c="http://schemas.openxmlformats.org/drawingml/2006/chart" xmlns:a="http://schemas.openxmlformats.org/drawingml/2006/main" xmlns:r="http://schemas.openxmlformats.org/officeDocument/2006/relationships">
+  <c:date1904 val="0"/>
+  <c:lang val="zh-TW"/>
+  <c:roundedCorners val="0"/>
+  <mc:AlternateContent xmlns:mc="http://schemas.openxmlformats.org/markup-compatibility/2006">
+    <mc:Choice xmlns:c14="http://schemas.microsoft.com/office/drawing/2007/8/2/chart" Requires="c14">
+      <c14:style val="102"/>
+    </mc:Choice>
+    <mc:Fallback>
+      <c:style val="2"/>
+    </mc:Fallback>
+  </mc:AlternateContent>
+  <c:chart>
+    <c:title>
+      <c:layout/>
+      <c:overlay val="0"/>
+      <c:spPr>
+        <a:noFill/>
+        <a:ln>
+          <a:noFill/>
+        </a:ln>
+        <a:effectLst/>
+      </c:spPr>
+      <c:txPr>
+        <a:bodyPr rot="0" spcFirstLastPara="1" vertOverflow="ellipsis" vert="horz" wrap="square" anchor="ctr" anchorCtr="1"/>
+        <a:lstStyle/>
+        <a:p>
+          <a:pPr>
+            <a:defRPr sz="1862" b="0" i="0" u="none" strike="noStrike" kern="1200" spc="0" baseline="0">
+              <a:solidFill>
+                <a:schemeClr val="tx1">
+                  <a:lumMod val="65000"/>
+                  <a:lumOff val="35000"/>
+                </a:schemeClr>
+              </a:solidFill>
+              <a:latin typeface="+mn-lt"/>
+              <a:ea typeface="+mn-ea"/>
+              <a:cs typeface="+mn-cs"/>
+            </a:defRPr>
+          </a:pPr>
+          <a:endParaRPr lang="zh-TW"/>
+        </a:p>
+      </c:txPr>
+    </c:title>
+    <c:autoTitleDeleted val="0"/>
+    <c:plotArea>
+      <c:layout/>
+      <c:lineChart>
+        <c:grouping val="standard"/>
+        <c:varyColors val="0"/>
+        <c:ser>
+          <c:idx val="0"/>
+          <c:order val="0"/>
+          <c:tx>
+            <c:strRef>
+              <c:f>工作表1!$B$1</c:f>
+              <c:strCache>
+                <c:ptCount val="1"/>
+                <c:pt idx="0">
+                  <c:v>數列 1</c:v>
+                </c:pt>
+              </c:strCache>
+            </c:strRef>
+          </c:tx>
+          <c:spPr>
+            <a:ln w="28575" cap="rnd">
+              <a:solidFill>
+                <a:schemeClr val="accent1"/>
+              </a:solidFill>
+              <a:round/>
+            </a:ln>
+            <a:effectLst/>
+          </c:spPr>
+          <c:marker>
+            <c:symbol val="circle"/>
+            <c:size val="5"/>
+            <c:spPr>
+              <a:solidFill>
+                <a:schemeClr val="accent1"/>
+              </a:solidFill>
+              <a:ln w="9525">
+                <a:solidFill>
+                  <a:schemeClr val="accent1"/>
+                </a:solidFill>
+              </a:ln>
+              <a:effectLst/>
+            </c:spPr>
+          </c:marker>
+          <c:cat>
+            <c:strRef>
+              <c:f>工作表1!$A$2:$A$5</c:f>
+              <c:strCache>
+                <c:ptCount val="4"/>
+                <c:pt idx="0">
+                  <c:v>類別 1</c:v>
+                </c:pt>
+                <c:pt idx="1">
+                  <c:v>類別 2</c:v>
+                </c:pt>
+                <c:pt idx="2">
+                  <c:v>類別 3</c:v>
+                </c:pt>
+                <c:pt idx="3">
+                  <c:v>類別 4</c:v>
+                </c:pt>
+              </c:strCache>
+            </c:strRef>
+          </c:cat>
+          <c:val>
+            <c:numRef>
+              <c:f>工作表1!$B$2:$B$5</c:f>
+              <c:numCache>
+                <c:formatCode>General</c:formatCode>
+                <c:ptCount val="4"/>
+                <c:pt idx="0">
+                  <c:v>4.3</c:v>
+                </c:pt>
+                <c:pt idx="1">
+                  <c:v>2.5</c:v>
+                </c:pt>
+                <c:pt idx="2">
+                  <c:v>3.5</c:v>
+                </c:pt>
+                <c:pt idx="3">
+                  <c:v>4.5</c:v>
+                </c:pt>
+              </c:numCache>
+            </c:numRef>
+          </c:val>
+          <c:smooth val="0"/>
+        </c:ser>
+        <c:ser>
+          <c:idx val="1"/>
+          <c:order val="1"/>
+          <c:tx>
+            <c:strRef>
+              <c:f>工作表1!$C$1</c:f>
+              <c:strCache>
+                <c:ptCount val="1"/>
+                <c:pt idx="0">
+                  <c:v>數列 2</c:v>
+                </c:pt>
+              </c:strCache>
+            </c:strRef>
+          </c:tx>
+          <c:spPr>
+            <a:ln w="28575" cap="rnd">
+              <a:solidFill>
+                <a:schemeClr val="accent2"/>
+              </a:solidFill>
+              <a:round/>
+            </a:ln>
+            <a:effectLst/>
+          </c:spPr>
+          <c:marker>
+            <c:symbol val="circle"/>
+            <c:size val="5"/>
+            <c:spPr>
+              <a:solidFill>
+                <a:schemeClr val="accent2"/>
+              </a:solidFill>
+              <a:ln w="9525">
+                <a:solidFill>
+                  <a:schemeClr val="accent2"/>
+                </a:solidFill>
+              </a:ln>
+              <a:effectLst/>
+            </c:spPr>
+          </c:marker>
+          <c:cat>
+            <c:strRef>
+              <c:f>工作表1!$A$2:$A$5</c:f>
+              <c:strCache>
+                <c:ptCount val="4"/>
+                <c:pt idx="0">
+                  <c:v>類別 1</c:v>
+                </c:pt>
+                <c:pt idx="1">
+                  <c:v>類別 2</c:v>
+                </c:pt>
+                <c:pt idx="2">
+                  <c:v>類別 3</c:v>
+                </c:pt>
+                <c:pt idx="3">
+                  <c:v>類別 4</c:v>
+                </c:pt>
+              </c:strCache>
+            </c:strRef>
+          </c:cat>
+          <c:val>
+            <c:numRef>
+              <c:f>工作表1!$C$2:$C$5</c:f>
+              <c:numCache>
+                <c:formatCode>General</c:formatCode>
+                <c:ptCount val="4"/>
+                <c:pt idx="0">
+                  <c:v>2.4</c:v>
+                </c:pt>
+                <c:pt idx="1">
+                  <c:v>4.4000000000000004</c:v>
+                </c:pt>
+                <c:pt idx="2">
+                  <c:v>1.8</c:v>
+                </c:pt>
+                <c:pt idx="3">
+                  <c:v>2.8</c:v>
+                </c:pt>
+              </c:numCache>
+            </c:numRef>
+          </c:val>
+          <c:smooth val="0"/>
+        </c:ser>
+        <c:ser>
+          <c:idx val="2"/>
+          <c:order val="2"/>
+          <c:tx>
+            <c:strRef>
+              <c:f>工作表1!$D$1</c:f>
+              <c:strCache>
+                <c:ptCount val="1"/>
+                <c:pt idx="0">
+                  <c:v>數列 3</c:v>
+                </c:pt>
+              </c:strCache>
+            </c:strRef>
+          </c:tx>
+          <c:spPr>
+            <a:ln w="28575" cap="rnd">
+              <a:solidFill>
+                <a:schemeClr val="accent3"/>
+              </a:solidFill>
+              <a:round/>
+            </a:ln>
+            <a:effectLst/>
+          </c:spPr>
+          <c:marker>
+            <c:symbol val="circle"/>
+            <c:size val="5"/>
+            <c:spPr>
+              <a:solidFill>
+                <a:schemeClr val="accent3"/>
+              </a:solidFill>
+              <a:ln w="9525">
+                <a:solidFill>
+                  <a:schemeClr val="accent3"/>
+                </a:solidFill>
+              </a:ln>
+              <a:effectLst/>
+            </c:spPr>
+          </c:marker>
+          <c:cat>
+            <c:strRef>
+              <c:f>工作表1!$A$2:$A$5</c:f>
+              <c:strCache>
+                <c:ptCount val="4"/>
+                <c:pt idx="0">
+                  <c:v>類別 1</c:v>
+                </c:pt>
+                <c:pt idx="1">
+                  <c:v>類別 2</c:v>
+                </c:pt>
+                <c:pt idx="2">
+                  <c:v>類別 3</c:v>
+                </c:pt>
+                <c:pt idx="3">
+                  <c:v>類別 4</c:v>
+                </c:pt>
+              </c:strCache>
+            </c:strRef>
+          </c:cat>
+          <c:val>
+            <c:numRef>
+              <c:f>工作表1!$D$2:$D$5</c:f>
+              <c:numCache>
+                <c:formatCode>General</c:formatCode>
+                <c:ptCount val="4"/>
+                <c:pt idx="0">
+                  <c:v>2</c:v>
+                </c:pt>
+                <c:pt idx="1">
+                  <c:v>2</c:v>
+                </c:pt>
+                <c:pt idx="2">
+                  <c:v>3</c:v>
+                </c:pt>
+                <c:pt idx="3">
+                  <c:v>5</c:v>
+                </c:pt>
+              </c:numCache>
+            </c:numRef>
+          </c:val>
+          <c:smooth val="0"/>
+        </c:ser>
+        <c:dLbls>
+          <c:showLegendKey val="0"/>
+          <c:showVal val="0"/>
+          <c:showCatName val="0"/>
+          <c:showSerName val="0"/>
+          <c:showPercent val="0"/>
+          <c:showBubbleSize val="0"/>
+        </c:dLbls>
+        <c:marker val="1"/>
+        <c:smooth val="0"/>
+        <c:axId val="1403571808"/>
+        <c:axId val="1403576160"/>
+      </c:lineChart>
+      <c:catAx>
+        <c:axId val="1403571808"/>
+        <c:scaling>
+          <c:orientation val="minMax"/>
+        </c:scaling>
+        <c:delete val="0"/>
+        <c:axPos val="b"/>
+        <c:numFmt formatCode="General" sourceLinked="1"/>
+        <c:majorTickMark val="none"/>
+        <c:minorTickMark val="none"/>
+        <c:tickLblPos val="nextTo"/>
+        <c:spPr>
+          <a:noFill/>
+          <a:ln w="9525" cap="flat" cmpd="sng" algn="ctr">
+            <a:solidFill>
+              <a:schemeClr val="tx1">
+                <a:lumMod val="15000"/>
+                <a:lumOff val="85000"/>
+              </a:schemeClr>
+            </a:solidFill>
+            <a:round/>
+          </a:ln>
+          <a:effectLst/>
+        </c:spPr>
+        <c:txPr>
+          <a:bodyPr rot="-60000000" spcFirstLastPara="1" vertOverflow="ellipsis" vert="horz" wrap="square" anchor="ctr" anchorCtr="1"/>
+          <a:lstStyle/>
+          <a:p>
+            <a:pPr>
+              <a:defRPr sz="1197" b="0" i="0" u="none" strike="noStrike" kern="1200" baseline="0">
+                <a:solidFill>
+                  <a:schemeClr val="tx1">
+                    <a:lumMod val="65000"/>
+                    <a:lumOff val="35000"/>
+                  </a:schemeClr>
+                </a:solidFill>
+                <a:latin typeface="+mn-lt"/>
+                <a:ea typeface="+mn-ea"/>
+                <a:cs typeface="+mn-cs"/>
+              </a:defRPr>
+            </a:pPr>
+            <a:endParaRPr lang="zh-TW"/>
+          </a:p>
+        </c:txPr>
+        <c:crossAx val="1403576160"/>
+        <c:crosses val="autoZero"/>
+        <c:auto val="1"/>
+        <c:lblAlgn val="ctr"/>
+        <c:lblOffset val="100"/>
+        <c:noMultiLvlLbl val="0"/>
+      </c:catAx>
+      <c:valAx>
+        <c:axId val="1403576160"/>
+        <c:scaling>
+          <c:orientation val="minMax"/>
+        </c:scaling>
+        <c:delete val="0"/>
+        <c:axPos val="l"/>
+        <c:majorGridlines>
+          <c:spPr>
+            <a:ln w="9525" cap="flat" cmpd="sng" algn="ctr">
+              <a:solidFill>
+                <a:schemeClr val="tx1">
+                  <a:lumMod val="15000"/>
+                  <a:lumOff val="85000"/>
+                </a:schemeClr>
+              </a:solidFill>
+              <a:round/>
+            </a:ln>
+            <a:effectLst/>
+          </c:spPr>
+        </c:majorGridlines>
+        <c:numFmt formatCode="General" sourceLinked="1"/>
+        <c:majorTickMark val="none"/>
+        <c:minorTickMark val="none"/>
+        <c:tickLblPos val="nextTo"/>
+        <c:spPr>
+          <a:noFill/>
+          <a:ln>
+            <a:noFill/>
+          </a:ln>
+          <a:effectLst/>
+        </c:spPr>
+        <c:txPr>
+          <a:bodyPr rot="-60000000" spcFirstLastPara="1" vertOverflow="ellipsis" vert="horz" wrap="square" anchor="ctr" anchorCtr="1"/>
+          <a:lstStyle/>
+          <a:p>
+            <a:pPr>
+              <a:defRPr sz="1197" b="0" i="0" u="none" strike="noStrike" kern="1200" baseline="0">
+                <a:solidFill>
+                  <a:schemeClr val="tx1">
+                    <a:lumMod val="65000"/>
+                    <a:lumOff val="35000"/>
+                  </a:schemeClr>
+                </a:solidFill>
+                <a:latin typeface="+mn-lt"/>
+                <a:ea typeface="+mn-ea"/>
+                <a:cs typeface="+mn-cs"/>
+              </a:defRPr>
+            </a:pPr>
+            <a:endParaRPr lang="zh-TW"/>
+          </a:p>
+        </c:txPr>
+        <c:crossAx val="1403571808"/>
+        <c:crosses val="autoZero"/>
+        <c:crossBetween val="between"/>
+      </c:valAx>
+      <c:spPr>
+        <a:noFill/>
+        <a:ln>
+          <a:noFill/>
+        </a:ln>
+        <a:effectLst/>
+      </c:spPr>
+    </c:plotArea>
+    <c:legend>
+      <c:legendPos val="b"/>
+      <c:layout/>
+      <c:overlay val="0"/>
+      <c:spPr>
+        <a:noFill/>
+        <a:ln>
+          <a:noFill/>
+        </a:ln>
+        <a:effectLst/>
+      </c:spPr>
+      <c:txPr>
+        <a:bodyPr rot="0" spcFirstLastPara="1" vertOverflow="ellipsis" vert="horz" wrap="square" anchor="ctr" anchorCtr="1"/>
+        <a:lstStyle/>
+        <a:p>
+          <a:pPr>
+            <a:defRPr sz="1197" b="0" i="0" u="none" strike="noStrike" kern="1200" baseline="0">
+              <a:solidFill>
+                <a:schemeClr val="tx1">
+                  <a:lumMod val="65000"/>
+                  <a:lumOff val="35000"/>
+                </a:schemeClr>
+              </a:solidFill>
+              <a:latin typeface="+mn-lt"/>
+              <a:ea typeface="+mn-ea"/>
+              <a:cs typeface="+mn-cs"/>
+            </a:defRPr>
+          </a:pPr>
+          <a:endParaRPr lang="zh-TW"/>
+        </a:p>
+      </c:txPr>
+    </c:legend>
+    <c:plotVisOnly val="1"/>
+    <c:dispBlanksAs val="gap"/>
+    <c:showDLblsOverMax val="0"/>
+  </c:chart>
+  <c:spPr>
+    <a:noFill/>
+    <a:ln>
+      <a:noFill/>
+    </a:ln>
+    <a:effectLst/>
+  </c:spPr>
+  <c:txPr>
+    <a:bodyPr/>
+    <a:lstStyle/>
+    <a:p>
+      <a:pPr>
+        <a:defRPr/>
+      </a:pPr>
+      <a:endParaRPr lang="zh-TW"/>
+    </a:p>
+  </c:txPr>
+  <c:externalData r:id="rId3">
+    <c:autoUpdate val="0"/>
+  </c:externalData>
+</c:chartSpace>
+</file>
+
+<file path=ppt/charts/colors1.xml><?xml version="1.0" encoding="utf-8"?>
+<cs:colorStyle xmlns:cs="http://schemas.microsoft.com/office/drawing/2012/chartStyle" xmlns:a="http://schemas.openxmlformats.org/drawingml/2006/main" meth="cycle" id="10">
+  <a:schemeClr val="accent1"/>
+  <a:schemeClr val="accent2"/>
+  <a:schemeClr val="accent3"/>
+  <a:schemeClr val="accent4"/>
+  <a:schemeClr val="accent5"/>
+  <a:schemeClr val="accent6"/>
+  <cs:variation/>
+  <cs:variation>
+    <a:lumMod val="60000"/>
+  </cs:variation>
+  <cs:variation>
+    <a:lumMod val="80000"/>
+    <a:lumOff val="20000"/>
+  </cs:variation>
+  <cs:variation>
+    <a:lumMod val="80000"/>
+  </cs:variation>
+  <cs:variation>
+    <a:lumMod val="60000"/>
+    <a:lumOff val="40000"/>
+  </cs:variation>
+  <cs:variation>
+    <a:lumMod val="50000"/>
+  </cs:variation>
+  <cs:variation>
+    <a:lumMod val="70000"/>
+    <a:lumOff val="30000"/>
+  </cs:variation>
+  <cs:variation>
+    <a:lumMod val="70000"/>
+  </cs:variation>
+  <cs:variation>
+    <a:lumMod val="50000"/>
+    <a:lumOff val="50000"/>
+  </cs:variation>
+</cs:colorStyle>
+</file>
+
+<file path=ppt/charts/style1.xml><?xml version="1.0" encoding="utf-8"?>
+<cs:chartStyle xmlns:cs="http://schemas.microsoft.com/office/drawing/2012/chartStyle" xmlns:a="http://schemas.openxmlformats.org/drawingml/2006/main" id="332">
+  <cs:axisTitle>
+    <cs:lnRef idx="0"/>
+    <cs:fillRef idx="0"/>
+    <cs:effectRef idx="0"/>
+    <cs:fontRef idx="minor">
+      <a:schemeClr val="tx1">
+        <a:lumMod val="65000"/>
+        <a:lumOff val="35000"/>
+      </a:schemeClr>
+    </cs:fontRef>
+    <cs:defRPr sz="1330" kern="1200"/>
+  </cs:axisTitle>
+  <cs:categoryAxis>
+    <cs:lnRef idx="0"/>
+    <cs:fillRef idx="0"/>
+    <cs:effectRef idx="0"/>
+    <cs:fontRef idx="minor">
+      <a:schemeClr val="tx1">
+        <a:lumMod val="65000"/>
+        <a:lumOff val="35000"/>
+      </a:schemeClr>
+    </cs:fontRef>
+    <cs:spPr>
+      <a:ln w="9525" cap="flat" cmpd="sng" algn="ctr">
+        <a:solidFill>
+          <a:schemeClr val="tx1">
+            <a:lumMod val="15000"/>
+            <a:lumOff val="85000"/>
+          </a:schemeClr>
+        </a:solidFill>
+        <a:round/>
+      </a:ln>
+    </cs:spPr>
+    <cs:defRPr sz="1197" kern="1200"/>
+  </cs:categoryAxis>
+  <cs:chartArea mods="allowNoFillOverride allowNoLineOverride">
+    <cs:lnRef idx="0"/>
+    <cs:fillRef idx="0"/>
+    <cs:effectRef idx="0"/>
+    <cs:fontRef idx="minor">
+      <a:schemeClr val="tx1"/>
+    </cs:fontRef>
+    <cs:spPr>
+      <a:solidFill>
+        <a:schemeClr val="bg1"/>
+      </a:solidFill>
+      <a:ln w="9525" cap="flat" cmpd="sng" algn="ctr">
+        <a:solidFill>
+          <a:schemeClr val="tx1">
+            <a:lumMod val="15000"/>
+            <a:lumOff val="85000"/>
+          </a:schemeClr>
+        </a:solidFill>
+        <a:round/>
+      </a:ln>
+    </cs:spPr>
+    <cs:defRPr sz="1330" kern="1200"/>
+  </cs:chartArea>
+  <cs:dataLabel>
+    <cs:lnRef idx="0"/>
+    <cs:fillRef idx="0"/>
+    <cs:effectRef idx="0"/>
+    <cs:fontRef idx="minor">
+      <a:schemeClr val="tx1">
+        <a:lumMod val="75000"/>
+        <a:lumOff val="25000"/>
+      </a:schemeClr>
+    </cs:fontRef>
+    <cs:defRPr sz="1197" kern="1200"/>
+  </cs:dataLabel>
+  <cs:dataLabelCallout>
+    <cs:lnRef idx="0"/>
+    <cs:fillRef idx="0"/>
+    <cs:effectRef idx="0"/>
+    <cs:fontRef idx="minor">
+      <a:schemeClr val="dk1">
+        <a:lumMod val="65000"/>
+        <a:lumOff val="35000"/>
+      </a:schemeClr>
+    </cs:fontRef>
+    <cs:spPr>
+      <a:solidFill>
+        <a:schemeClr val="lt1"/>
+      </a:solidFill>
+      <a:ln>
+        <a:solidFill>
+          <a:schemeClr val="dk1">
+            <a:lumMod val="25000"/>
+            <a:lumOff val="75000"/>
+          </a:schemeClr>
+        </a:solidFill>
+      </a:ln>
+    </cs:spPr>
+    <cs:defRPr sz="1197" kern="1200"/>
+    <cs:bodyPr rot="0" spcFirstLastPara="1" vertOverflow="clip" horzOverflow="clip" vert="horz" wrap="square" lIns="36576" tIns="18288" rIns="36576" bIns="18288" anchor="ctr" anchorCtr="1">
+      <a:spAutoFit/>
+    </cs:bodyPr>
+  </cs:dataLabelCallout>
+  <cs:dataPoint>
+    <cs:lnRef idx="0"/>
+    <cs:fillRef idx="1">
+      <cs:styleClr val="auto"/>
+    </cs:fillRef>
+    <cs:effectRef idx="0"/>
+    <cs:fontRef idx="minor">
+      <a:schemeClr val="tx1"/>
+    </cs:fontRef>
+  </cs:dataPoint>
+  <cs:dataPoint3D>
+    <cs:lnRef idx="0"/>
+    <cs:fillRef idx="1">
+      <cs:styleClr val="auto"/>
+    </cs:fillRef>
+    <cs:effectRef idx="0"/>
+    <cs:fontRef idx="minor">
+      <a:schemeClr val="tx1"/>
+    </cs:fontRef>
+  </cs:dataPoint3D>
+  <cs:dataPointLine>
+    <cs:lnRef idx="0">
+      <cs:styleClr val="auto"/>
+    </cs:lnRef>
+    <cs:fillRef idx="1"/>
+    <cs:effectRef idx="0"/>
+    <cs:fontRef idx="minor">
+      <a:schemeClr val="tx1"/>
+    </cs:fontRef>
+    <cs:spPr>
+      <a:ln w="28575" cap="rnd">
+        <a:solidFill>
+          <a:schemeClr val="phClr"/>
+        </a:solidFill>
+        <a:round/>
+      </a:ln>
+    </cs:spPr>
+  </cs:dataPointLine>
+  <cs:dataPointMarker>
+    <cs:lnRef idx="0">
+      <cs:styleClr val="auto"/>
+    </cs:lnRef>
+    <cs:fillRef idx="1">
+      <cs:styleClr val="auto"/>
+    </cs:fillRef>
+    <cs:effectRef idx="0"/>
+    <cs:fontRef idx="minor">
+      <a:schemeClr val="tx1"/>
+    </cs:fontRef>
+    <cs:spPr>
+      <a:ln w="9525">
+        <a:solidFill>
+          <a:schemeClr val="phClr"/>
+        </a:solidFill>
+      </a:ln>
+    </cs:spPr>
+  </cs:dataPointMarker>
+  <cs:dataPointMarkerLayout symbol="circle" size="5"/>
+  <cs:dataPointWireframe>
+    <cs:lnRef idx="0">
+      <cs:styleClr val="auto"/>
+    </cs:lnRef>
+    <cs:fillRef idx="1"/>
+    <cs:effectRef idx="0"/>
+    <cs:fontRef idx="minor">
+      <a:schemeClr val="tx1"/>
+    </cs:fontRef>
+    <cs:spPr>
+      <a:ln w="9525" cap="rnd">
+        <a:solidFill>
+          <a:schemeClr val="phClr"/>
+        </a:solidFill>
+        <a:round/>
+      </a:ln>
+    </cs:spPr>
+  </cs:dataPointWireframe>
+  <cs:dataTable>
+    <cs:lnRef idx="0"/>
+    <cs:fillRef idx="0"/>
+    <cs:effectRef idx="0"/>
+    <cs:fontRef idx="minor">
+      <a:schemeClr val="tx1">
+        <a:lumMod val="65000"/>
+        <a:lumOff val="35000"/>
+      </a:schemeClr>
+    </cs:fontRef>
+    <cs:spPr>
+      <a:noFill/>
+      <a:ln w="9525" cap="flat" cmpd="sng" algn="ctr">
+        <a:solidFill>
+          <a:schemeClr val="tx1">
+            <a:lumMod val="15000"/>
+            <a:lumOff val="85000"/>
+          </a:schemeClr>
+        </a:solidFill>
+        <a:round/>
+      </a:ln>
+    </cs:spPr>
+    <cs:defRPr sz="1197" kern="1200"/>
+  </cs:dataTable>
+  <cs:downBar>
+    <cs:lnRef idx="0"/>
+    <cs:fillRef idx="0"/>
+    <cs:effectRef idx="0"/>
+    <cs:fontRef idx="minor">
+      <a:schemeClr val="dk1"/>
+    </cs:fontRef>
+    <cs:spPr>
+      <a:solidFill>
+        <a:schemeClr val="dk1">
+          <a:lumMod val="65000"/>
+          <a:lumOff val="35000"/>
+        </a:schemeClr>
+      </a:solidFill>
+      <a:ln w="9525">
+        <a:solidFill>
+          <a:schemeClr val="tx1">
+            <a:lumMod val="65000"/>
+            <a:lumOff val="35000"/>
+          </a:schemeClr>
+        </a:solidFill>
+      </a:ln>
+    </cs:spPr>
+  </cs:downBar>
+  <cs:dropLine>
+    <cs:lnRef idx="0"/>
+    <cs:fillRef idx="0"/>
+    <cs:effectRef idx="0"/>
+    <cs:fontRef idx="minor">
+      <a:schemeClr val="tx1"/>
+    </cs:fontRef>
+    <cs:spPr>
+      <a:ln w="9525" cap="flat" cmpd="sng" algn="ctr">
+        <a:solidFill>
+          <a:schemeClr val="tx1">
+            <a:lumMod val="35000"/>
+            <a:lumOff val="65000"/>
+          </a:schemeClr>
+        </a:solidFill>
+        <a:round/>
+      </a:ln>
+    </cs:spPr>
+  </cs:dropLine>
+  <cs:errorBar>
+    <cs:lnRef idx="0"/>
+    <cs:fillRef idx="0"/>
+    <cs:effectRef idx="0"/>
+    <cs:fontRef idx="minor">
+      <a:schemeClr val="tx1"/>
+    </cs:fontRef>
+    <cs:spPr>
+      <a:ln w="9525" cap="flat" cmpd="sng" algn="ctr">
+        <a:solidFill>
+          <a:schemeClr val="tx1">
+            <a:lumMod val="65000"/>
+            <a:lumOff val="35000"/>
+          </a:schemeClr>
+        </a:solidFill>
+        <a:round/>
+      </a:ln>
+    </cs:spPr>
+  </cs:errorBar>
+  <cs:floor>
+    <cs:lnRef idx="0"/>
+    <cs:fillRef idx="0"/>
+    <cs:effectRef idx="0"/>
+    <cs:fontRef idx="minor">
+      <a:schemeClr val="tx1"/>
+    </cs:fontRef>
+    <cs:spPr>
+      <a:noFill/>
+      <a:ln>
+        <a:noFill/>
+      </a:ln>
+    </cs:spPr>
+  </cs:floor>
+  <cs:gridlineMajor>
+    <cs:lnRef idx="0"/>
+    <cs:fillRef idx="0"/>
+    <cs:effectRef idx="0"/>
+    <cs:fontRef idx="minor">
+      <a:schemeClr val="tx1"/>
+    </cs:fontRef>
+    <cs:spPr>
+      <a:ln w="9525" cap="flat" cmpd="sng" algn="ctr">
+        <a:solidFill>
+          <a:schemeClr val="tx1">
+            <a:lumMod val="15000"/>
+            <a:lumOff val="85000"/>
+          </a:schemeClr>
+        </a:solidFill>
+        <a:round/>
+      </a:ln>
+    </cs:spPr>
+  </cs:gridlineMajor>
+  <cs:gridlineMinor>
+    <cs:lnRef idx="0"/>
+    <cs:fillRef idx="0"/>
+    <cs:effectRef idx="0"/>
+    <cs:fontRef idx="minor">
+      <a:schemeClr val="tx1"/>
+    </cs:fontRef>
+    <cs:spPr>
+      <a:ln w="9525" cap="flat" cmpd="sng" algn="ctr">
+        <a:solidFill>
+          <a:schemeClr val="tx1">
+            <a:lumMod val="5000"/>
+            <a:lumOff val="95000"/>
+          </a:schemeClr>
+        </a:solidFill>
+        <a:round/>
+      </a:ln>
+    </cs:spPr>
+  </cs:gridlineMinor>
+  <cs:hiLoLine>
+    <cs:lnRef idx="0"/>
+    <cs:fillRef idx="0"/>
+    <cs:effectRef idx="0"/>
+    <cs:fontRef idx="minor">
+      <a:schemeClr val="tx1"/>
+    </cs:fontRef>
+    <cs:spPr>
+      <a:ln w="9525" cap="flat" cmpd="sng" algn="ctr">
+        <a:solidFill>
+          <a:schemeClr val="tx1">
+            <a:lumMod val="75000"/>
+            <a:lumOff val="25000"/>
+          </a:schemeClr>
+        </a:solidFill>
+        <a:round/>
+      </a:ln>
+    </cs:spPr>
+  </cs:hiLoLine>
+  <cs:leaderLine>
+    <cs:lnRef idx="0"/>
+    <cs:fillRef idx="0"/>
+    <cs:effectRef idx="0"/>
+    <cs:fontRef idx="minor">
+      <a:schemeClr val="tx1"/>
+    </cs:fontRef>
+    <cs:spPr>
+      <a:ln w="9525" cap="flat" cmpd="sng" algn="ctr">
+        <a:solidFill>
+          <a:schemeClr val="tx1">
+            <a:lumMod val="35000"/>
+            <a:lumOff val="65000"/>
+          </a:schemeClr>
+        </a:solidFill>
+        <a:round/>
+      </a:ln>
+    </cs:spPr>
+  </cs:leaderLine>
+  <cs:legend>
+    <cs:lnRef idx="0"/>
+    <cs:fillRef idx="0"/>
+    <cs:effectRef idx="0"/>
+    <cs:fontRef idx="minor">
+      <a:schemeClr val="tx1">
+        <a:lumMod val="65000"/>
+        <a:lumOff val="35000"/>
+      </a:schemeClr>
+    </cs:fontRef>
+    <cs:defRPr sz="1197" kern="1200"/>
+  </cs:legend>
+  <cs:plotArea mods="allowNoFillOverride allowNoLineOverride">
+    <cs:lnRef idx="0"/>
+    <cs:fillRef idx="0"/>
+    <cs:effectRef idx="0"/>
+    <cs:fontRef idx="minor">
+      <a:schemeClr val="tx1"/>
+    </cs:fontRef>
+  </cs:plotArea>
+  <cs:plotArea3D mods="allowNoFillOverride allowNoLineOverride">
+    <cs:lnRef idx="0"/>
+    <cs:fillRef idx="0"/>
+    <cs:effectRef idx="0"/>
+    <cs:fontRef idx="minor">
+      <a:schemeClr val="tx1"/>
+    </cs:fontRef>
+  </cs:plotArea3D>
+  <cs:seriesAxis>
+    <cs:lnRef idx="0"/>
+    <cs:fillRef idx="0"/>
+    <cs:effectRef idx="0"/>
+    <cs:fontRef idx="minor">
+      <a:schemeClr val="tx1">
+        <a:lumMod val="65000"/>
+        <a:lumOff val="35000"/>
+      </a:schemeClr>
+    </cs:fontRef>
+    <cs:defRPr sz="1197" kern="1200"/>
+  </cs:seriesAxis>
+  <cs:seriesLine>
+    <cs:lnRef idx="0"/>
+    <cs:fillRef idx="0"/>
+    <cs:effectRef idx="0"/>
+    <cs:fontRef idx="minor">
+      <a:schemeClr val="tx1"/>
+    </cs:fontRef>
+    <cs:spPr>
+      <a:ln w="9525" cap="flat" cmpd="sng" algn="ctr">
+        <a:solidFill>
+          <a:schemeClr val="tx1">
+            <a:lumMod val="35000"/>
+            <a:lumOff val="65000"/>
+          </a:schemeClr>
+        </a:solidFill>
+        <a:round/>
+      </a:ln>
+    </cs:spPr>
+  </cs:seriesLine>
+  <cs:title>
+    <cs:lnRef idx="0"/>
+    <cs:fillRef idx="0"/>
+    <cs:effectRef idx="0"/>
+    <cs:fontRef idx="minor">
+      <a:schemeClr val="tx1">
+        <a:lumMod val="65000"/>
+        <a:lumOff val="35000"/>
+      </a:schemeClr>
+    </cs:fontRef>
+    <cs:defRPr sz="1862" b="0" kern="1200" spc="0" baseline="0"/>
+  </cs:title>
+  <cs:trendline>
+    <cs:lnRef idx="0">
+      <cs:styleClr val="auto"/>
+    </cs:lnRef>
+    <cs:fillRef idx="0"/>
+    <cs:effectRef idx="0"/>
+    <cs:fontRef idx="minor">
+      <a:schemeClr val="tx1"/>
+    </cs:fontRef>
+    <cs:spPr>
+      <a:ln w="19050" cap="rnd">
+        <a:solidFill>
+          <a:schemeClr val="phClr"/>
+        </a:solidFill>
+        <a:prstDash val="sysDot"/>
+      </a:ln>
+    </cs:spPr>
+  </cs:trendline>
+  <cs:trendlineLabel>
+    <cs:lnRef idx="0"/>
+    <cs:fillRef idx="0"/>
+    <cs:effectRef idx="0"/>
+    <cs:fontRef idx="minor">
+      <a:schemeClr val="tx1">
+        <a:lumMod val="65000"/>
+        <a:lumOff val="35000"/>
+      </a:schemeClr>
+    </cs:fontRef>
+    <cs:defRPr sz="1197" kern="1200"/>
+  </cs:trendlineLabel>
+  <cs:upBar>
+    <cs:lnRef idx="0"/>
+    <cs:fillRef idx="0"/>
+    <cs:effectRef idx="0"/>
+    <cs:fontRef idx="minor">
+      <a:schemeClr val="dk1"/>
+    </cs:fontRef>
+    <cs:spPr>
+      <a:solidFill>
+        <a:schemeClr val="lt1"/>
+      </a:solidFill>
+      <a:ln w="9525">
+        <a:solidFill>
+          <a:schemeClr val="tx1">
+            <a:lumMod val="15000"/>
+            <a:lumOff val="85000"/>
+          </a:schemeClr>
+        </a:solidFill>
+      </a:ln>
+    </cs:spPr>
+  </cs:upBar>
+  <cs:valueAxis>
+    <cs:lnRef idx="0"/>
+    <cs:fillRef idx="0"/>
+    <cs:effectRef idx="0"/>
+    <cs:fontRef idx="minor">
+      <a:schemeClr val="tx1">
+        <a:lumMod val="65000"/>
+        <a:lumOff val="35000"/>
+      </a:schemeClr>
+    </cs:fontRef>
+    <cs:defRPr sz="1197" kern="1200"/>
+  </cs:valueAxis>
+  <cs:wall>
+    <cs:lnRef idx="0"/>
+    <cs:fillRef idx="0"/>
+    <cs:effectRef idx="0"/>
+    <cs:fontRef idx="minor">
+      <a:schemeClr val="tx1"/>
+    </cs:fontRef>
+    <cs:spPr>
+      <a:noFill/>
+      <a:ln>
+        <a:noFill/>
+      </a:ln>
+    </cs:spPr>
+  </cs:wall>
+</cs:chartStyle>
 </file>
 
 <file path=ppt/notesMasters/notesMaster1.xml><?xml version="1.0" encoding="utf-8"?>
@@ -5940,7 +6965,24 @@
           <a:lstStyle/>
           <a:p>
             <a:pPr algn="ctr"/>
-            <a:endParaRPr lang="zh-TW" altLang="en-US"/>
+            <a:r>
+              <a:rPr lang="en-US" altLang="zh-TW" sz="3200" i="1" dirty="0" smtClean="0">
+                <a:latin typeface="Times New Roman" panose="02020603050405020304" pitchFamily="18" charset="0"/>
+                <a:cs typeface="Times New Roman" panose="02020603050405020304" pitchFamily="18" charset="0"/>
+              </a:rPr>
+              <a:t>X</a:t>
+            </a:r>
+            <a:r>
+              <a:rPr lang="en-US" altLang="zh-TW" sz="3200" baseline="-25000" dirty="0" smtClean="0">
+                <a:latin typeface="Times New Roman" panose="02020603050405020304" pitchFamily="18" charset="0"/>
+                <a:cs typeface="Times New Roman" panose="02020603050405020304" pitchFamily="18" charset="0"/>
+              </a:rPr>
+              <a:t>2</a:t>
+            </a:r>
+            <a:endParaRPr lang="zh-TW" altLang="en-US" sz="3200" baseline="-25000" dirty="0">
+              <a:latin typeface="Times New Roman" panose="02020603050405020304" pitchFamily="18" charset="0"/>
+              <a:cs typeface="Times New Roman" panose="02020603050405020304" pitchFamily="18" charset="0"/>
+            </a:endParaRPr>
           </a:p>
         </p:txBody>
       </p:sp>
@@ -6434,6 +7476,130 @@
     <p:extLst>
       <p:ext uri="{BB962C8B-B14F-4D97-AF65-F5344CB8AC3E}">
         <p14:creationId xmlns:p14="http://schemas.microsoft.com/office/powerpoint/2010/main" val="2611549055"/>
+      </p:ext>
+    </p:extLst>
+  </p:cSld>
+  <p:clrMapOvr>
+    <a:masterClrMapping/>
+  </p:clrMapOvr>
+</p:sld>
+</file>
+
+<file path=ppt/slides/slide9.xml><?xml version="1.0" encoding="utf-8"?>
+<p:sld xmlns:a="http://schemas.openxmlformats.org/drawingml/2006/main" xmlns:r="http://schemas.openxmlformats.org/officeDocument/2006/relationships" xmlns:p="http://schemas.openxmlformats.org/presentationml/2006/main">
+  <p:cSld>
+    <p:spTree>
+      <p:nvGrpSpPr>
+        <p:cNvPr id="1" name=""/>
+        <p:cNvGrpSpPr/>
+        <p:nvPr/>
+      </p:nvGrpSpPr>
+      <p:grpSpPr>
+        <a:xfrm>
+          <a:off x="0" y="0"/>
+          <a:ext cx="0" cy="0"/>
+          <a:chOff x="0" y="0"/>
+          <a:chExt cx="0" cy="0"/>
+        </a:xfrm>
+      </p:grpSpPr>
+      <p:sp>
+        <p:nvSpPr>
+          <p:cNvPr id="11" name="標題 10"/>
+          <p:cNvSpPr>
+            <a:spLocks noGrp="1"/>
+          </p:cNvSpPr>
+          <p:nvPr>
+            <p:ph type="title"/>
+          </p:nvPr>
+        </p:nvSpPr>
+        <p:spPr/>
+        <p:txBody>
+          <a:bodyPr/>
+          <a:lstStyle/>
+          <a:p>
+            <a:r>
+              <a:rPr lang="zh-TW" altLang="en-US" dirty="0" smtClean="0"/>
+              <a:t>圖表測試</a:t>
+            </a:r>
+            <a:endParaRPr lang="zh-TW" altLang="en-US" dirty="0"/>
+          </a:p>
+        </p:txBody>
+      </p:sp>
+      <p:graphicFrame>
+        <p:nvGraphicFramePr>
+          <p:cNvPr id="23" name="內容版面配置區 22"/>
+          <p:cNvGraphicFramePr>
+            <a:graphicFrameLocks noGrp="1"/>
+          </p:cNvGraphicFramePr>
+          <p:nvPr>
+            <p:ph idx="1"/>
+            <p:extLst>
+              <p:ext uri="{D42A27DB-BD31-4B8C-83A1-F6EECF244321}">
+                <p14:modId xmlns:p14="http://schemas.microsoft.com/office/powerpoint/2010/main" val="415230077"/>
+              </p:ext>
+            </p:extLst>
+          </p:nvPr>
+        </p:nvGraphicFramePr>
+        <p:xfrm>
+          <a:off x="628650" y="1825625"/>
+          <a:ext cx="7886700" cy="4351338"/>
+        </p:xfrm>
+        <a:graphic>
+          <a:graphicData uri="http://schemas.openxmlformats.org/drawingml/2006/chart">
+            <c:chart xmlns:c="http://schemas.openxmlformats.org/drawingml/2006/chart" xmlns:r="http://schemas.openxmlformats.org/officeDocument/2006/relationships" r:id="rId2"/>
+          </a:graphicData>
+        </a:graphic>
+      </p:graphicFrame>
+      <p:sp>
+        <p:nvSpPr>
+          <p:cNvPr id="7" name="日期版面配置區 6"/>
+          <p:cNvSpPr>
+            <a:spLocks noGrp="1"/>
+          </p:cNvSpPr>
+          <p:nvPr>
+            <p:ph type="dt" sz="half" idx="10"/>
+          </p:nvPr>
+        </p:nvSpPr>
+        <p:spPr/>
+        <p:txBody>
+          <a:bodyPr/>
+          <a:lstStyle/>
+          <a:p>
+            <a:fld id="{C11F5D98-A40D-4F6A-B778-B48D2F7EC464}" type="datetime1">
+              <a:rPr lang="zh-TW" altLang="en-US" smtClean="0"/>
+              <a:t>2015/11/12</a:t>
+            </a:fld>
+            <a:endParaRPr lang="zh-TW" altLang="en-US"/>
+          </a:p>
+        </p:txBody>
+      </p:sp>
+      <p:sp>
+        <p:nvSpPr>
+          <p:cNvPr id="8" name="投影片編號版面配置區 7"/>
+          <p:cNvSpPr>
+            <a:spLocks noGrp="1"/>
+          </p:cNvSpPr>
+          <p:nvPr>
+            <p:ph type="sldNum" sz="quarter" idx="12"/>
+          </p:nvPr>
+        </p:nvSpPr>
+        <p:spPr/>
+        <p:txBody>
+          <a:bodyPr/>
+          <a:lstStyle/>
+          <a:p>
+            <a:fld id="{6923F3CB-4711-4FC8-9867-5888834CD7FE}" type="slidenum">
+              <a:rPr lang="zh-TW" altLang="en-US" smtClean="0"/>
+              <a:t>9</a:t>
+            </a:fld>
+            <a:endParaRPr lang="zh-TW" altLang="en-US"/>
+          </a:p>
+        </p:txBody>
+      </p:sp>
+    </p:spTree>
+    <p:extLst>
+      <p:ext uri="{BB962C8B-B14F-4D97-AF65-F5344CB8AC3E}">
+        <p14:creationId xmlns:p14="http://schemas.microsoft.com/office/powerpoint/2010/main" val="3745250516"/>
       </p:ext>
     </p:extLst>
   </p:cSld>

</xml_diff>

<commit_message>
Fix fill and stroke color
</commit_message>
<xml_diff>
--- a/files/test.pptx
+++ b/files/test.pptx
@@ -138,7 +138,6 @@
   </mc:AlternateContent>
   <c:chart>
     <c:title>
-      <c:layout/>
       <c:overlay val="0"/>
       <c:spPr>
         <a:noFill/>
@@ -427,11 +426,11 @@
         </c:dLbls>
         <c:marker val="1"/>
         <c:smooth val="0"/>
-        <c:axId val="1403571808"/>
-        <c:axId val="1403576160"/>
+        <c:axId val="878614976"/>
+        <c:axId val="878615520"/>
       </c:lineChart>
       <c:catAx>
-        <c:axId val="1403571808"/>
+        <c:axId val="878614976"/>
         <c:scaling>
           <c:orientation val="minMax"/>
         </c:scaling>
@@ -474,7 +473,7 @@
             <a:endParaRPr lang="zh-TW"/>
           </a:p>
         </c:txPr>
-        <c:crossAx val="1403576160"/>
+        <c:crossAx val="878615520"/>
         <c:crosses val="autoZero"/>
         <c:auto val="1"/>
         <c:lblAlgn val="ctr"/>
@@ -482,7 +481,7 @@
         <c:noMultiLvlLbl val="0"/>
       </c:catAx>
       <c:valAx>
-        <c:axId val="1403576160"/>
+        <c:axId val="878615520"/>
         <c:scaling>
           <c:orientation val="minMax"/>
         </c:scaling>
@@ -533,7 +532,7 @@
             <a:endParaRPr lang="zh-TW"/>
           </a:p>
         </c:txPr>
-        <c:crossAx val="1403571808"/>
+        <c:crossAx val="878614976"/>
         <c:crosses val="autoZero"/>
         <c:crossBetween val="between"/>
       </c:valAx>
@@ -547,7 +546,6 @@
     </c:plotArea>
     <c:legend>
       <c:legendPos val="b"/>
-      <c:layout/>
       <c:overlay val="0"/>
       <c:spPr>
         <a:noFill/>
@@ -1229,7 +1227,7 @@
           <a:p>
             <a:fld id="{F80196F6-7584-4650-82DD-1A823E372E93}" type="datetimeFigureOut">
               <a:rPr lang="zh-TW" altLang="en-US" smtClean="0"/>
-              <a:t>2015/11/12</a:t>
+              <a:t>2015/11/13</a:t>
             </a:fld>
             <a:endParaRPr lang="zh-TW" altLang="en-US"/>
           </a:p>
@@ -1712,7 +1710,7 @@
           <a:p>
             <a:fld id="{E7A87A2D-0523-400E-8364-8FCFDAAEE150}" type="datetime1">
               <a:rPr lang="zh-TW" altLang="en-US" smtClean="0"/>
-              <a:t>2015/11/12</a:t>
+              <a:t>2015/11/13</a:t>
             </a:fld>
             <a:endParaRPr lang="zh-TW" altLang="en-US"/>
           </a:p>
@@ -1882,7 +1880,7 @@
           <a:p>
             <a:fld id="{4470E85D-BD6F-4D26-B110-7E28230C593F}" type="datetime1">
               <a:rPr lang="zh-TW" altLang="en-US" smtClean="0"/>
-              <a:t>2015/11/12</a:t>
+              <a:t>2015/11/13</a:t>
             </a:fld>
             <a:endParaRPr lang="zh-TW" altLang="en-US"/>
           </a:p>
@@ -2062,7 +2060,7 @@
           <a:p>
             <a:fld id="{D6E993F5-55DB-4F1A-9A97-9192FB5AEB42}" type="datetime1">
               <a:rPr lang="zh-TW" altLang="en-US" smtClean="0"/>
-              <a:t>2015/11/12</a:t>
+              <a:t>2015/11/13</a:t>
             </a:fld>
             <a:endParaRPr lang="zh-TW" altLang="en-US"/>
           </a:p>
@@ -2232,7 +2230,7 @@
           <a:p>
             <a:fld id="{C60B81E8-7334-464F-8B48-45CA70843E0C}" type="datetime1">
               <a:rPr lang="zh-TW" altLang="en-US" smtClean="0"/>
-              <a:t>2015/11/12</a:t>
+              <a:t>2015/11/13</a:t>
             </a:fld>
             <a:endParaRPr lang="zh-TW" altLang="en-US"/>
           </a:p>
@@ -2476,7 +2474,7 @@
           <a:p>
             <a:fld id="{D47ED321-95FB-497B-BD7E-3BD909DE64AD}" type="datetime1">
               <a:rPr lang="zh-TW" altLang="en-US" smtClean="0"/>
-              <a:t>2015/11/12</a:t>
+              <a:t>2015/11/13</a:t>
             </a:fld>
             <a:endParaRPr lang="zh-TW" altLang="en-US"/>
           </a:p>
@@ -2708,7 +2706,7 @@
           <a:p>
             <a:fld id="{497E4E27-12DC-43A4-A531-93F92B4B5AEB}" type="datetime1">
               <a:rPr lang="zh-TW" altLang="en-US" smtClean="0"/>
-              <a:t>2015/11/12</a:t>
+              <a:t>2015/11/13</a:t>
             </a:fld>
             <a:endParaRPr lang="zh-TW" altLang="en-US"/>
           </a:p>
@@ -3075,7 +3073,7 @@
           <a:p>
             <a:fld id="{C11F5D98-A40D-4F6A-B778-B48D2F7EC464}" type="datetime1">
               <a:rPr lang="zh-TW" altLang="en-US" smtClean="0"/>
-              <a:t>2015/11/12</a:t>
+              <a:t>2015/11/13</a:t>
             </a:fld>
             <a:endParaRPr lang="zh-TW" altLang="en-US"/>
           </a:p>
@@ -3193,7 +3191,7 @@
           <a:p>
             <a:fld id="{37540F8D-04B0-4510-8208-7A8AB7D75261}" type="datetime1">
               <a:rPr lang="zh-TW" altLang="en-US" smtClean="0"/>
-              <a:t>2015/11/12</a:t>
+              <a:t>2015/11/13</a:t>
             </a:fld>
             <a:endParaRPr lang="zh-TW" altLang="en-US"/>
           </a:p>
@@ -3288,7 +3286,7 @@
           <a:p>
             <a:fld id="{ED8E83AE-CBBB-4AB3-9A7C-32D18F7AB593}" type="datetime1">
               <a:rPr lang="zh-TW" altLang="en-US" smtClean="0"/>
-              <a:t>2015/11/12</a:t>
+              <a:t>2015/11/13</a:t>
             </a:fld>
             <a:endParaRPr lang="zh-TW" altLang="en-US"/>
           </a:p>
@@ -3565,7 +3563,7 @@
           <a:p>
             <a:fld id="{CF1BA43A-76D7-43A7-8042-3520281B1840}" type="datetime1">
               <a:rPr lang="zh-TW" altLang="en-US" smtClean="0"/>
-              <a:t>2015/11/12</a:t>
+              <a:t>2015/11/13</a:t>
             </a:fld>
             <a:endParaRPr lang="zh-TW" altLang="en-US"/>
           </a:p>
@@ -3822,7 +3820,7 @@
           <a:p>
             <a:fld id="{BB28C0ED-AAF8-4DB2-AF56-EE0DC21174BB}" type="datetime1">
               <a:rPr lang="zh-TW" altLang="en-US" smtClean="0"/>
-              <a:t>2015/11/12</a:t>
+              <a:t>2015/11/13</a:t>
             </a:fld>
             <a:endParaRPr lang="zh-TW" altLang="en-US"/>
           </a:p>
@@ -4035,7 +4033,7 @@
           <a:p>
             <a:fld id="{991B9CC3-7329-43C8-BC56-DBF8F15634F0}" type="datetime1">
               <a:rPr lang="zh-TW" altLang="en-US" smtClean="0"/>
-              <a:t>2015/11/12</a:t>
+              <a:t>2015/11/13</a:t>
             </a:fld>
             <a:endParaRPr lang="zh-TW" altLang="en-US"/>
           </a:p>
@@ -4504,7 +4502,7 @@
           <a:p>
             <a:fld id="{E49FC7B0-3E75-4441-B63F-4CC3A5531728}" type="datetime1">
               <a:rPr lang="zh-TW" altLang="en-US" smtClean="0"/>
-              <a:t>2015/11/12</a:t>
+              <a:t>2015/11/13</a:t>
             </a:fld>
             <a:endParaRPr lang="zh-TW" altLang="en-US"/>
           </a:p>
@@ -4638,7 +4636,7 @@
           <a:p>
             <a:fld id="{7D259E43-2377-4BD5-9EF1-8A04A4F66F0C}" type="datetime1">
               <a:rPr lang="zh-TW" altLang="en-US" smtClean="0"/>
-              <a:t>2015/11/12</a:t>
+              <a:t>2015/11/13</a:t>
             </a:fld>
             <a:endParaRPr lang="zh-TW" altLang="en-US"/>
           </a:p>
@@ -4773,7 +4771,7 @@
           <a:p>
             <a:fld id="{3E86548D-D54C-4064-8B18-89FB2D942122}" type="datetime1">
               <a:rPr lang="zh-TW" altLang="en-US" smtClean="0"/>
-              <a:t>2015/11/12</a:t>
+              <a:t>2015/11/13</a:t>
             </a:fld>
             <a:endParaRPr lang="zh-TW" altLang="en-US"/>
           </a:p>
@@ -5252,7 +5250,7 @@
           <a:p>
             <a:fld id="{94FA48B1-D508-49FA-BBA0-5047EEF68D44}" type="datetime1">
               <a:rPr lang="zh-TW" altLang="en-US" smtClean="0"/>
-              <a:t>2015/11/12</a:t>
+              <a:t>2015/11/13</a:t>
             </a:fld>
             <a:endParaRPr lang="zh-TW" altLang="en-US"/>
           </a:p>
@@ -5488,7 +5486,7 @@
           <a:p>
             <a:fld id="{E0EFF268-3616-48FD-9778-BBA6A4676333}" type="datetime1">
               <a:rPr lang="zh-TW" altLang="en-US" smtClean="0"/>
-              <a:t>2015/11/12</a:t>
+              <a:t>2015/11/13</a:t>
             </a:fld>
             <a:endParaRPr lang="zh-TW" altLang="en-US"/>
           </a:p>
@@ -6793,7 +6791,7 @@
           <a:p>
             <a:fld id="{5A0B17C9-1A35-4216-82FA-299D192A2D4E}" type="datetime1">
               <a:rPr lang="zh-TW" altLang="en-US" smtClean="0"/>
-              <a:t>2015/11/12</a:t>
+              <a:t>2015/11/13</a:t>
             </a:fld>
             <a:endParaRPr lang="zh-TW" altLang="en-US"/>
           </a:p>
@@ -6892,7 +6890,7 @@
           <a:p>
             <a:fld id="{C60B81E8-7334-464F-8B48-45CA70843E0C}" type="datetime1">
               <a:rPr lang="zh-TW" altLang="en-US" smtClean="0"/>
-              <a:t>2015/11/12</a:t>
+              <a:t>2015/11/13</a:t>
             </a:fld>
             <a:endParaRPr lang="zh-TW" altLang="en-US"/>
           </a:p>
@@ -7150,15 +7148,18 @@
       <p:cxnSp>
         <p:nvCxnSpPr>
           <p:cNvPr id="12" name="直線接點 11"/>
-          <p:cNvCxnSpPr/>
+          <p:cNvCxnSpPr>
+            <a:stCxn id="8" idx="3"/>
+            <a:endCxn id="7" idx="4"/>
+          </p:cNvCxnSpPr>
           <p:nvPr/>
         </p:nvCxnSpPr>
         <p:spPr>
           <a:xfrm flipV="1">
-            <a:off x="5860973" y="3833870"/>
-            <a:ext cx="2654377" cy="1536417"/>
+            <a:off x="6567714" y="3295197"/>
+            <a:ext cx="918936" cy="993776"/>
           </a:xfrm>
-          <a:prstGeom prst="line">
+          <a:prstGeom prst="bentConnector2">
             <a:avLst/>
           </a:prstGeom>
           <a:ln w="57150">
@@ -7184,18 +7185,20 @@
         <p:nvCxnSpPr>
           <p:cNvPr id="14" name="直線單箭頭接點 13"/>
           <p:cNvCxnSpPr>
-            <a:stCxn id="7" idx="3"/>
+            <a:stCxn id="7" idx="1"/>
             <a:endCxn id="8" idx="0"/>
           </p:cNvCxnSpPr>
           <p:nvPr/>
         </p:nvCxnSpPr>
         <p:spPr>
-          <a:xfrm flipH="1">
-            <a:off x="4572000" y="3095261"/>
-            <a:ext cx="2431961" cy="823597"/>
+          <a:xfrm rot="16200000" flipH="1" flipV="1">
+            <a:off x="4893493" y="1808389"/>
+            <a:ext cx="1788975" cy="2431961"/>
           </a:xfrm>
-          <a:prstGeom prst="straightConnector1">
-            <a:avLst/>
+          <a:prstGeom prst="curvedConnector3">
+            <a:avLst>
+              <a:gd name="adj1" fmla="val -18412"/>
+            </a:avLst>
           </a:prstGeom>
           <a:ln w="76200">
             <a:headEnd type="triangle"/>
@@ -7443,7 +7446,7 @@
           <a:p>
             <a:fld id="{C60B81E8-7334-464F-8B48-45CA70843E0C}" type="datetime1">
               <a:rPr lang="zh-TW" altLang="en-US" smtClean="0"/>
-              <a:t>2015/11/12</a:t>
+              <a:t>2015/11/13</a:t>
             </a:fld>
             <a:endParaRPr lang="zh-TW" altLang="en-US"/>
           </a:p>
@@ -7567,7 +7570,7 @@
           <a:p>
             <a:fld id="{C11F5D98-A40D-4F6A-B778-B48D2F7EC464}" type="datetime1">
               <a:rPr lang="zh-TW" altLang="en-US" smtClean="0"/>
-              <a:t>2015/11/12</a:t>
+              <a:t>2015/11/13</a:t>
             </a:fld>
             <a:endParaRPr lang="zh-TW" altLang="en-US"/>
           </a:p>

</xml_diff>

<commit_message>
Use svg to render all shapes
</commit_message>
<xml_diff>
--- a/files/test.pptx
+++ b/files/test.pptx
@@ -138,7 +138,6 @@
   </mc:AlternateContent>
   <c:chart>
     <c:title>
-      <c:layout/>
       <c:overlay val="0"/>
       <c:spPr>
         <a:noFill/>
@@ -427,11 +426,11 @@
         </c:dLbls>
         <c:marker val="1"/>
         <c:smooth val="0"/>
-        <c:axId val="-1967463584"/>
-        <c:axId val="-1967464672"/>
+        <c:axId val="1037267824"/>
+        <c:axId val="1037262928"/>
       </c:lineChart>
       <c:catAx>
-        <c:axId val="-1967463584"/>
+        <c:axId val="1037267824"/>
         <c:scaling>
           <c:orientation val="minMax"/>
         </c:scaling>
@@ -474,7 +473,7 @@
             <a:endParaRPr lang="zh-TW"/>
           </a:p>
         </c:txPr>
-        <c:crossAx val="-1967464672"/>
+        <c:crossAx val="1037262928"/>
         <c:crosses val="autoZero"/>
         <c:auto val="1"/>
         <c:lblAlgn val="ctr"/>
@@ -482,7 +481,7 @@
         <c:noMultiLvlLbl val="0"/>
       </c:catAx>
       <c:valAx>
-        <c:axId val="-1967464672"/>
+        <c:axId val="1037262928"/>
         <c:scaling>
           <c:orientation val="minMax"/>
         </c:scaling>
@@ -533,7 +532,7 @@
             <a:endParaRPr lang="zh-TW"/>
           </a:p>
         </c:txPr>
-        <c:crossAx val="-1967463584"/>
+        <c:crossAx val="1037267824"/>
         <c:crosses val="autoZero"/>
         <c:crossBetween val="between"/>
       </c:valAx>
@@ -547,7 +546,6 @@
     </c:plotArea>
     <c:legend>
       <c:legendPos val="b"/>
-      <c:layout/>
       <c:overlay val="0"/>
       <c:spPr>
         <a:noFill/>
@@ -1229,7 +1227,7 @@
           <a:p>
             <a:fld id="{F80196F6-7584-4650-82DD-1A823E372E93}" type="datetimeFigureOut">
               <a:rPr lang="zh-TW" altLang="en-US" smtClean="0"/>
-              <a:t>2015/11/15</a:t>
+              <a:t>2015/11/16</a:t>
             </a:fld>
             <a:endParaRPr lang="zh-TW" altLang="en-US"/>
           </a:p>
@@ -1712,7 +1710,7 @@
           <a:p>
             <a:fld id="{E7A87A2D-0523-400E-8364-8FCFDAAEE150}" type="datetime1">
               <a:rPr lang="zh-TW" altLang="en-US" smtClean="0"/>
-              <a:t>2015/11/15</a:t>
+              <a:t>2015/11/16</a:t>
             </a:fld>
             <a:endParaRPr lang="zh-TW" altLang="en-US"/>
           </a:p>
@@ -1882,7 +1880,7 @@
           <a:p>
             <a:fld id="{4470E85D-BD6F-4D26-B110-7E28230C593F}" type="datetime1">
               <a:rPr lang="zh-TW" altLang="en-US" smtClean="0"/>
-              <a:t>2015/11/15</a:t>
+              <a:t>2015/11/16</a:t>
             </a:fld>
             <a:endParaRPr lang="zh-TW" altLang="en-US"/>
           </a:p>
@@ -2062,7 +2060,7 @@
           <a:p>
             <a:fld id="{D6E993F5-55DB-4F1A-9A97-9192FB5AEB42}" type="datetime1">
               <a:rPr lang="zh-TW" altLang="en-US" smtClean="0"/>
-              <a:t>2015/11/15</a:t>
+              <a:t>2015/11/16</a:t>
             </a:fld>
             <a:endParaRPr lang="zh-TW" altLang="en-US"/>
           </a:p>
@@ -2232,7 +2230,7 @@
           <a:p>
             <a:fld id="{C60B81E8-7334-464F-8B48-45CA70843E0C}" type="datetime1">
               <a:rPr lang="zh-TW" altLang="en-US" smtClean="0"/>
-              <a:t>2015/11/15</a:t>
+              <a:t>2015/11/16</a:t>
             </a:fld>
             <a:endParaRPr lang="zh-TW" altLang="en-US"/>
           </a:p>
@@ -2476,7 +2474,7 @@
           <a:p>
             <a:fld id="{D47ED321-95FB-497B-BD7E-3BD909DE64AD}" type="datetime1">
               <a:rPr lang="zh-TW" altLang="en-US" smtClean="0"/>
-              <a:t>2015/11/15</a:t>
+              <a:t>2015/11/16</a:t>
             </a:fld>
             <a:endParaRPr lang="zh-TW" altLang="en-US"/>
           </a:p>
@@ -2708,7 +2706,7 @@
           <a:p>
             <a:fld id="{497E4E27-12DC-43A4-A531-93F92B4B5AEB}" type="datetime1">
               <a:rPr lang="zh-TW" altLang="en-US" smtClean="0"/>
-              <a:t>2015/11/15</a:t>
+              <a:t>2015/11/16</a:t>
             </a:fld>
             <a:endParaRPr lang="zh-TW" altLang="en-US"/>
           </a:p>
@@ -3075,7 +3073,7 @@
           <a:p>
             <a:fld id="{C11F5D98-A40D-4F6A-B778-B48D2F7EC464}" type="datetime1">
               <a:rPr lang="zh-TW" altLang="en-US" smtClean="0"/>
-              <a:t>2015/11/15</a:t>
+              <a:t>2015/11/16</a:t>
             </a:fld>
             <a:endParaRPr lang="zh-TW" altLang="en-US"/>
           </a:p>
@@ -3193,7 +3191,7 @@
           <a:p>
             <a:fld id="{37540F8D-04B0-4510-8208-7A8AB7D75261}" type="datetime1">
               <a:rPr lang="zh-TW" altLang="en-US" smtClean="0"/>
-              <a:t>2015/11/15</a:t>
+              <a:t>2015/11/16</a:t>
             </a:fld>
             <a:endParaRPr lang="zh-TW" altLang="en-US"/>
           </a:p>
@@ -3288,7 +3286,7 @@
           <a:p>
             <a:fld id="{ED8E83AE-CBBB-4AB3-9A7C-32D18F7AB593}" type="datetime1">
               <a:rPr lang="zh-TW" altLang="en-US" smtClean="0"/>
-              <a:t>2015/11/15</a:t>
+              <a:t>2015/11/16</a:t>
             </a:fld>
             <a:endParaRPr lang="zh-TW" altLang="en-US"/>
           </a:p>
@@ -3565,7 +3563,7 @@
           <a:p>
             <a:fld id="{CF1BA43A-76D7-43A7-8042-3520281B1840}" type="datetime1">
               <a:rPr lang="zh-TW" altLang="en-US" smtClean="0"/>
-              <a:t>2015/11/15</a:t>
+              <a:t>2015/11/16</a:t>
             </a:fld>
             <a:endParaRPr lang="zh-TW" altLang="en-US"/>
           </a:p>
@@ -3822,7 +3820,7 @@
           <a:p>
             <a:fld id="{BB28C0ED-AAF8-4DB2-AF56-EE0DC21174BB}" type="datetime1">
               <a:rPr lang="zh-TW" altLang="en-US" smtClean="0"/>
-              <a:t>2015/11/15</a:t>
+              <a:t>2015/11/16</a:t>
             </a:fld>
             <a:endParaRPr lang="zh-TW" altLang="en-US"/>
           </a:p>
@@ -4035,7 +4033,7 @@
           <a:p>
             <a:fld id="{991B9CC3-7329-43C8-BC56-DBF8F15634F0}" type="datetime1">
               <a:rPr lang="zh-TW" altLang="en-US" smtClean="0"/>
-              <a:t>2015/11/15</a:t>
+              <a:t>2015/11/16</a:t>
             </a:fld>
             <a:endParaRPr lang="zh-TW" altLang="en-US"/>
           </a:p>
@@ -4504,7 +4502,7 @@
           <a:p>
             <a:fld id="{E49FC7B0-3E75-4441-B63F-4CC3A5531728}" type="datetime1">
               <a:rPr lang="zh-TW" altLang="en-US" smtClean="0"/>
-              <a:t>2015/11/15</a:t>
+              <a:t>2015/11/16</a:t>
             </a:fld>
             <a:endParaRPr lang="zh-TW" altLang="en-US"/>
           </a:p>
@@ -4638,7 +4636,7 @@
           <a:p>
             <a:fld id="{7D259E43-2377-4BD5-9EF1-8A04A4F66F0C}" type="datetime1">
               <a:rPr lang="zh-TW" altLang="en-US" smtClean="0"/>
-              <a:t>2015/11/15</a:t>
+              <a:t>2015/11/16</a:t>
             </a:fld>
             <a:endParaRPr lang="zh-TW" altLang="en-US"/>
           </a:p>
@@ -4773,7 +4771,7 @@
           <a:p>
             <a:fld id="{3E86548D-D54C-4064-8B18-89FB2D942122}" type="datetime1">
               <a:rPr lang="zh-TW" altLang="en-US" smtClean="0"/>
-              <a:t>2015/11/15</a:t>
+              <a:t>2015/11/16</a:t>
             </a:fld>
             <a:endParaRPr lang="zh-TW" altLang="en-US"/>
           </a:p>
@@ -5252,7 +5250,7 @@
           <a:p>
             <a:fld id="{94FA48B1-D508-49FA-BBA0-5047EEF68D44}" type="datetime1">
               <a:rPr lang="zh-TW" altLang="en-US" smtClean="0"/>
-              <a:t>2015/11/15</a:t>
+              <a:t>2015/11/16</a:t>
             </a:fld>
             <a:endParaRPr lang="zh-TW" altLang="en-US"/>
           </a:p>
@@ -5488,7 +5486,7 @@
           <a:p>
             <a:fld id="{E0EFF268-3616-48FD-9778-BBA6A4676333}" type="datetime1">
               <a:rPr lang="zh-TW" altLang="en-US" smtClean="0"/>
-              <a:t>2015/11/15</a:t>
+              <a:t>2015/11/16</a:t>
             </a:fld>
             <a:endParaRPr lang="zh-TW" altLang="en-US"/>
           </a:p>
@@ -6793,7 +6791,7 @@
           <a:p>
             <a:fld id="{5A0B17C9-1A35-4216-82FA-299D192A2D4E}" type="datetime1">
               <a:rPr lang="zh-TW" altLang="en-US" smtClean="0"/>
-              <a:t>2015/11/15</a:t>
+              <a:t>2015/11/16</a:t>
             </a:fld>
             <a:endParaRPr lang="zh-TW" altLang="en-US"/>
           </a:p>
@@ -6892,7 +6890,7 @@
           <a:p>
             <a:fld id="{C60B81E8-7334-464F-8B48-45CA70843E0C}" type="datetime1">
               <a:rPr lang="zh-TW" altLang="en-US" smtClean="0"/>
-              <a:t>2015/11/15</a:t>
+              <a:t>2015/11/16</a:t>
             </a:fld>
             <a:endParaRPr lang="zh-TW" altLang="en-US"/>
           </a:p>
@@ -7166,6 +7164,8 @@
           </a:prstGeom>
           <a:ln w="57150">
             <a:prstDash val="lgDash"/>
+            <a:headEnd type="none" w="med" len="med"/>
+            <a:tailEnd type="triangle" w="med" len="med"/>
           </a:ln>
         </p:spPr>
         <p:style>
@@ -7544,6 +7544,82 @@
           </a:p>
         </p:txBody>
       </p:sp>
+      <p:cxnSp>
+        <p:nvCxnSpPr>
+          <p:cNvPr id="21" name="直線接點 20"/>
+          <p:cNvCxnSpPr>
+            <a:stCxn id="6" idx="1"/>
+            <a:endCxn id="8" idx="1"/>
+          </p:cNvCxnSpPr>
+          <p:nvPr/>
+        </p:nvCxnSpPr>
+        <p:spPr>
+          <a:xfrm rot="10800000" flipH="1" flipV="1">
+            <a:off x="650420" y="2612571"/>
+            <a:ext cx="1925865" cy="1676401"/>
+          </a:xfrm>
+          <a:prstGeom prst="bentConnector3">
+            <a:avLst>
+              <a:gd name="adj1" fmla="val -11870"/>
+            </a:avLst>
+          </a:prstGeom>
+          <a:ln w="57150">
+            <a:headEnd type="none" w="med" len="med"/>
+            <a:tailEnd type="triangle" w="med" len="med"/>
+          </a:ln>
+        </p:spPr>
+        <p:style>
+          <a:lnRef idx="1">
+            <a:schemeClr val="dk1"/>
+          </a:lnRef>
+          <a:fillRef idx="0">
+            <a:schemeClr val="dk1"/>
+          </a:fillRef>
+          <a:effectRef idx="0">
+            <a:schemeClr val="dk1"/>
+          </a:effectRef>
+          <a:fontRef idx="minor">
+            <a:schemeClr val="tx1"/>
+          </a:fontRef>
+        </p:style>
+      </p:cxnSp>
+      <p:cxnSp>
+        <p:nvCxnSpPr>
+          <p:cNvPr id="22" name="直線接點 20"/>
+          <p:cNvCxnSpPr>
+            <a:stCxn id="6" idx="2"/>
+            <a:endCxn id="8" idx="1"/>
+          </p:cNvCxnSpPr>
+          <p:nvPr/>
+        </p:nvCxnSpPr>
+        <p:spPr>
+          <a:xfrm rot="16200000" flipH="1">
+            <a:off x="1791153" y="3503839"/>
+            <a:ext cx="1081315" cy="488951"/>
+          </a:xfrm>
+          <a:prstGeom prst="bentConnector2">
+            <a:avLst/>
+          </a:prstGeom>
+          <a:ln w="76200">
+            <a:headEnd type="none" w="med" len="med"/>
+            <a:tailEnd type="triangle" w="med" len="med"/>
+          </a:ln>
+        </p:spPr>
+        <p:style>
+          <a:lnRef idx="1">
+            <a:schemeClr val="dk1"/>
+          </a:lnRef>
+          <a:fillRef idx="0">
+            <a:schemeClr val="dk1"/>
+          </a:fillRef>
+          <a:effectRef idx="0">
+            <a:schemeClr val="dk1"/>
+          </a:effectRef>
+          <a:fontRef idx="minor">
+            <a:schemeClr val="tx1"/>
+          </a:fontRef>
+        </p:style>
+      </p:cxnSp>
     </p:spTree>
     <p:extLst>
       <p:ext uri="{BB962C8B-B14F-4D97-AF65-F5344CB8AC3E}">
@@ -7770,7 +7846,7 @@
           <a:p>
             <a:fld id="{C60B81E8-7334-464F-8B48-45CA70843E0C}" type="datetime1">
               <a:rPr lang="zh-TW" altLang="en-US" smtClean="0"/>
-              <a:t>2015/11/15</a:t>
+              <a:t>2015/11/16</a:t>
             </a:fld>
             <a:endParaRPr lang="zh-TW" altLang="en-US"/>
           </a:p>
@@ -7894,7 +7970,7 @@
           <a:p>
             <a:fld id="{C11F5D98-A40D-4F6A-B778-B48D2F7EC464}" type="datetime1">
               <a:rPr lang="zh-TW" altLang="en-US" smtClean="0"/>
-              <a:t>2015/11/15</a:t>
+              <a:t>2015/11/16</a:t>
             </a:fld>
             <a:endParaRPr lang="zh-TW" altLang="en-US"/>
           </a:p>

</xml_diff>

<commit_message>
Rewrite the processNodesInSlide function
</commit_message>
<xml_diff>
--- a/files/test.pptx
+++ b/files/test.pptx
@@ -426,11 +426,11 @@
         </c:dLbls>
         <c:marker val="1"/>
         <c:smooth val="0"/>
-        <c:axId val="1037267824"/>
-        <c:axId val="1037262928"/>
+        <c:axId val="-1777274112"/>
+        <c:axId val="-1777273568"/>
       </c:lineChart>
       <c:catAx>
-        <c:axId val="1037267824"/>
+        <c:axId val="-1777274112"/>
         <c:scaling>
           <c:orientation val="minMax"/>
         </c:scaling>
@@ -473,7 +473,7 @@
             <a:endParaRPr lang="zh-TW"/>
           </a:p>
         </c:txPr>
-        <c:crossAx val="1037262928"/>
+        <c:crossAx val="-1777273568"/>
         <c:crosses val="autoZero"/>
         <c:auto val="1"/>
         <c:lblAlgn val="ctr"/>
@@ -481,7 +481,7 @@
         <c:noMultiLvlLbl val="0"/>
       </c:catAx>
       <c:valAx>
-        <c:axId val="1037262928"/>
+        <c:axId val="-1777273568"/>
         <c:scaling>
           <c:orientation val="minMax"/>
         </c:scaling>
@@ -532,7 +532,7 @@
             <a:endParaRPr lang="zh-TW"/>
           </a:p>
         </c:txPr>
-        <c:crossAx val="1037267824"/>
+        <c:crossAx val="-1777274112"/>
         <c:crosses val="autoZero"/>
         <c:crossBetween val="between"/>
       </c:valAx>
@@ -1227,7 +1227,7 @@
           <a:p>
             <a:fld id="{F80196F6-7584-4650-82DD-1A823E372E93}" type="datetimeFigureOut">
               <a:rPr lang="zh-TW" altLang="en-US" smtClean="0"/>
-              <a:t>2015/11/16</a:t>
+              <a:t>2015/11/22</a:t>
             </a:fld>
             <a:endParaRPr lang="zh-TW" altLang="en-US"/>
           </a:p>
@@ -1710,7 +1710,7 @@
           <a:p>
             <a:fld id="{E7A87A2D-0523-400E-8364-8FCFDAAEE150}" type="datetime1">
               <a:rPr lang="zh-TW" altLang="en-US" smtClean="0"/>
-              <a:t>2015/11/16</a:t>
+              <a:t>2015/11/22</a:t>
             </a:fld>
             <a:endParaRPr lang="zh-TW" altLang="en-US"/>
           </a:p>
@@ -1880,7 +1880,7 @@
           <a:p>
             <a:fld id="{4470E85D-BD6F-4D26-B110-7E28230C593F}" type="datetime1">
               <a:rPr lang="zh-TW" altLang="en-US" smtClean="0"/>
-              <a:t>2015/11/16</a:t>
+              <a:t>2015/11/22</a:t>
             </a:fld>
             <a:endParaRPr lang="zh-TW" altLang="en-US"/>
           </a:p>
@@ -2060,7 +2060,7 @@
           <a:p>
             <a:fld id="{D6E993F5-55DB-4F1A-9A97-9192FB5AEB42}" type="datetime1">
               <a:rPr lang="zh-TW" altLang="en-US" smtClean="0"/>
-              <a:t>2015/11/16</a:t>
+              <a:t>2015/11/22</a:t>
             </a:fld>
             <a:endParaRPr lang="zh-TW" altLang="en-US"/>
           </a:p>
@@ -2230,7 +2230,7 @@
           <a:p>
             <a:fld id="{C60B81E8-7334-464F-8B48-45CA70843E0C}" type="datetime1">
               <a:rPr lang="zh-TW" altLang="en-US" smtClean="0"/>
-              <a:t>2015/11/16</a:t>
+              <a:t>2015/11/22</a:t>
             </a:fld>
             <a:endParaRPr lang="zh-TW" altLang="en-US"/>
           </a:p>
@@ -2474,7 +2474,7 @@
           <a:p>
             <a:fld id="{D47ED321-95FB-497B-BD7E-3BD909DE64AD}" type="datetime1">
               <a:rPr lang="zh-TW" altLang="en-US" smtClean="0"/>
-              <a:t>2015/11/16</a:t>
+              <a:t>2015/11/22</a:t>
             </a:fld>
             <a:endParaRPr lang="zh-TW" altLang="en-US"/>
           </a:p>
@@ -2706,7 +2706,7 @@
           <a:p>
             <a:fld id="{497E4E27-12DC-43A4-A531-93F92B4B5AEB}" type="datetime1">
               <a:rPr lang="zh-TW" altLang="en-US" smtClean="0"/>
-              <a:t>2015/11/16</a:t>
+              <a:t>2015/11/22</a:t>
             </a:fld>
             <a:endParaRPr lang="zh-TW" altLang="en-US"/>
           </a:p>
@@ -3073,7 +3073,7 @@
           <a:p>
             <a:fld id="{C11F5D98-A40D-4F6A-B778-B48D2F7EC464}" type="datetime1">
               <a:rPr lang="zh-TW" altLang="en-US" smtClean="0"/>
-              <a:t>2015/11/16</a:t>
+              <a:t>2015/11/22</a:t>
             </a:fld>
             <a:endParaRPr lang="zh-TW" altLang="en-US"/>
           </a:p>
@@ -3191,7 +3191,7 @@
           <a:p>
             <a:fld id="{37540F8D-04B0-4510-8208-7A8AB7D75261}" type="datetime1">
               <a:rPr lang="zh-TW" altLang="en-US" smtClean="0"/>
-              <a:t>2015/11/16</a:t>
+              <a:t>2015/11/22</a:t>
             </a:fld>
             <a:endParaRPr lang="zh-TW" altLang="en-US"/>
           </a:p>
@@ -3286,7 +3286,7 @@
           <a:p>
             <a:fld id="{ED8E83AE-CBBB-4AB3-9A7C-32D18F7AB593}" type="datetime1">
               <a:rPr lang="zh-TW" altLang="en-US" smtClean="0"/>
-              <a:t>2015/11/16</a:t>
+              <a:t>2015/11/22</a:t>
             </a:fld>
             <a:endParaRPr lang="zh-TW" altLang="en-US"/>
           </a:p>
@@ -3563,7 +3563,7 @@
           <a:p>
             <a:fld id="{CF1BA43A-76D7-43A7-8042-3520281B1840}" type="datetime1">
               <a:rPr lang="zh-TW" altLang="en-US" smtClean="0"/>
-              <a:t>2015/11/16</a:t>
+              <a:t>2015/11/22</a:t>
             </a:fld>
             <a:endParaRPr lang="zh-TW" altLang="en-US"/>
           </a:p>
@@ -3820,7 +3820,7 @@
           <a:p>
             <a:fld id="{BB28C0ED-AAF8-4DB2-AF56-EE0DC21174BB}" type="datetime1">
               <a:rPr lang="zh-TW" altLang="en-US" smtClean="0"/>
-              <a:t>2015/11/16</a:t>
+              <a:t>2015/11/22</a:t>
             </a:fld>
             <a:endParaRPr lang="zh-TW" altLang="en-US"/>
           </a:p>
@@ -4033,7 +4033,7 @@
           <a:p>
             <a:fld id="{991B9CC3-7329-43C8-BC56-DBF8F15634F0}" type="datetime1">
               <a:rPr lang="zh-TW" altLang="en-US" smtClean="0"/>
-              <a:t>2015/11/16</a:t>
+              <a:t>2015/11/22</a:t>
             </a:fld>
             <a:endParaRPr lang="zh-TW" altLang="en-US"/>
           </a:p>
@@ -4502,7 +4502,7 @@
           <a:p>
             <a:fld id="{E49FC7B0-3E75-4441-B63F-4CC3A5531728}" type="datetime1">
               <a:rPr lang="zh-TW" altLang="en-US" smtClean="0"/>
-              <a:t>2015/11/16</a:t>
+              <a:t>2015/11/22</a:t>
             </a:fld>
             <a:endParaRPr lang="zh-TW" altLang="en-US"/>
           </a:p>
@@ -4636,7 +4636,7 @@
           <a:p>
             <a:fld id="{7D259E43-2377-4BD5-9EF1-8A04A4F66F0C}" type="datetime1">
               <a:rPr lang="zh-TW" altLang="en-US" smtClean="0"/>
-              <a:t>2015/11/16</a:t>
+              <a:t>2015/11/22</a:t>
             </a:fld>
             <a:endParaRPr lang="zh-TW" altLang="en-US"/>
           </a:p>
@@ -4771,7 +4771,7 @@
           <a:p>
             <a:fld id="{3E86548D-D54C-4064-8B18-89FB2D942122}" type="datetime1">
               <a:rPr lang="zh-TW" altLang="en-US" smtClean="0"/>
-              <a:t>2015/11/16</a:t>
+              <a:t>2015/11/22</a:t>
             </a:fld>
             <a:endParaRPr lang="zh-TW" altLang="en-US"/>
           </a:p>
@@ -5250,7 +5250,7 @@
           <a:p>
             <a:fld id="{94FA48B1-D508-49FA-BBA0-5047EEF68D44}" type="datetime1">
               <a:rPr lang="zh-TW" altLang="en-US" smtClean="0"/>
-              <a:t>2015/11/16</a:t>
+              <a:t>2015/11/22</a:t>
             </a:fld>
             <a:endParaRPr lang="zh-TW" altLang="en-US"/>
           </a:p>
@@ -5486,7 +5486,7 @@
           <a:p>
             <a:fld id="{E0EFF268-3616-48FD-9778-BBA6A4676333}" type="datetime1">
               <a:rPr lang="zh-TW" altLang="en-US" smtClean="0"/>
-              <a:t>2015/11/16</a:t>
+              <a:t>2015/11/22</a:t>
             </a:fld>
             <a:endParaRPr lang="zh-TW" altLang="en-US"/>
           </a:p>
@@ -6042,7 +6042,7 @@
         <p:grpSpPr>
           <a:xfrm>
             <a:off x="247879" y="5389099"/>
-            <a:ext cx="7447403" cy="1046602"/>
+            <a:ext cx="8896121" cy="1046602"/>
             <a:chOff x="920870" y="2147591"/>
             <a:chExt cx="7447403" cy="1046602"/>
           </a:xfrm>
@@ -6166,175 +6166,6 @@
                 <a:t>上 右</a:t>
               </a:r>
               <a:endParaRPr lang="zh-TW" altLang="en-US" dirty="0"/>
-            </a:p>
-          </p:txBody>
-        </p:sp>
-      </p:grpSp>
-      <p:grpSp>
-        <p:nvGrpSpPr>
-          <p:cNvPr id="11" name="群組 10"/>
-          <p:cNvGrpSpPr/>
-          <p:nvPr/>
-        </p:nvGrpSpPr>
-        <p:grpSpPr>
-          <a:xfrm>
-            <a:off x="0" y="5760000"/>
-            <a:ext cx="7447404" cy="1046602"/>
-            <a:chOff x="848297" y="4259857"/>
-            <a:chExt cx="7447404" cy="1046602"/>
-          </a:xfrm>
-        </p:grpSpPr>
-        <p:sp>
-          <p:nvSpPr>
-            <p:cNvPr id="9" name="文字方塊 8"/>
-            <p:cNvSpPr txBox="1"/>
-            <p:nvPr/>
-          </p:nvSpPr>
-          <p:spPr>
-            <a:xfrm>
-              <a:off x="3514381" y="4259857"/>
-              <a:ext cx="2115239" cy="1046602"/>
-            </a:xfrm>
-            <a:prstGeom prst="rect">
-              <a:avLst/>
-            </a:prstGeom>
-            <a:solidFill>
-              <a:schemeClr val="accent4">
-                <a:lumMod val="20000"/>
-                <a:lumOff val="80000"/>
-              </a:schemeClr>
-            </a:solidFill>
-            <a:ln w="38100">
-              <a:solidFill>
-                <a:schemeClr val="tx1"/>
-              </a:solidFill>
-              <a:prstDash val="lgDashDotDot"/>
-            </a:ln>
-          </p:spPr>
-          <p:txBody>
-            <a:bodyPr wrap="square" rtlCol="0" anchor="b">
-              <a:noAutofit/>
-            </a:bodyPr>
-            <a:lstStyle/>
-            <a:p>
-              <a:pPr algn="ctr"/>
-              <a:r>
-                <a:rPr lang="zh-TW" altLang="en-US" b="1" dirty="0" smtClean="0"/>
-                <a:t>下 中</a:t>
-              </a:r>
-              <a:endParaRPr lang="zh-TW" altLang="en-US" b="1" dirty="0"/>
-            </a:p>
-          </p:txBody>
-        </p:sp>
-        <p:sp>
-          <p:nvSpPr>
-            <p:cNvPr id="10" name="文字方塊 9"/>
-            <p:cNvSpPr txBox="1"/>
-            <p:nvPr/>
-          </p:nvSpPr>
-          <p:spPr>
-            <a:xfrm>
-              <a:off x="6180462" y="4259857"/>
-              <a:ext cx="2115239" cy="1046602"/>
-            </a:xfrm>
-            <a:prstGeom prst="rect">
-              <a:avLst/>
-            </a:prstGeom>
-            <a:gradFill flip="none" rotWithShape="1">
-              <a:gsLst>
-                <a:gs pos="0">
-                  <a:schemeClr val="accent4">
-                    <a:lumMod val="20000"/>
-                    <a:lumOff val="80000"/>
-                    <a:shade val="30000"/>
-                    <a:satMod val="115000"/>
-                  </a:schemeClr>
-                </a:gs>
-                <a:gs pos="50000">
-                  <a:schemeClr val="accent4">
-                    <a:lumMod val="20000"/>
-                    <a:lumOff val="80000"/>
-                    <a:shade val="67500"/>
-                    <a:satMod val="115000"/>
-                  </a:schemeClr>
-                </a:gs>
-                <a:gs pos="100000">
-                  <a:schemeClr val="accent4">
-                    <a:lumMod val="20000"/>
-                    <a:lumOff val="80000"/>
-                    <a:shade val="100000"/>
-                    <a:satMod val="115000"/>
-                  </a:schemeClr>
-                </a:gs>
-              </a:gsLst>
-              <a:path path="circle">
-                <a:fillToRect l="50000" t="50000" r="50000" b="50000"/>
-              </a:path>
-              <a:tileRect/>
-            </a:gradFill>
-            <a:ln w="57150">
-              <a:solidFill>
-                <a:schemeClr val="tx1"/>
-              </a:solidFill>
-              <a:prstDash val="dash"/>
-            </a:ln>
-          </p:spPr>
-          <p:txBody>
-            <a:bodyPr wrap="square" rtlCol="0" anchor="b">
-              <a:noAutofit/>
-            </a:bodyPr>
-            <a:lstStyle/>
-            <a:p>
-              <a:pPr algn="r"/>
-              <a:r>
-                <a:rPr lang="zh-TW" altLang="en-US" dirty="0" smtClean="0"/>
-                <a:t>下 </a:t>
-              </a:r>
-              <a:r>
-                <a:rPr lang="zh-TW" altLang="en-US" dirty="0"/>
-                <a:t>右</a:t>
-              </a:r>
-            </a:p>
-          </p:txBody>
-        </p:sp>
-        <p:sp>
-          <p:nvSpPr>
-            <p:cNvPr id="8" name="文字方塊 7"/>
-            <p:cNvSpPr txBox="1"/>
-            <p:nvPr/>
-          </p:nvSpPr>
-          <p:spPr>
-            <a:xfrm>
-              <a:off x="848297" y="4259857"/>
-              <a:ext cx="2115239" cy="1046602"/>
-            </a:xfrm>
-            <a:prstGeom prst="rect">
-              <a:avLst/>
-            </a:prstGeom>
-            <a:solidFill>
-              <a:schemeClr val="accent4">
-                <a:lumMod val="20000"/>
-                <a:lumOff val="80000"/>
-              </a:schemeClr>
-            </a:solidFill>
-            <a:ln w="12700">
-              <a:solidFill>
-                <a:schemeClr val="tx1"/>
-              </a:solidFill>
-              <a:prstDash val="lgDashDot"/>
-            </a:ln>
-          </p:spPr>
-          <p:txBody>
-            <a:bodyPr wrap="square" rtlCol="0" anchor="b">
-              <a:noAutofit/>
-            </a:bodyPr>
-            <a:lstStyle/>
-            <a:p>
-              <a:r>
-                <a:rPr lang="zh-TW" altLang="en-US" i="1" dirty="0" smtClean="0"/>
-                <a:t>下 左</a:t>
-              </a:r>
-              <a:endParaRPr lang="zh-TW" altLang="en-US" i="1" dirty="0"/>
             </a:p>
           </p:txBody>
         </p:sp>
@@ -6475,6 +6306,289 @@
             </a:p>
           </p:txBody>
         </p:sp>
+      </p:grpSp>
+      <p:grpSp>
+        <p:nvGrpSpPr>
+          <p:cNvPr id="17" name="群組 16"/>
+          <p:cNvGrpSpPr/>
+          <p:nvPr/>
+        </p:nvGrpSpPr>
+        <p:grpSpPr>
+          <a:xfrm>
+            <a:off x="1" y="4548970"/>
+            <a:ext cx="5782020" cy="2257632"/>
+            <a:chOff x="0" y="3803495"/>
+            <a:chExt cx="7691255" cy="3003107"/>
+          </a:xfrm>
+        </p:grpSpPr>
+        <p:grpSp>
+          <p:nvGrpSpPr>
+            <p:cNvPr id="11" name="群組 10"/>
+            <p:cNvGrpSpPr/>
+            <p:nvPr/>
+          </p:nvGrpSpPr>
+          <p:grpSpPr>
+            <a:xfrm>
+              <a:off x="0" y="3803495"/>
+              <a:ext cx="7447404" cy="3003107"/>
+              <a:chOff x="848297" y="4259857"/>
+              <a:chExt cx="7447404" cy="1046602"/>
+            </a:xfrm>
+          </p:grpSpPr>
+          <p:sp>
+            <p:nvSpPr>
+              <p:cNvPr id="9" name="文字方塊 8"/>
+              <p:cNvSpPr txBox="1"/>
+              <p:nvPr/>
+            </p:nvSpPr>
+            <p:spPr>
+              <a:xfrm>
+                <a:off x="3514381" y="4259857"/>
+                <a:ext cx="2115239" cy="1046602"/>
+              </a:xfrm>
+              <a:prstGeom prst="rect">
+                <a:avLst/>
+              </a:prstGeom>
+              <a:solidFill>
+                <a:srgbClr val="0066FF"/>
+              </a:solidFill>
+              <a:ln w="38100">
+                <a:solidFill>
+                  <a:schemeClr val="tx1"/>
+                </a:solidFill>
+                <a:prstDash val="lgDashDotDot"/>
+              </a:ln>
+            </p:spPr>
+            <p:txBody>
+              <a:bodyPr wrap="square" rtlCol="0" anchor="b">
+                <a:noAutofit/>
+              </a:bodyPr>
+              <a:lstStyle/>
+              <a:p>
+                <a:pPr algn="ctr"/>
+                <a:r>
+                  <a:rPr lang="zh-TW" altLang="en-US" b="1" dirty="0" smtClean="0"/>
+                  <a:t>下 中</a:t>
+                </a:r>
+                <a:endParaRPr lang="zh-TW" altLang="en-US" b="1" dirty="0"/>
+              </a:p>
+            </p:txBody>
+          </p:sp>
+          <p:sp>
+            <p:nvSpPr>
+              <p:cNvPr id="10" name="文字方塊 9"/>
+              <p:cNvSpPr txBox="1"/>
+              <p:nvPr/>
+            </p:nvSpPr>
+            <p:spPr>
+              <a:xfrm>
+                <a:off x="6180462" y="4259857"/>
+                <a:ext cx="2115239" cy="1046602"/>
+              </a:xfrm>
+              <a:prstGeom prst="rect">
+                <a:avLst/>
+              </a:prstGeom>
+              <a:solidFill>
+                <a:srgbClr val="FFC000"/>
+              </a:solidFill>
+              <a:ln w="57150">
+                <a:solidFill>
+                  <a:schemeClr val="tx1"/>
+                </a:solidFill>
+                <a:prstDash val="dash"/>
+              </a:ln>
+            </p:spPr>
+            <p:txBody>
+              <a:bodyPr wrap="square" rtlCol="0" anchor="b">
+                <a:noAutofit/>
+              </a:bodyPr>
+              <a:lstStyle/>
+              <a:p>
+                <a:pPr algn="r"/>
+                <a:r>
+                  <a:rPr lang="zh-TW" altLang="en-US" dirty="0" smtClean="0"/>
+                  <a:t>下 </a:t>
+                </a:r>
+                <a:r>
+                  <a:rPr lang="zh-TW" altLang="en-US" dirty="0"/>
+                  <a:t>右</a:t>
+                </a:r>
+              </a:p>
+            </p:txBody>
+          </p:sp>
+          <p:sp>
+            <p:nvSpPr>
+              <p:cNvPr id="8" name="文字方塊 7"/>
+              <p:cNvSpPr txBox="1"/>
+              <p:nvPr/>
+            </p:nvSpPr>
+            <p:spPr>
+              <a:xfrm>
+                <a:off x="848297" y="4259857"/>
+                <a:ext cx="2115239" cy="1046602"/>
+              </a:xfrm>
+              <a:prstGeom prst="rect">
+                <a:avLst/>
+              </a:prstGeom>
+              <a:solidFill>
+                <a:srgbClr val="FF0000"/>
+              </a:solidFill>
+              <a:ln w="12700">
+                <a:solidFill>
+                  <a:schemeClr val="tx1"/>
+                </a:solidFill>
+                <a:prstDash val="lgDashDot"/>
+              </a:ln>
+            </p:spPr>
+            <p:txBody>
+              <a:bodyPr wrap="square" rtlCol="0" anchor="b">
+                <a:noAutofit/>
+              </a:bodyPr>
+              <a:lstStyle/>
+              <a:p>
+                <a:r>
+                  <a:rPr lang="zh-TW" altLang="en-US" i="1" dirty="0" smtClean="0"/>
+                  <a:t>下 左</a:t>
+                </a:r>
+                <a:endParaRPr lang="zh-TW" altLang="en-US" i="1" dirty="0"/>
+              </a:p>
+            </p:txBody>
+          </p:sp>
+        </p:grpSp>
+        <p:grpSp>
+          <p:nvGrpSpPr>
+            <p:cNvPr id="39" name="群組 38"/>
+            <p:cNvGrpSpPr/>
+            <p:nvPr/>
+          </p:nvGrpSpPr>
+          <p:grpSpPr>
+            <a:xfrm>
+              <a:off x="243851" y="4470794"/>
+              <a:ext cx="7447404" cy="1885557"/>
+              <a:chOff x="848297" y="4259857"/>
+              <a:chExt cx="7447404" cy="1046602"/>
+            </a:xfrm>
+          </p:grpSpPr>
+          <p:sp>
+            <p:nvSpPr>
+              <p:cNvPr id="40" name="文字方塊 39"/>
+              <p:cNvSpPr txBox="1"/>
+              <p:nvPr/>
+            </p:nvSpPr>
+            <p:spPr>
+              <a:xfrm>
+                <a:off x="3514381" y="4259857"/>
+                <a:ext cx="2115239" cy="1046602"/>
+              </a:xfrm>
+              <a:prstGeom prst="rect">
+                <a:avLst/>
+              </a:prstGeom>
+              <a:solidFill>
+                <a:srgbClr val="FF0000"/>
+              </a:solidFill>
+              <a:ln w="38100">
+                <a:solidFill>
+                  <a:schemeClr val="tx1"/>
+                </a:solidFill>
+                <a:prstDash val="lgDashDotDot"/>
+              </a:ln>
+            </p:spPr>
+            <p:txBody>
+              <a:bodyPr wrap="square" rtlCol="0" anchor="b">
+                <a:noAutofit/>
+              </a:bodyPr>
+              <a:lstStyle/>
+              <a:p>
+                <a:pPr algn="ctr"/>
+                <a:r>
+                  <a:rPr lang="zh-TW" altLang="en-US" b="1" dirty="0" smtClean="0"/>
+                  <a:t>下 中</a:t>
+                </a:r>
+                <a:endParaRPr lang="zh-TW" altLang="en-US" b="1" dirty="0"/>
+              </a:p>
+            </p:txBody>
+          </p:sp>
+          <p:sp>
+            <p:nvSpPr>
+              <p:cNvPr id="41" name="文字方塊 40"/>
+              <p:cNvSpPr txBox="1"/>
+              <p:nvPr/>
+            </p:nvSpPr>
+            <p:spPr>
+              <a:xfrm>
+                <a:off x="6180462" y="4259857"/>
+                <a:ext cx="2115239" cy="1046602"/>
+              </a:xfrm>
+              <a:prstGeom prst="rect">
+                <a:avLst/>
+              </a:prstGeom>
+              <a:solidFill>
+                <a:srgbClr val="0000FF"/>
+              </a:solidFill>
+              <a:ln w="57150">
+                <a:solidFill>
+                  <a:schemeClr val="tx1"/>
+                </a:solidFill>
+                <a:prstDash val="dash"/>
+              </a:ln>
+            </p:spPr>
+            <p:txBody>
+              <a:bodyPr wrap="square" rtlCol="0" anchor="b">
+                <a:noAutofit/>
+              </a:bodyPr>
+              <a:lstStyle/>
+              <a:p>
+                <a:pPr algn="r"/>
+                <a:r>
+                  <a:rPr lang="zh-TW" altLang="en-US" dirty="0" smtClean="0"/>
+                  <a:t>下 </a:t>
+                </a:r>
+                <a:r>
+                  <a:rPr lang="zh-TW" altLang="en-US" dirty="0"/>
+                  <a:t>右</a:t>
+                </a:r>
+              </a:p>
+            </p:txBody>
+          </p:sp>
+          <p:sp>
+            <p:nvSpPr>
+              <p:cNvPr id="42" name="文字方塊 41"/>
+              <p:cNvSpPr txBox="1"/>
+              <p:nvPr/>
+            </p:nvSpPr>
+            <p:spPr>
+              <a:xfrm>
+                <a:off x="848297" y="4259857"/>
+                <a:ext cx="2115239" cy="1046602"/>
+              </a:xfrm>
+              <a:prstGeom prst="rect">
+                <a:avLst/>
+              </a:prstGeom>
+              <a:solidFill>
+                <a:srgbClr val="FFC000"/>
+              </a:solidFill>
+              <a:ln w="12700">
+                <a:solidFill>
+                  <a:schemeClr val="tx1"/>
+                </a:solidFill>
+                <a:prstDash val="lgDashDot"/>
+              </a:ln>
+            </p:spPr>
+            <p:txBody>
+              <a:bodyPr wrap="square" rtlCol="0" anchor="b">
+                <a:noAutofit/>
+              </a:bodyPr>
+              <a:lstStyle/>
+              <a:p>
+                <a:r>
+                  <a:rPr lang="zh-TW" altLang="en-US" i="1" dirty="0" smtClean="0"/>
+                  <a:t>下 左</a:t>
+                </a:r>
+                <a:endParaRPr lang="zh-TW" altLang="en-US" i="1" dirty="0"/>
+              </a:p>
+            </p:txBody>
+          </p:sp>
+        </p:grpSp>
       </p:grpSp>
     </p:spTree>
     <p:extLst>
@@ -6791,7 +6905,7 @@
           <a:p>
             <a:fld id="{5A0B17C9-1A35-4216-82FA-299D192A2D4E}" type="datetime1">
               <a:rPr lang="zh-TW" altLang="en-US" smtClean="0"/>
-              <a:t>2015/11/16</a:t>
+              <a:t>2015/11/22</a:t>
             </a:fld>
             <a:endParaRPr lang="zh-TW" altLang="en-US"/>
           </a:p>
@@ -6890,7 +7004,7 @@
           <a:p>
             <a:fld id="{C60B81E8-7334-464F-8B48-45CA70843E0C}" type="datetime1">
               <a:rPr lang="zh-TW" altLang="en-US" smtClean="0"/>
-              <a:t>2015/11/16</a:t>
+              <a:t>2015/11/22</a:t>
             </a:fld>
             <a:endParaRPr lang="zh-TW" altLang="en-US"/>
           </a:p>
@@ -7846,7 +7960,7 @@
           <a:p>
             <a:fld id="{C60B81E8-7334-464F-8B48-45CA70843E0C}" type="datetime1">
               <a:rPr lang="zh-TW" altLang="en-US" smtClean="0"/>
-              <a:t>2015/11/16</a:t>
+              <a:t>2015/11/22</a:t>
             </a:fld>
             <a:endParaRPr lang="zh-TW" altLang="en-US"/>
           </a:p>
@@ -7970,7 +8084,7 @@
           <a:p>
             <a:fld id="{C11F5D98-A40D-4F6A-B778-B48D2F7EC464}" type="datetime1">
               <a:rPr lang="zh-TW" altLang="en-US" smtClean="0"/>
-              <a:t>2015/11/16</a:t>
+              <a:t>2015/11/22</a:t>
             </a:fld>
             <a:endParaRPr lang="zh-TW" altLang="en-US"/>
           </a:p>

</xml_diff>

<commit_message>
Fix the xml parser bug
[Debug] Initial the node_attributes to empty Array
[Feature] Support table span
</commit_message>
<xml_diff>
--- a/files/test.pptx
+++ b/files/test.pptx
@@ -5,18 +5,19 @@
     <p:sldMasterId id="2147483660" r:id="rId1"/>
   </p:sldMasterIdLst>
   <p:notesMasterIdLst>
-    <p:notesMasterId r:id="rId11"/>
+    <p:notesMasterId r:id="rId12"/>
   </p:notesMasterIdLst>
   <p:sldIdLst>
     <p:sldId id="256" r:id="rId2"/>
     <p:sldId id="257" r:id="rId3"/>
     <p:sldId id="258" r:id="rId4"/>
-    <p:sldId id="259" r:id="rId5"/>
-    <p:sldId id="260" r:id="rId6"/>
-    <p:sldId id="261" r:id="rId7"/>
-    <p:sldId id="262" r:id="rId8"/>
-    <p:sldId id="263" r:id="rId9"/>
-    <p:sldId id="264" r:id="rId10"/>
+    <p:sldId id="265" r:id="rId5"/>
+    <p:sldId id="259" r:id="rId6"/>
+    <p:sldId id="260" r:id="rId7"/>
+    <p:sldId id="261" r:id="rId8"/>
+    <p:sldId id="262" r:id="rId9"/>
+    <p:sldId id="263" r:id="rId10"/>
+    <p:sldId id="264" r:id="rId11"/>
   </p:sldIdLst>
   <p:sldSz cx="9144000" cy="6858000" type="screen4x3"/>
   <p:notesSz cx="6858000" cy="9144000"/>
@@ -426,11 +427,11 @@
         </c:dLbls>
         <c:marker val="1"/>
         <c:smooth val="0"/>
-        <c:axId val="-1777274112"/>
-        <c:axId val="-1777273568"/>
+        <c:axId val="-1818367952"/>
+        <c:axId val="-1818371216"/>
       </c:lineChart>
       <c:catAx>
-        <c:axId val="-1777274112"/>
+        <c:axId val="-1818367952"/>
         <c:scaling>
           <c:orientation val="minMax"/>
         </c:scaling>
@@ -473,7 +474,7 @@
             <a:endParaRPr lang="zh-TW"/>
           </a:p>
         </c:txPr>
-        <c:crossAx val="-1777273568"/>
+        <c:crossAx val="-1818371216"/>
         <c:crosses val="autoZero"/>
         <c:auto val="1"/>
         <c:lblAlgn val="ctr"/>
@@ -481,7 +482,7 @@
         <c:noMultiLvlLbl val="0"/>
       </c:catAx>
       <c:valAx>
-        <c:axId val="-1777273568"/>
+        <c:axId val="-1818371216"/>
         <c:scaling>
           <c:orientation val="minMax"/>
         </c:scaling>
@@ -532,7 +533,7 @@
             <a:endParaRPr lang="zh-TW"/>
           </a:p>
         </c:txPr>
-        <c:crossAx val="-1777274112"/>
+        <c:crossAx val="-1818367952"/>
         <c:crosses val="autoZero"/>
         <c:crossBetween val="between"/>
       </c:valAx>
@@ -1227,7 +1228,7 @@
           <a:p>
             <a:fld id="{F80196F6-7584-4650-82DD-1A823E372E93}" type="datetimeFigureOut">
               <a:rPr lang="zh-TW" altLang="en-US" smtClean="0"/>
-              <a:t>2015/11/22</a:t>
+              <a:t>2015/11/24</a:t>
             </a:fld>
             <a:endParaRPr lang="zh-TW" altLang="en-US"/>
           </a:p>
@@ -1710,7 +1711,7 @@
           <a:p>
             <a:fld id="{E7A87A2D-0523-400E-8364-8FCFDAAEE150}" type="datetime1">
               <a:rPr lang="zh-TW" altLang="en-US" smtClean="0"/>
-              <a:t>2015/11/22</a:t>
+              <a:t>2015/11/24</a:t>
             </a:fld>
             <a:endParaRPr lang="zh-TW" altLang="en-US"/>
           </a:p>
@@ -1880,7 +1881,7 @@
           <a:p>
             <a:fld id="{4470E85D-BD6F-4D26-B110-7E28230C593F}" type="datetime1">
               <a:rPr lang="zh-TW" altLang="en-US" smtClean="0"/>
-              <a:t>2015/11/22</a:t>
+              <a:t>2015/11/24</a:t>
             </a:fld>
             <a:endParaRPr lang="zh-TW" altLang="en-US"/>
           </a:p>
@@ -2060,7 +2061,7 @@
           <a:p>
             <a:fld id="{D6E993F5-55DB-4F1A-9A97-9192FB5AEB42}" type="datetime1">
               <a:rPr lang="zh-TW" altLang="en-US" smtClean="0"/>
-              <a:t>2015/11/22</a:t>
+              <a:t>2015/11/24</a:t>
             </a:fld>
             <a:endParaRPr lang="zh-TW" altLang="en-US"/>
           </a:p>
@@ -2230,7 +2231,7 @@
           <a:p>
             <a:fld id="{C60B81E8-7334-464F-8B48-45CA70843E0C}" type="datetime1">
               <a:rPr lang="zh-TW" altLang="en-US" smtClean="0"/>
-              <a:t>2015/11/22</a:t>
+              <a:t>2015/11/24</a:t>
             </a:fld>
             <a:endParaRPr lang="zh-TW" altLang="en-US"/>
           </a:p>
@@ -2474,7 +2475,7 @@
           <a:p>
             <a:fld id="{D47ED321-95FB-497B-BD7E-3BD909DE64AD}" type="datetime1">
               <a:rPr lang="zh-TW" altLang="en-US" smtClean="0"/>
-              <a:t>2015/11/22</a:t>
+              <a:t>2015/11/24</a:t>
             </a:fld>
             <a:endParaRPr lang="zh-TW" altLang="en-US"/>
           </a:p>
@@ -2706,7 +2707,7 @@
           <a:p>
             <a:fld id="{497E4E27-12DC-43A4-A531-93F92B4B5AEB}" type="datetime1">
               <a:rPr lang="zh-TW" altLang="en-US" smtClean="0"/>
-              <a:t>2015/11/22</a:t>
+              <a:t>2015/11/24</a:t>
             </a:fld>
             <a:endParaRPr lang="zh-TW" altLang="en-US"/>
           </a:p>
@@ -3073,7 +3074,7 @@
           <a:p>
             <a:fld id="{C11F5D98-A40D-4F6A-B778-B48D2F7EC464}" type="datetime1">
               <a:rPr lang="zh-TW" altLang="en-US" smtClean="0"/>
-              <a:t>2015/11/22</a:t>
+              <a:t>2015/11/24</a:t>
             </a:fld>
             <a:endParaRPr lang="zh-TW" altLang="en-US"/>
           </a:p>
@@ -3191,7 +3192,7 @@
           <a:p>
             <a:fld id="{37540F8D-04B0-4510-8208-7A8AB7D75261}" type="datetime1">
               <a:rPr lang="zh-TW" altLang="en-US" smtClean="0"/>
-              <a:t>2015/11/22</a:t>
+              <a:t>2015/11/24</a:t>
             </a:fld>
             <a:endParaRPr lang="zh-TW" altLang="en-US"/>
           </a:p>
@@ -3286,7 +3287,7 @@
           <a:p>
             <a:fld id="{ED8E83AE-CBBB-4AB3-9A7C-32D18F7AB593}" type="datetime1">
               <a:rPr lang="zh-TW" altLang="en-US" smtClean="0"/>
-              <a:t>2015/11/22</a:t>
+              <a:t>2015/11/24</a:t>
             </a:fld>
             <a:endParaRPr lang="zh-TW" altLang="en-US"/>
           </a:p>
@@ -3563,7 +3564,7 @@
           <a:p>
             <a:fld id="{CF1BA43A-76D7-43A7-8042-3520281B1840}" type="datetime1">
               <a:rPr lang="zh-TW" altLang="en-US" smtClean="0"/>
-              <a:t>2015/11/22</a:t>
+              <a:t>2015/11/24</a:t>
             </a:fld>
             <a:endParaRPr lang="zh-TW" altLang="en-US"/>
           </a:p>
@@ -3820,7 +3821,7 @@
           <a:p>
             <a:fld id="{BB28C0ED-AAF8-4DB2-AF56-EE0DC21174BB}" type="datetime1">
               <a:rPr lang="zh-TW" altLang="en-US" smtClean="0"/>
-              <a:t>2015/11/22</a:t>
+              <a:t>2015/11/24</a:t>
             </a:fld>
             <a:endParaRPr lang="zh-TW" altLang="en-US"/>
           </a:p>
@@ -4033,7 +4034,7 @@
           <a:p>
             <a:fld id="{991B9CC3-7329-43C8-BC56-DBF8F15634F0}" type="datetime1">
               <a:rPr lang="zh-TW" altLang="en-US" smtClean="0"/>
-              <a:t>2015/11/22</a:t>
+              <a:t>2015/11/24</a:t>
             </a:fld>
             <a:endParaRPr lang="zh-TW" altLang="en-US"/>
           </a:p>
@@ -4502,7 +4503,7 @@
           <a:p>
             <a:fld id="{E49FC7B0-3E75-4441-B63F-4CC3A5531728}" type="datetime1">
               <a:rPr lang="zh-TW" altLang="en-US" smtClean="0"/>
-              <a:t>2015/11/22</a:t>
+              <a:t>2015/11/24</a:t>
             </a:fld>
             <a:endParaRPr lang="zh-TW" altLang="en-US"/>
           </a:p>
@@ -4535,6 +4536,130 @@
     <p:extLst>
       <p:ext uri="{BB962C8B-B14F-4D97-AF65-F5344CB8AC3E}">
         <p14:creationId xmlns:p14="http://schemas.microsoft.com/office/powerpoint/2010/main" val="3415677241"/>
+      </p:ext>
+    </p:extLst>
+  </p:cSld>
+  <p:clrMapOvr>
+    <a:masterClrMapping/>
+  </p:clrMapOvr>
+</p:sld>
+</file>
+
+<file path=ppt/slides/slide10.xml><?xml version="1.0" encoding="utf-8"?>
+<p:sld xmlns:a="http://schemas.openxmlformats.org/drawingml/2006/main" xmlns:r="http://schemas.openxmlformats.org/officeDocument/2006/relationships" xmlns:p="http://schemas.openxmlformats.org/presentationml/2006/main">
+  <p:cSld>
+    <p:spTree>
+      <p:nvGrpSpPr>
+        <p:cNvPr id="1" name=""/>
+        <p:cNvGrpSpPr/>
+        <p:nvPr/>
+      </p:nvGrpSpPr>
+      <p:grpSpPr>
+        <a:xfrm>
+          <a:off x="0" y="0"/>
+          <a:ext cx="0" cy="0"/>
+          <a:chOff x="0" y="0"/>
+          <a:chExt cx="0" cy="0"/>
+        </a:xfrm>
+      </p:grpSpPr>
+      <p:sp>
+        <p:nvSpPr>
+          <p:cNvPr id="11" name="標題 10"/>
+          <p:cNvSpPr>
+            <a:spLocks noGrp="1"/>
+          </p:cNvSpPr>
+          <p:nvPr>
+            <p:ph type="title"/>
+          </p:nvPr>
+        </p:nvSpPr>
+        <p:spPr/>
+        <p:txBody>
+          <a:bodyPr/>
+          <a:lstStyle/>
+          <a:p>
+            <a:r>
+              <a:rPr lang="zh-TW" altLang="en-US" dirty="0" smtClean="0"/>
+              <a:t>圖表測試</a:t>
+            </a:r>
+            <a:endParaRPr lang="zh-TW" altLang="en-US" dirty="0"/>
+          </a:p>
+        </p:txBody>
+      </p:sp>
+      <p:graphicFrame>
+        <p:nvGraphicFramePr>
+          <p:cNvPr id="23" name="內容版面配置區 22"/>
+          <p:cNvGraphicFramePr>
+            <a:graphicFrameLocks noGrp="1"/>
+          </p:cNvGraphicFramePr>
+          <p:nvPr>
+            <p:ph idx="1"/>
+            <p:extLst>
+              <p:ext uri="{D42A27DB-BD31-4B8C-83A1-F6EECF244321}">
+                <p14:modId xmlns:p14="http://schemas.microsoft.com/office/powerpoint/2010/main" val="415230077"/>
+              </p:ext>
+            </p:extLst>
+          </p:nvPr>
+        </p:nvGraphicFramePr>
+        <p:xfrm>
+          <a:off x="628650" y="1825625"/>
+          <a:ext cx="7886700" cy="4351338"/>
+        </p:xfrm>
+        <a:graphic>
+          <a:graphicData uri="http://schemas.openxmlformats.org/drawingml/2006/chart">
+            <c:chart xmlns:c="http://schemas.openxmlformats.org/drawingml/2006/chart" xmlns:r="http://schemas.openxmlformats.org/officeDocument/2006/relationships" r:id="rId2"/>
+          </a:graphicData>
+        </a:graphic>
+      </p:graphicFrame>
+      <p:sp>
+        <p:nvSpPr>
+          <p:cNvPr id="7" name="日期版面配置區 6"/>
+          <p:cNvSpPr>
+            <a:spLocks noGrp="1"/>
+          </p:cNvSpPr>
+          <p:nvPr>
+            <p:ph type="dt" sz="half" idx="10"/>
+          </p:nvPr>
+        </p:nvSpPr>
+        <p:spPr/>
+        <p:txBody>
+          <a:bodyPr/>
+          <a:lstStyle/>
+          <a:p>
+            <a:fld id="{C11F5D98-A40D-4F6A-B778-B48D2F7EC464}" type="datetime1">
+              <a:rPr lang="zh-TW" altLang="en-US" smtClean="0"/>
+              <a:t>2015/11/24</a:t>
+            </a:fld>
+            <a:endParaRPr lang="zh-TW" altLang="en-US"/>
+          </a:p>
+        </p:txBody>
+      </p:sp>
+      <p:sp>
+        <p:nvSpPr>
+          <p:cNvPr id="8" name="投影片編號版面配置區 7"/>
+          <p:cNvSpPr>
+            <a:spLocks noGrp="1"/>
+          </p:cNvSpPr>
+          <p:nvPr>
+            <p:ph type="sldNum" sz="quarter" idx="12"/>
+          </p:nvPr>
+        </p:nvSpPr>
+        <p:spPr/>
+        <p:txBody>
+          <a:bodyPr/>
+          <a:lstStyle/>
+          <a:p>
+            <a:fld id="{6923F3CB-4711-4FC8-9867-5888834CD7FE}" type="slidenum">
+              <a:rPr lang="zh-TW" altLang="en-US" smtClean="0"/>
+              <a:t>10</a:t>
+            </a:fld>
+            <a:endParaRPr lang="zh-TW" altLang="en-US"/>
+          </a:p>
+        </p:txBody>
+      </p:sp>
+    </p:spTree>
+    <p:extLst>
+      <p:ext uri="{BB962C8B-B14F-4D97-AF65-F5344CB8AC3E}">
+        <p14:creationId xmlns:p14="http://schemas.microsoft.com/office/powerpoint/2010/main" val="3745250516"/>
       </p:ext>
     </p:extLst>
   </p:cSld>
@@ -4636,7 +4761,7 @@
           <a:p>
             <a:fld id="{7D259E43-2377-4BD5-9EF1-8A04A4F66F0C}" type="datetime1">
               <a:rPr lang="zh-TW" altLang="en-US" smtClean="0"/>
-              <a:t>2015/11/22</a:t>
+              <a:t>2015/11/24</a:t>
             </a:fld>
             <a:endParaRPr lang="zh-TW" altLang="en-US"/>
           </a:p>
@@ -4771,7 +4896,7 @@
           <a:p>
             <a:fld id="{3E86548D-D54C-4064-8B18-89FB2D942122}" type="datetime1">
               <a:rPr lang="zh-TW" altLang="en-US" smtClean="0"/>
-              <a:t>2015/11/22</a:t>
+              <a:t>2015/11/24</a:t>
             </a:fld>
             <a:endParaRPr lang="zh-TW" altLang="en-US"/>
           </a:p>
@@ -4814,6 +4939,171 @@
 </file>
 
 <file path=ppt/slides/slide4.xml><?xml version="1.0" encoding="utf-8"?>
+<p:sld xmlns:a="http://schemas.openxmlformats.org/drawingml/2006/main" xmlns:r="http://schemas.openxmlformats.org/officeDocument/2006/relationships" xmlns:p="http://schemas.openxmlformats.org/presentationml/2006/main">
+  <p:cSld>
+    <p:spTree>
+      <p:nvGrpSpPr>
+        <p:cNvPr id="1" name=""/>
+        <p:cNvGrpSpPr/>
+        <p:nvPr/>
+      </p:nvGrpSpPr>
+      <p:grpSpPr>
+        <a:xfrm>
+          <a:off x="0" y="0"/>
+          <a:ext cx="0" cy="0"/>
+          <a:chOff x="0" y="0"/>
+          <a:chExt cx="0" cy="0"/>
+        </a:xfrm>
+      </p:grpSpPr>
+      <p:sp>
+        <p:nvSpPr>
+          <p:cNvPr id="2" name="標題 1"/>
+          <p:cNvSpPr>
+            <a:spLocks noGrp="1"/>
+          </p:cNvSpPr>
+          <p:nvPr>
+            <p:ph type="title"/>
+          </p:nvPr>
+        </p:nvSpPr>
+        <p:spPr/>
+        <p:txBody>
+          <a:bodyPr/>
+          <a:lstStyle/>
+          <a:p>
+            <a:pPr algn="r"/>
+            <a:r>
+              <a:rPr lang="zh-TW" altLang="en-US" i="1" u="sng" dirty="0" smtClean="0">
+                <a:latin typeface="標楷體" panose="03000509000000000000" pitchFamily="65" charset="-120"/>
+                <a:ea typeface="標楷體" panose="03000509000000000000" pitchFamily="65" charset="-120"/>
+              </a:rPr>
+              <a:t>圖片縮放測試</a:t>
+            </a:r>
+            <a:endParaRPr lang="zh-TW" altLang="en-US" i="1" u="sng" dirty="0">
+              <a:latin typeface="標楷體" panose="03000509000000000000" pitchFamily="65" charset="-120"/>
+              <a:ea typeface="標楷體" panose="03000509000000000000" pitchFamily="65" charset="-120"/>
+            </a:endParaRPr>
+          </a:p>
+        </p:txBody>
+      </p:sp>
+      <p:pic>
+        <p:nvPicPr>
+          <p:cNvPr id="4" name="內容版面配置區 3"/>
+          <p:cNvPicPr>
+            <a:picLocks noGrp="1" noChangeAspect="1"/>
+          </p:cNvPicPr>
+          <p:nvPr>
+            <p:ph idx="1"/>
+          </p:nvPr>
+        </p:nvPicPr>
+        <p:blipFill>
+          <a:blip r:embed="rId2" cstate="print">
+            <a:extLst>
+              <a:ext uri="{28A0092B-C50C-407E-A947-70E740481C1C}">
+                <a14:useLocalDpi xmlns:a14="http://schemas.microsoft.com/office/drawing/2010/main" val="0"/>
+              </a:ext>
+            </a:extLst>
+          </a:blip>
+          <a:stretch>
+            <a:fillRect/>
+          </a:stretch>
+        </p:blipFill>
+        <p:spPr>
+          <a:xfrm>
+            <a:off x="333683" y="21644"/>
+            <a:ext cx="4077002" cy="2112793"/>
+          </a:xfrm>
+        </p:spPr>
+      </p:pic>
+      <p:sp>
+        <p:nvSpPr>
+          <p:cNvPr id="3" name="日期版面配置區 2"/>
+          <p:cNvSpPr>
+            <a:spLocks noGrp="1"/>
+          </p:cNvSpPr>
+          <p:nvPr>
+            <p:ph type="dt" sz="half" idx="10"/>
+          </p:nvPr>
+        </p:nvSpPr>
+        <p:spPr/>
+        <p:txBody>
+          <a:bodyPr/>
+          <a:lstStyle/>
+          <a:p>
+            <a:fld id="{3E86548D-D54C-4064-8B18-89FB2D942122}" type="datetime1">
+              <a:rPr lang="zh-TW" altLang="en-US" smtClean="0"/>
+              <a:t>2015/11/24</a:t>
+            </a:fld>
+            <a:endParaRPr lang="zh-TW" altLang="en-US"/>
+          </a:p>
+        </p:txBody>
+      </p:sp>
+      <p:sp>
+        <p:nvSpPr>
+          <p:cNvPr id="5" name="投影片編號版面配置區 4"/>
+          <p:cNvSpPr>
+            <a:spLocks noGrp="1"/>
+          </p:cNvSpPr>
+          <p:nvPr>
+            <p:ph type="sldNum" sz="quarter" idx="12"/>
+          </p:nvPr>
+        </p:nvSpPr>
+        <p:spPr/>
+        <p:txBody>
+          <a:bodyPr/>
+          <a:lstStyle/>
+          <a:p>
+            <a:fld id="{6923F3CB-4711-4FC8-9867-5888834CD7FE}" type="slidenum">
+              <a:rPr lang="zh-TW" altLang="en-US" smtClean="0"/>
+              <a:t>4</a:t>
+            </a:fld>
+            <a:endParaRPr lang="zh-TW" altLang="en-US"/>
+          </a:p>
+        </p:txBody>
+      </p:sp>
+      <p:pic>
+        <p:nvPicPr>
+          <p:cNvPr id="6" name="內容版面配置區 3"/>
+          <p:cNvPicPr>
+            <a:picLocks noChangeAspect="1"/>
+          </p:cNvPicPr>
+          <p:nvPr/>
+        </p:nvPicPr>
+        <p:blipFill>
+          <a:blip r:embed="rId2">
+            <a:extLst>
+              <a:ext uri="{28A0092B-C50C-407E-A947-70E740481C1C}">
+                <a14:useLocalDpi xmlns:a14="http://schemas.microsoft.com/office/drawing/2010/main" val="0"/>
+              </a:ext>
+            </a:extLst>
+          </a:blip>
+          <a:stretch>
+            <a:fillRect/>
+          </a:stretch>
+        </p:blipFill>
+        <p:spPr>
+          <a:xfrm>
+            <a:off x="-1202487" y="1690689"/>
+            <a:ext cx="12789439" cy="6627772"/>
+          </a:xfrm>
+          <a:prstGeom prst="rect">
+            <a:avLst/>
+          </a:prstGeom>
+        </p:spPr>
+      </p:pic>
+    </p:spTree>
+    <p:extLst>
+      <p:ext uri="{BB962C8B-B14F-4D97-AF65-F5344CB8AC3E}">
+        <p14:creationId xmlns:p14="http://schemas.microsoft.com/office/powerpoint/2010/main" val="2170111353"/>
+      </p:ext>
+    </p:extLst>
+  </p:cSld>
+  <p:clrMapOvr>
+    <a:masterClrMapping/>
+  </p:clrMapOvr>
+</p:sld>
+</file>
+
+<file path=ppt/slides/slide5.xml><?xml version="1.0" encoding="utf-8"?>
 <p:sld xmlns:a="http://schemas.openxmlformats.org/drawingml/2006/main" xmlns:r="http://schemas.openxmlformats.org/officeDocument/2006/relationships" xmlns:p="http://schemas.openxmlformats.org/presentationml/2006/main">
   <p:cSld>
     <p:spTree>
@@ -5250,7 +5540,7 @@
           <a:p>
             <a:fld id="{94FA48B1-D508-49FA-BBA0-5047EEF68D44}" type="datetime1">
               <a:rPr lang="zh-TW" altLang="en-US" smtClean="0"/>
-              <a:t>2015/11/22</a:t>
+              <a:t>2015/11/24</a:t>
             </a:fld>
             <a:endParaRPr lang="zh-TW" altLang="en-US"/>
           </a:p>
@@ -5273,7 +5563,7 @@
           <a:p>
             <a:fld id="{6923F3CB-4711-4FC8-9867-5888834CD7FE}" type="slidenum">
               <a:rPr lang="zh-TW" altLang="en-US" smtClean="0"/>
-              <a:t>4</a:t>
+              <a:t>5</a:t>
             </a:fld>
             <a:endParaRPr lang="zh-TW" altLang="en-US"/>
           </a:p>
@@ -5292,7 +5582,7 @@
 </p:sld>
 </file>
 
-<file path=ppt/slides/slide5.xml><?xml version="1.0" encoding="utf-8"?>
+<file path=ppt/slides/slide6.xml><?xml version="1.0" encoding="utf-8"?>
 <p:sld xmlns:a="http://schemas.openxmlformats.org/drawingml/2006/main" xmlns:r="http://schemas.openxmlformats.org/officeDocument/2006/relationships" xmlns:p="http://schemas.openxmlformats.org/presentationml/2006/main">
   <p:cSld>
     <p:spTree>
@@ -5486,7 +5776,7 @@
           <a:p>
             <a:fld id="{E0EFF268-3616-48FD-9778-BBA6A4676333}" type="datetime1">
               <a:rPr lang="zh-TW" altLang="en-US" smtClean="0"/>
-              <a:t>2015/11/22</a:t>
+              <a:t>2015/11/24</a:t>
             </a:fld>
             <a:endParaRPr lang="zh-TW" altLang="en-US"/>
           </a:p>
@@ -5509,7 +5799,7 @@
           <a:p>
             <a:fld id="{6923F3CB-4711-4FC8-9867-5888834CD7FE}" type="slidenum">
               <a:rPr lang="zh-TW" altLang="en-US" smtClean="0"/>
-              <a:t>5</a:t>
+              <a:t>6</a:t>
             </a:fld>
             <a:endParaRPr lang="zh-TW" altLang="en-US"/>
           </a:p>
@@ -6603,7 +6893,7 @@
 </p:sld>
 </file>
 
-<file path=ppt/slides/slide6.xml><?xml version="1.0" encoding="utf-8"?>
+<file path=ppt/slides/slide7.xml><?xml version="1.0" encoding="utf-8"?>
 <p:sld xmlns:a="http://schemas.openxmlformats.org/drawingml/2006/main" xmlns:r="http://schemas.openxmlformats.org/officeDocument/2006/relationships" xmlns:p="http://schemas.openxmlformats.org/presentationml/2006/main">
   <p:cSld>
     <p:spTree>
@@ -6905,7 +7195,7 @@
           <a:p>
             <a:fld id="{5A0B17C9-1A35-4216-82FA-299D192A2D4E}" type="datetime1">
               <a:rPr lang="zh-TW" altLang="en-US" smtClean="0"/>
-              <a:t>2015/11/22</a:t>
+              <a:t>2015/11/24</a:t>
             </a:fld>
             <a:endParaRPr lang="zh-TW" altLang="en-US"/>
           </a:p>
@@ -6928,12 +7218,634 @@
           <a:p>
             <a:fld id="{6923F3CB-4711-4FC8-9867-5888834CD7FE}" type="slidenum">
               <a:rPr lang="zh-TW" altLang="en-US" smtClean="0"/>
-              <a:t>6</a:t>
+              <a:t>7</a:t>
             </a:fld>
             <a:endParaRPr lang="zh-TW" altLang="en-US"/>
           </a:p>
         </p:txBody>
       </p:sp>
+      <p:graphicFrame>
+        <p:nvGraphicFramePr>
+          <p:cNvPr id="8" name="內容版面配置區 4"/>
+          <p:cNvGraphicFramePr>
+            <a:graphicFrameLocks/>
+          </p:cNvGraphicFramePr>
+          <p:nvPr>
+            <p:extLst>
+              <p:ext uri="{D42A27DB-BD31-4B8C-83A1-F6EECF244321}">
+                <p14:modId xmlns:p14="http://schemas.microsoft.com/office/powerpoint/2010/main" val="1652814531"/>
+              </p:ext>
+            </p:extLst>
+          </p:nvPr>
+        </p:nvGraphicFramePr>
+        <p:xfrm>
+          <a:off x="3050150" y="3887487"/>
+          <a:ext cx="3043700" cy="1519521"/>
+        </p:xfrm>
+        <a:graphic>
+          <a:graphicData uri="http://schemas.openxmlformats.org/drawingml/2006/table">
+            <a:tbl>
+              <a:tblPr firstRow="1" firstCol="1" bandRow="1">
+                <a:tableStyleId>{5C22544A-7EE6-4342-B048-85BDC9FD1C3A}</a:tableStyleId>
+              </a:tblPr>
+              <a:tblGrid>
+                <a:gridCol w="760925"/>
+                <a:gridCol w="760925"/>
+                <a:gridCol w="760925"/>
+                <a:gridCol w="760925"/>
+              </a:tblGrid>
+              <a:tr h="506507">
+                <a:tc>
+                  <a:txBody>
+                    <a:bodyPr/>
+                    <a:lstStyle/>
+                    <a:p>
+                      <a:pPr algn="ctr"/>
+                      <a:endParaRPr lang="zh-TW" altLang="en-US" i="1" dirty="0">
+                        <a:solidFill>
+                          <a:schemeClr val="tx1"/>
+                        </a:solidFill>
+                      </a:endParaRPr>
+                    </a:p>
+                  </a:txBody>
+                  <a:tcPr anchor="ctr">
+                    <a:lnL w="12700" cap="flat" cmpd="sng" algn="ctr">
+                      <a:solidFill>
+                        <a:schemeClr val="tx1"/>
+                      </a:solidFill>
+                      <a:prstDash val="solid"/>
+                      <a:round/>
+                      <a:headEnd type="none" w="med" len="med"/>
+                      <a:tailEnd type="none" w="med" len="med"/>
+                    </a:lnL>
+                    <a:lnR w="12700" cap="flat" cmpd="sng" algn="ctr">
+                      <a:solidFill>
+                        <a:schemeClr val="tx1"/>
+                      </a:solidFill>
+                      <a:prstDash val="solid"/>
+                      <a:round/>
+                      <a:headEnd type="none" w="med" len="med"/>
+                      <a:tailEnd type="none" w="med" len="med"/>
+                    </a:lnR>
+                    <a:lnT w="12700" cap="flat" cmpd="sng" algn="ctr">
+                      <a:solidFill>
+                        <a:schemeClr val="tx1"/>
+                      </a:solidFill>
+                      <a:prstDash val="solid"/>
+                      <a:round/>
+                      <a:headEnd type="none" w="med" len="med"/>
+                      <a:tailEnd type="none" w="med" len="med"/>
+                    </a:lnT>
+                    <a:lnB w="12700" cap="flat" cmpd="sng" algn="ctr">
+                      <a:solidFill>
+                        <a:schemeClr val="tx1"/>
+                      </a:solidFill>
+                      <a:prstDash val="solid"/>
+                      <a:round/>
+                      <a:headEnd type="none" w="med" len="med"/>
+                      <a:tailEnd type="none" w="med" len="med"/>
+                    </a:lnB>
+                    <a:lnTlToBr w="12700" cap="flat" cmpd="sng" algn="ctr">
+                      <a:solidFill>
+                        <a:schemeClr val="tx1"/>
+                      </a:solidFill>
+                      <a:prstDash val="solid"/>
+                      <a:round/>
+                      <a:headEnd type="none" w="med" len="med"/>
+                      <a:tailEnd type="none" w="med" len="med"/>
+                    </a:lnTlToBr>
+                    <a:noFill/>
+                  </a:tcPr>
+                </a:tc>
+                <a:tc gridSpan="3">
+                  <a:txBody>
+                    <a:bodyPr/>
+                    <a:lstStyle/>
+                    <a:p>
+                      <a:pPr algn="ctr"/>
+                      <a:r>
+                        <a:rPr lang="en-US" altLang="zh-TW" dirty="0" smtClean="0">
+                          <a:solidFill>
+                            <a:schemeClr val="tx1"/>
+                          </a:solidFill>
+                        </a:rPr>
+                        <a:t>BB</a:t>
+                      </a:r>
+                      <a:endParaRPr lang="zh-TW" altLang="en-US" dirty="0">
+                        <a:solidFill>
+                          <a:schemeClr val="tx1"/>
+                        </a:solidFill>
+                      </a:endParaRPr>
+                    </a:p>
+                  </a:txBody>
+                  <a:tcPr anchor="ctr">
+                    <a:lnL w="12700" cap="flat" cmpd="sng" algn="ctr">
+                      <a:solidFill>
+                        <a:schemeClr val="tx1"/>
+                      </a:solidFill>
+                      <a:prstDash val="solid"/>
+                      <a:round/>
+                      <a:headEnd type="none" w="med" len="med"/>
+                      <a:tailEnd type="none" w="med" len="med"/>
+                    </a:lnL>
+                    <a:lnR w="12700" cap="flat" cmpd="sng" algn="ctr">
+                      <a:solidFill>
+                        <a:schemeClr val="tx1"/>
+                      </a:solidFill>
+                      <a:prstDash val="solid"/>
+                      <a:round/>
+                      <a:headEnd type="none" w="med" len="med"/>
+                      <a:tailEnd type="none" w="med" len="med"/>
+                    </a:lnR>
+                    <a:lnT w="12700" cap="flat" cmpd="sng" algn="ctr">
+                      <a:solidFill>
+                        <a:schemeClr val="tx1"/>
+                      </a:solidFill>
+                      <a:prstDash val="solid"/>
+                      <a:round/>
+                      <a:headEnd type="none" w="med" len="med"/>
+                      <a:tailEnd type="none" w="med" len="med"/>
+                    </a:lnT>
+                    <a:lnB w="12700" cap="flat" cmpd="sng" algn="ctr">
+                      <a:solidFill>
+                        <a:schemeClr val="tx1"/>
+                      </a:solidFill>
+                      <a:prstDash val="solid"/>
+                      <a:round/>
+                      <a:headEnd type="none" w="med" len="med"/>
+                      <a:tailEnd type="none" w="med" len="med"/>
+                    </a:lnB>
+                    <a:noFill/>
+                  </a:tcPr>
+                </a:tc>
+                <a:tc hMerge="1">
+                  <a:txBody>
+                    <a:bodyPr/>
+                    <a:lstStyle/>
+                    <a:p>
+                      <a:pPr algn="ctr"/>
+                      <a:endParaRPr lang="zh-TW" altLang="en-US" u="sng" dirty="0"/>
+                    </a:p>
+                  </a:txBody>
+                  <a:tcPr/>
+                </a:tc>
+                <a:tc hMerge="1">
+                  <a:txBody>
+                    <a:bodyPr/>
+                    <a:lstStyle/>
+                    <a:p>
+                      <a:pPr algn="ctr"/>
+                      <a:endParaRPr lang="zh-TW" altLang="en-US" u="sng" dirty="0"/>
+                    </a:p>
+                  </a:txBody>
+                  <a:tcPr/>
+                </a:tc>
+              </a:tr>
+              <a:tr h="506507">
+                <a:tc rowSpan="2">
+                  <a:txBody>
+                    <a:bodyPr/>
+                    <a:lstStyle/>
+                    <a:p>
+                      <a:pPr algn="ctr"/>
+                      <a:r>
+                        <a:rPr lang="en-US" altLang="zh-TW" dirty="0" smtClean="0">
+                          <a:solidFill>
+                            <a:schemeClr val="tx1"/>
+                          </a:solidFill>
+                        </a:rPr>
+                        <a:t>AA</a:t>
+                      </a:r>
+                      <a:endParaRPr lang="zh-TW" altLang="en-US" dirty="0">
+                        <a:solidFill>
+                          <a:schemeClr val="tx1"/>
+                        </a:solidFill>
+                      </a:endParaRPr>
+                    </a:p>
+                  </a:txBody>
+                  <a:tcPr anchor="ctr">
+                    <a:lnL w="12700" cap="flat" cmpd="sng" algn="ctr">
+                      <a:solidFill>
+                        <a:schemeClr val="tx1"/>
+                      </a:solidFill>
+                      <a:prstDash val="solid"/>
+                      <a:round/>
+                      <a:headEnd type="none" w="med" len="med"/>
+                      <a:tailEnd type="none" w="med" len="med"/>
+                    </a:lnL>
+                    <a:lnR w="12700" cap="flat" cmpd="sng" algn="ctr">
+                      <a:solidFill>
+                        <a:schemeClr val="tx1"/>
+                      </a:solidFill>
+                      <a:prstDash val="solid"/>
+                      <a:round/>
+                      <a:headEnd type="none" w="med" len="med"/>
+                      <a:tailEnd type="none" w="med" len="med"/>
+                    </a:lnR>
+                    <a:lnT w="12700" cap="flat" cmpd="sng" algn="ctr">
+                      <a:solidFill>
+                        <a:schemeClr val="tx1"/>
+                      </a:solidFill>
+                      <a:prstDash val="solid"/>
+                      <a:round/>
+                      <a:headEnd type="none" w="med" len="med"/>
+                      <a:tailEnd type="none" w="med" len="med"/>
+                    </a:lnT>
+                    <a:lnB w="12700" cap="flat" cmpd="sng" algn="ctr">
+                      <a:solidFill>
+                        <a:schemeClr val="tx1"/>
+                      </a:solidFill>
+                      <a:prstDash val="solid"/>
+                      <a:round/>
+                      <a:headEnd type="none" w="med" len="med"/>
+                      <a:tailEnd type="none" w="med" len="med"/>
+                    </a:lnB>
+                    <a:noFill/>
+                  </a:tcPr>
+                </a:tc>
+                <a:tc>
+                  <a:txBody>
+                    <a:bodyPr/>
+                    <a:lstStyle/>
+                    <a:p>
+                      <a:pPr algn="ctr"/>
+                      <a:r>
+                        <a:rPr lang="en-US" altLang="zh-TW" dirty="0" smtClean="0">
+                          <a:solidFill>
+                            <a:schemeClr val="tx1"/>
+                          </a:solidFill>
+                        </a:rPr>
+                        <a:t>B</a:t>
+                      </a:r>
+                      <a:endParaRPr lang="zh-TW" altLang="en-US" dirty="0">
+                        <a:solidFill>
+                          <a:schemeClr val="tx1"/>
+                        </a:solidFill>
+                      </a:endParaRPr>
+                    </a:p>
+                  </a:txBody>
+                  <a:tcPr anchor="ctr">
+                    <a:lnL w="12700" cap="flat" cmpd="sng" algn="ctr">
+                      <a:solidFill>
+                        <a:schemeClr val="tx1"/>
+                      </a:solidFill>
+                      <a:prstDash val="solid"/>
+                      <a:round/>
+                      <a:headEnd type="none" w="med" len="med"/>
+                      <a:tailEnd type="none" w="med" len="med"/>
+                    </a:lnL>
+                    <a:lnR w="12700" cap="flat" cmpd="sng" algn="ctr">
+                      <a:solidFill>
+                        <a:schemeClr val="tx1"/>
+                      </a:solidFill>
+                      <a:prstDash val="solid"/>
+                      <a:round/>
+                      <a:headEnd type="none" w="med" len="med"/>
+                      <a:tailEnd type="none" w="med" len="med"/>
+                    </a:lnR>
+                    <a:lnT w="12700" cap="flat" cmpd="sng" algn="ctr">
+                      <a:solidFill>
+                        <a:schemeClr val="tx1"/>
+                      </a:solidFill>
+                      <a:prstDash val="solid"/>
+                      <a:round/>
+                      <a:headEnd type="none" w="med" len="med"/>
+                      <a:tailEnd type="none" w="med" len="med"/>
+                    </a:lnT>
+                    <a:lnB w="12700" cap="flat" cmpd="sng" algn="ctr">
+                      <a:solidFill>
+                        <a:schemeClr val="tx1"/>
+                      </a:solidFill>
+                      <a:prstDash val="solid"/>
+                      <a:round/>
+                      <a:headEnd type="none" w="med" len="med"/>
+                      <a:tailEnd type="none" w="med" len="med"/>
+                    </a:lnB>
+                    <a:noFill/>
+                  </a:tcPr>
+                </a:tc>
+                <a:tc>
+                  <a:txBody>
+                    <a:bodyPr/>
+                    <a:lstStyle/>
+                    <a:p>
+                      <a:pPr algn="ctr"/>
+                      <a:r>
+                        <a:rPr lang="en-US" altLang="zh-TW" dirty="0" smtClean="0">
+                          <a:solidFill>
+                            <a:schemeClr val="tx1"/>
+                          </a:solidFill>
+                        </a:rPr>
+                        <a:t>CC</a:t>
+                      </a:r>
+                      <a:endParaRPr lang="zh-TW" altLang="en-US" dirty="0">
+                        <a:solidFill>
+                          <a:schemeClr val="tx1"/>
+                        </a:solidFill>
+                      </a:endParaRPr>
+                    </a:p>
+                  </a:txBody>
+                  <a:tcPr anchor="ctr">
+                    <a:lnL w="12700" cap="flat" cmpd="sng" algn="ctr">
+                      <a:solidFill>
+                        <a:schemeClr val="tx1"/>
+                      </a:solidFill>
+                      <a:prstDash val="solid"/>
+                      <a:round/>
+                      <a:headEnd type="none" w="med" len="med"/>
+                      <a:tailEnd type="none" w="med" len="med"/>
+                    </a:lnL>
+                    <a:lnR w="12700" cap="flat" cmpd="sng" algn="ctr">
+                      <a:solidFill>
+                        <a:schemeClr val="tx1"/>
+                      </a:solidFill>
+                      <a:prstDash val="solid"/>
+                      <a:round/>
+                      <a:headEnd type="none" w="med" len="med"/>
+                      <a:tailEnd type="none" w="med" len="med"/>
+                    </a:lnR>
+                    <a:lnT w="12700" cap="flat" cmpd="sng" algn="ctr">
+                      <a:solidFill>
+                        <a:schemeClr val="tx1"/>
+                      </a:solidFill>
+                      <a:prstDash val="solid"/>
+                      <a:round/>
+                      <a:headEnd type="none" w="med" len="med"/>
+                      <a:tailEnd type="none" w="med" len="med"/>
+                    </a:lnT>
+                    <a:lnB w="12700" cap="flat" cmpd="sng" algn="ctr">
+                      <a:solidFill>
+                        <a:schemeClr val="tx1"/>
+                      </a:solidFill>
+                      <a:prstDash val="solid"/>
+                      <a:round/>
+                      <a:headEnd type="none" w="med" len="med"/>
+                      <a:tailEnd type="none" w="med" len="med"/>
+                    </a:lnB>
+                    <a:noFill/>
+                  </a:tcPr>
+                </a:tc>
+                <a:tc>
+                  <a:txBody>
+                    <a:bodyPr/>
+                    <a:lstStyle/>
+                    <a:p>
+                      <a:pPr algn="ctr"/>
+                      <a:r>
+                        <a:rPr lang="en-US" altLang="zh-TW" dirty="0" smtClean="0">
+                          <a:solidFill>
+                            <a:schemeClr val="tx1"/>
+                          </a:solidFill>
+                        </a:rPr>
+                        <a:t>DDD</a:t>
+                      </a:r>
+                      <a:endParaRPr lang="zh-TW" altLang="en-US" dirty="0">
+                        <a:solidFill>
+                          <a:schemeClr val="tx1"/>
+                        </a:solidFill>
+                      </a:endParaRPr>
+                    </a:p>
+                  </a:txBody>
+                  <a:tcPr anchor="ctr">
+                    <a:lnL w="12700" cap="flat" cmpd="sng" algn="ctr">
+                      <a:solidFill>
+                        <a:schemeClr val="tx1"/>
+                      </a:solidFill>
+                      <a:prstDash val="solid"/>
+                      <a:round/>
+                      <a:headEnd type="none" w="med" len="med"/>
+                      <a:tailEnd type="none" w="med" len="med"/>
+                    </a:lnL>
+                    <a:lnR w="12700" cap="flat" cmpd="sng" algn="ctr">
+                      <a:solidFill>
+                        <a:schemeClr val="tx1"/>
+                      </a:solidFill>
+                      <a:prstDash val="solid"/>
+                      <a:round/>
+                      <a:headEnd type="none" w="med" len="med"/>
+                      <a:tailEnd type="none" w="med" len="med"/>
+                    </a:lnR>
+                    <a:lnT w="12700" cap="flat" cmpd="sng" algn="ctr">
+                      <a:solidFill>
+                        <a:schemeClr val="tx1"/>
+                      </a:solidFill>
+                      <a:prstDash val="solid"/>
+                      <a:round/>
+                      <a:headEnd type="none" w="med" len="med"/>
+                      <a:tailEnd type="none" w="med" len="med"/>
+                    </a:lnT>
+                    <a:lnB w="12700" cap="flat" cmpd="sng" algn="ctr">
+                      <a:solidFill>
+                        <a:schemeClr val="tx1"/>
+                      </a:solidFill>
+                      <a:prstDash val="solid"/>
+                      <a:round/>
+                      <a:headEnd type="none" w="med" len="med"/>
+                      <a:tailEnd type="none" w="med" len="med"/>
+                    </a:lnB>
+                    <a:noFill/>
+                  </a:tcPr>
+                </a:tc>
+              </a:tr>
+              <a:tr h="506507">
+                <a:tc vMerge="1">
+                  <a:txBody>
+                    <a:bodyPr/>
+                    <a:lstStyle/>
+                    <a:p>
+                      <a:endParaRPr lang="zh-TW" altLang="en-US" dirty="0"/>
+                    </a:p>
+                  </a:txBody>
+                  <a:tcPr/>
+                </a:tc>
+                <a:tc>
+                  <a:txBody>
+                    <a:bodyPr/>
+                    <a:lstStyle/>
+                    <a:p>
+                      <a:pPr algn="ctr"/>
+                      <a:r>
+                        <a:rPr lang="en-US" altLang="zh-TW" dirty="0" smtClean="0">
+                          <a:solidFill>
+                            <a:schemeClr val="tx1"/>
+                          </a:solidFill>
+                        </a:rPr>
+                        <a:t>BB</a:t>
+                      </a:r>
+                      <a:endParaRPr lang="zh-TW" altLang="en-US" dirty="0">
+                        <a:solidFill>
+                          <a:schemeClr val="tx1"/>
+                        </a:solidFill>
+                      </a:endParaRPr>
+                    </a:p>
+                  </a:txBody>
+                  <a:tcPr anchor="ctr">
+                    <a:lnL w="12700" cap="flat" cmpd="sng" algn="ctr">
+                      <a:solidFill>
+                        <a:schemeClr val="tx1"/>
+                      </a:solidFill>
+                      <a:prstDash val="solid"/>
+                      <a:round/>
+                      <a:headEnd type="none" w="med" len="med"/>
+                      <a:tailEnd type="none" w="med" len="med"/>
+                    </a:lnL>
+                    <a:lnR w="12700" cap="flat" cmpd="sng" algn="ctr">
+                      <a:solidFill>
+                        <a:schemeClr val="tx1"/>
+                      </a:solidFill>
+                      <a:prstDash val="solid"/>
+                      <a:round/>
+                      <a:headEnd type="none" w="med" len="med"/>
+                      <a:tailEnd type="none" w="med" len="med"/>
+                    </a:lnR>
+                    <a:lnT w="12700" cap="flat" cmpd="sng" algn="ctr">
+                      <a:solidFill>
+                        <a:schemeClr val="tx1"/>
+                      </a:solidFill>
+                      <a:prstDash val="solid"/>
+                      <a:round/>
+                      <a:headEnd type="none" w="med" len="med"/>
+                      <a:tailEnd type="none" w="med" len="med"/>
+                    </a:lnT>
+                    <a:lnB w="12700" cap="flat" cmpd="sng" algn="ctr">
+                      <a:solidFill>
+                        <a:schemeClr val="tx1"/>
+                      </a:solidFill>
+                      <a:prstDash val="solid"/>
+                      <a:round/>
+                      <a:headEnd type="none" w="med" len="med"/>
+                      <a:tailEnd type="none" w="med" len="med"/>
+                    </a:lnB>
+                    <a:noFill/>
+                  </a:tcPr>
+                </a:tc>
+                <a:tc>
+                  <a:txBody>
+                    <a:bodyPr/>
+                    <a:lstStyle/>
+                    <a:p>
+                      <a:pPr algn="ctr"/>
+                      <a:r>
+                        <a:rPr lang="en-US" altLang="zh-TW" dirty="0" smtClean="0">
+                          <a:solidFill>
+                            <a:schemeClr val="tx1"/>
+                          </a:solidFill>
+                        </a:rPr>
+                        <a:t>CCC</a:t>
+                      </a:r>
+                      <a:endParaRPr lang="zh-TW" altLang="en-US" dirty="0">
+                        <a:solidFill>
+                          <a:schemeClr val="tx1"/>
+                        </a:solidFill>
+                      </a:endParaRPr>
+                    </a:p>
+                  </a:txBody>
+                  <a:tcPr anchor="ctr">
+                    <a:lnL w="12700" cap="flat" cmpd="sng" algn="ctr">
+                      <a:solidFill>
+                        <a:schemeClr val="tx1"/>
+                      </a:solidFill>
+                      <a:prstDash val="solid"/>
+                      <a:round/>
+                      <a:headEnd type="none" w="med" len="med"/>
+                      <a:tailEnd type="none" w="med" len="med"/>
+                    </a:lnL>
+                    <a:lnR w="12700" cap="flat" cmpd="sng" algn="ctr">
+                      <a:solidFill>
+                        <a:schemeClr val="tx1"/>
+                      </a:solidFill>
+                      <a:prstDash val="solid"/>
+                      <a:round/>
+                      <a:headEnd type="none" w="med" len="med"/>
+                      <a:tailEnd type="none" w="med" len="med"/>
+                    </a:lnR>
+                    <a:lnT w="12700" cap="flat" cmpd="sng" algn="ctr">
+                      <a:solidFill>
+                        <a:schemeClr val="tx1"/>
+                      </a:solidFill>
+                      <a:prstDash val="solid"/>
+                      <a:round/>
+                      <a:headEnd type="none" w="med" len="med"/>
+                      <a:tailEnd type="none" w="med" len="med"/>
+                    </a:lnT>
+                    <a:lnB w="12700" cap="flat" cmpd="sng" algn="ctr">
+                      <a:solidFill>
+                        <a:schemeClr val="tx1"/>
+                      </a:solidFill>
+                      <a:prstDash val="solid"/>
+                      <a:round/>
+                      <a:headEnd type="none" w="med" len="med"/>
+                      <a:tailEnd type="none" w="med" len="med"/>
+                    </a:lnB>
+                    <a:noFill/>
+                  </a:tcPr>
+                </a:tc>
+                <a:tc>
+                  <a:txBody>
+                    <a:bodyPr/>
+                    <a:lstStyle/>
+                    <a:p>
+                      <a:pPr algn="ctr"/>
+                      <a:r>
+                        <a:rPr lang="en-US" altLang="zh-TW" dirty="0" smtClean="0">
+                          <a:solidFill>
+                            <a:schemeClr val="tx1"/>
+                          </a:solidFill>
+                        </a:rPr>
+                        <a:t>DDDD</a:t>
+                      </a:r>
+                      <a:endParaRPr lang="zh-TW" altLang="en-US" dirty="0">
+                        <a:solidFill>
+                          <a:schemeClr val="tx1"/>
+                        </a:solidFill>
+                      </a:endParaRPr>
+                    </a:p>
+                  </a:txBody>
+                  <a:tcPr anchor="ctr">
+                    <a:lnL w="12700" cap="flat" cmpd="sng" algn="ctr">
+                      <a:solidFill>
+                        <a:schemeClr val="tx1"/>
+                      </a:solidFill>
+                      <a:prstDash val="solid"/>
+                      <a:round/>
+                      <a:headEnd type="none" w="med" len="med"/>
+                      <a:tailEnd type="none" w="med" len="med"/>
+                    </a:lnL>
+                    <a:lnR w="12700" cap="flat" cmpd="sng" algn="ctr">
+                      <a:solidFill>
+                        <a:schemeClr val="tx1"/>
+                      </a:solidFill>
+                      <a:prstDash val="solid"/>
+                      <a:round/>
+                      <a:headEnd type="none" w="med" len="med"/>
+                      <a:tailEnd type="none" w="med" len="med"/>
+                    </a:lnR>
+                    <a:lnT w="12700" cap="flat" cmpd="sng" algn="ctr">
+                      <a:solidFill>
+                        <a:schemeClr val="tx1"/>
+                      </a:solidFill>
+                      <a:prstDash val="solid"/>
+                      <a:round/>
+                      <a:headEnd type="none" w="med" len="med"/>
+                      <a:tailEnd type="none" w="med" len="med"/>
+                    </a:lnT>
+                    <a:lnB w="12700" cap="flat" cmpd="sng" algn="ctr">
+                      <a:solidFill>
+                        <a:schemeClr val="tx1"/>
+                      </a:solidFill>
+                      <a:prstDash val="solid"/>
+                      <a:round/>
+                      <a:headEnd type="none" w="med" len="med"/>
+                      <a:tailEnd type="none" w="med" len="med"/>
+                    </a:lnB>
+                    <a:noFill/>
+                  </a:tcPr>
+                </a:tc>
+              </a:tr>
+            </a:tbl>
+          </a:graphicData>
+        </a:graphic>
+      </p:graphicFrame>
     </p:spTree>
     <p:extLst>
       <p:ext uri="{BB962C8B-B14F-4D97-AF65-F5344CB8AC3E}">
@@ -6947,7 +7859,7 @@
 </p:sld>
 </file>
 
-<file path=ppt/slides/slide7.xml><?xml version="1.0" encoding="utf-8"?>
+<file path=ppt/slides/slide8.xml><?xml version="1.0" encoding="utf-8"?>
 <p:sld xmlns:a="http://schemas.openxmlformats.org/drawingml/2006/main" xmlns:r="http://schemas.openxmlformats.org/officeDocument/2006/relationships" xmlns:p="http://schemas.openxmlformats.org/presentationml/2006/main">
   <p:cSld>
     <p:spTree>
@@ -7004,7 +7916,7 @@
           <a:p>
             <a:fld id="{C60B81E8-7334-464F-8B48-45CA70843E0C}" type="datetime1">
               <a:rPr lang="zh-TW" altLang="en-US" smtClean="0"/>
-              <a:t>2015/11/22</a:t>
+              <a:t>2015/11/24</a:t>
             </a:fld>
             <a:endParaRPr lang="zh-TW" altLang="en-US"/>
           </a:p>
@@ -7027,7 +7939,7 @@
           <a:p>
             <a:fld id="{6923F3CB-4711-4FC8-9867-5888834CD7FE}" type="slidenum">
               <a:rPr lang="zh-TW" altLang="en-US" smtClean="0"/>
-              <a:t>7</a:t>
+              <a:t>8</a:t>
             </a:fld>
             <a:endParaRPr lang="zh-TW" altLang="en-US"/>
           </a:p>
@@ -7747,261 +8659,6 @@
 </p:sld>
 </file>
 
-<file path=ppt/slides/slide8.xml><?xml version="1.0" encoding="utf-8"?>
-<p:sld xmlns:a="http://schemas.openxmlformats.org/drawingml/2006/main" xmlns:r="http://schemas.openxmlformats.org/officeDocument/2006/relationships" xmlns:p="http://schemas.openxmlformats.org/presentationml/2006/main">
-  <p:cSld>
-    <p:spTree>
-      <p:nvGrpSpPr>
-        <p:cNvPr id="1" name=""/>
-        <p:cNvGrpSpPr/>
-        <p:nvPr/>
-      </p:nvGrpSpPr>
-      <p:grpSpPr>
-        <a:xfrm>
-          <a:off x="0" y="0"/>
-          <a:ext cx="0" cy="0"/>
-          <a:chOff x="0" y="0"/>
-          <a:chExt cx="0" cy="0"/>
-        </a:xfrm>
-      </p:grpSpPr>
-      <p:sp>
-        <p:nvSpPr>
-          <p:cNvPr id="6" name="標題 5"/>
-          <p:cNvSpPr>
-            <a:spLocks noGrp="1"/>
-          </p:cNvSpPr>
-          <p:nvPr>
-            <p:ph type="title"/>
-          </p:nvPr>
-        </p:nvSpPr>
-        <p:spPr/>
-        <p:txBody>
-          <a:bodyPr/>
-          <a:lstStyle/>
-          <a:p>
-            <a:r>
-              <a:rPr lang="zh-TW" altLang="en-US" dirty="0" smtClean="0"/>
-              <a:t>版面</a:t>
-            </a:r>
-            <a:r>
-              <a:rPr lang="en-US" altLang="zh-TW" dirty="0"/>
-              <a:t>5</a:t>
-            </a:r>
-            <a:endParaRPr lang="zh-TW" altLang="en-US" dirty="0"/>
-          </a:p>
-        </p:txBody>
-      </p:sp>
-      <p:sp>
-        <p:nvSpPr>
-          <p:cNvPr id="7" name="文字版面配置區 6"/>
-          <p:cNvSpPr>
-            <a:spLocks noGrp="1"/>
-          </p:cNvSpPr>
-          <p:nvPr>
-            <p:ph type="body" idx="1"/>
-          </p:nvPr>
-        </p:nvSpPr>
-        <p:spPr/>
-        <p:txBody>
-          <a:bodyPr/>
-          <a:lstStyle/>
-          <a:p>
-            <a:r>
-              <a:rPr lang="en-US" altLang="zh-TW" dirty="0" smtClean="0"/>
-              <a:t>AAA</a:t>
-            </a:r>
-            <a:endParaRPr lang="zh-TW" altLang="en-US" dirty="0"/>
-          </a:p>
-        </p:txBody>
-      </p:sp>
-      <p:sp>
-        <p:nvSpPr>
-          <p:cNvPr id="8" name="內容版面配置區 7"/>
-          <p:cNvSpPr>
-            <a:spLocks noGrp="1"/>
-          </p:cNvSpPr>
-          <p:nvPr>
-            <p:ph sz="half" idx="2"/>
-          </p:nvPr>
-        </p:nvSpPr>
-        <p:spPr/>
-        <p:txBody>
-          <a:bodyPr/>
-          <a:lstStyle/>
-          <a:p>
-            <a:r>
-              <a:rPr lang="en-US" altLang="zh-TW" dirty="0" smtClean="0"/>
-              <a:t>QQQ</a:t>
-            </a:r>
-          </a:p>
-          <a:p>
-            <a:r>
-              <a:rPr lang="en-US" altLang="zh-TW" dirty="0" smtClean="0"/>
-              <a:t>BE</a:t>
-            </a:r>
-          </a:p>
-          <a:p>
-            <a:pPr lvl="1"/>
-            <a:r>
-              <a:rPr lang="en-US" altLang="zh-TW" dirty="0" smtClean="0"/>
-              <a:t>DQ</a:t>
-            </a:r>
-          </a:p>
-          <a:p>
-            <a:pPr lvl="1"/>
-            <a:r>
-              <a:rPr lang="en-US" altLang="zh-TW" dirty="0" err="1" smtClean="0"/>
-              <a:t>Fgg</a:t>
-            </a:r>
-            <a:endParaRPr lang="en-US" altLang="zh-TW" dirty="0" smtClean="0"/>
-          </a:p>
-          <a:p>
-            <a:pPr lvl="2"/>
-            <a:r>
-              <a:rPr lang="en-US" altLang="zh-TW" dirty="0" err="1" smtClean="0"/>
-              <a:t>Sfdhggfh</a:t>
-            </a:r>
-            <a:endParaRPr lang="en-US" altLang="zh-TW" dirty="0" smtClean="0"/>
-          </a:p>
-          <a:p>
-            <a:pPr lvl="2"/>
-            <a:r>
-              <a:rPr lang="en-US" altLang="zh-TW" dirty="0" err="1" smtClean="0"/>
-              <a:t>fdhdfh</a:t>
-            </a:r>
-            <a:endParaRPr lang="zh-TW" altLang="en-US" dirty="0"/>
-          </a:p>
-        </p:txBody>
-      </p:sp>
-      <p:sp>
-        <p:nvSpPr>
-          <p:cNvPr id="9" name="文字版面配置區 8"/>
-          <p:cNvSpPr>
-            <a:spLocks noGrp="1"/>
-          </p:cNvSpPr>
-          <p:nvPr>
-            <p:ph type="body" sz="quarter" idx="3"/>
-          </p:nvPr>
-        </p:nvSpPr>
-        <p:spPr/>
-        <p:txBody>
-          <a:bodyPr/>
-          <a:lstStyle/>
-          <a:p>
-            <a:r>
-              <a:rPr lang="en-US" altLang="zh-TW" dirty="0" smtClean="0"/>
-              <a:t>BBB</a:t>
-            </a:r>
-            <a:endParaRPr lang="zh-TW" altLang="en-US" dirty="0"/>
-          </a:p>
-        </p:txBody>
-      </p:sp>
-      <p:sp>
-        <p:nvSpPr>
-          <p:cNvPr id="10" name="內容版面配置區 9"/>
-          <p:cNvSpPr>
-            <a:spLocks noGrp="1"/>
-          </p:cNvSpPr>
-          <p:nvPr>
-            <p:ph sz="quarter" idx="4"/>
-          </p:nvPr>
-        </p:nvSpPr>
-        <p:spPr/>
-        <p:txBody>
-          <a:bodyPr/>
-          <a:lstStyle/>
-          <a:p>
-            <a:pPr>
-              <a:buFont typeface="Wingdings" panose="05000000000000000000" pitchFamily="2" charset="2"/>
-              <a:buChar char="Ø"/>
-            </a:pPr>
-            <a:r>
-              <a:rPr lang="en-US" altLang="zh-TW" dirty="0" smtClean="0"/>
-              <a:t>65465</a:t>
-            </a:r>
-          </a:p>
-          <a:p>
-            <a:pPr>
-              <a:buFont typeface="Wingdings" panose="05000000000000000000" pitchFamily="2" charset="2"/>
-              <a:buChar char="Ø"/>
-            </a:pPr>
-            <a:r>
-              <a:rPr lang="en-US" altLang="zh-TW" dirty="0" smtClean="0"/>
-              <a:t>65464</a:t>
-            </a:r>
-          </a:p>
-          <a:p>
-            <a:pPr>
-              <a:buFont typeface="Wingdings" panose="05000000000000000000" pitchFamily="2" charset="2"/>
-              <a:buChar char="Ø"/>
-            </a:pPr>
-            <a:r>
-              <a:rPr lang="en-US" altLang="zh-TW" dirty="0" smtClean="0"/>
-              <a:t>6546</a:t>
-            </a:r>
-            <a:endParaRPr lang="zh-TW" altLang="en-US" dirty="0"/>
-          </a:p>
-        </p:txBody>
-      </p:sp>
-      <p:sp>
-        <p:nvSpPr>
-          <p:cNvPr id="4" name="日期版面配置區 3"/>
-          <p:cNvSpPr>
-            <a:spLocks noGrp="1"/>
-          </p:cNvSpPr>
-          <p:nvPr>
-            <p:ph type="dt" sz="half" idx="10"/>
-          </p:nvPr>
-        </p:nvSpPr>
-        <p:spPr/>
-        <p:txBody>
-          <a:bodyPr/>
-          <a:lstStyle/>
-          <a:p>
-            <a:fld id="{C60B81E8-7334-464F-8B48-45CA70843E0C}" type="datetime1">
-              <a:rPr lang="zh-TW" altLang="en-US" smtClean="0"/>
-              <a:t>2015/11/22</a:t>
-            </a:fld>
-            <a:endParaRPr lang="zh-TW" altLang="en-US"/>
-          </a:p>
-        </p:txBody>
-      </p:sp>
-      <p:sp>
-        <p:nvSpPr>
-          <p:cNvPr id="5" name="投影片編號版面配置區 4"/>
-          <p:cNvSpPr>
-            <a:spLocks noGrp="1"/>
-          </p:cNvSpPr>
-          <p:nvPr>
-            <p:ph type="sldNum" sz="quarter" idx="12"/>
-          </p:nvPr>
-        </p:nvSpPr>
-        <p:spPr/>
-        <p:txBody>
-          <a:bodyPr/>
-          <a:lstStyle/>
-          <a:p>
-            <a:fld id="{6923F3CB-4711-4FC8-9867-5888834CD7FE}" type="slidenum">
-              <a:rPr lang="zh-TW" altLang="en-US" smtClean="0"/>
-              <a:t>8</a:t>
-            </a:fld>
-            <a:endParaRPr lang="zh-TW" altLang="en-US"/>
-          </a:p>
-        </p:txBody>
-      </p:sp>
-    </p:spTree>
-    <p:extLst>
-      <p:ext uri="{BB962C8B-B14F-4D97-AF65-F5344CB8AC3E}">
-        <p14:creationId xmlns:p14="http://schemas.microsoft.com/office/powerpoint/2010/main" val="2611549055"/>
-      </p:ext>
-    </p:extLst>
-  </p:cSld>
-  <p:clrMapOvr>
-    <a:masterClrMapping/>
-  </p:clrMapOvr>
-</p:sld>
-</file>
-
 <file path=ppt/slides/slide9.xml><?xml version="1.0" encoding="utf-8"?>
 <p:sld xmlns:a="http://schemas.openxmlformats.org/drawingml/2006/main" xmlns:r="http://schemas.openxmlformats.org/officeDocument/2006/relationships" xmlns:p="http://schemas.openxmlformats.org/presentationml/2006/main">
   <p:cSld>
@@ -8021,7 +8678,7 @@
       </p:grpSpPr>
       <p:sp>
         <p:nvSpPr>
-          <p:cNvPr id="11" name="標題 10"/>
+          <p:cNvPr id="6" name="標題 5"/>
           <p:cNvSpPr>
             <a:spLocks noGrp="1"/>
           </p:cNvSpPr>
@@ -8036,40 +8693,171 @@
           <a:p>
             <a:r>
               <a:rPr lang="zh-TW" altLang="en-US" dirty="0" smtClean="0"/>
-              <a:t>圖表測試</a:t>
+              <a:t>版面</a:t>
+            </a:r>
+            <a:r>
+              <a:rPr lang="en-US" altLang="zh-TW" dirty="0"/>
+              <a:t>5</a:t>
             </a:r>
             <a:endParaRPr lang="zh-TW" altLang="en-US" dirty="0"/>
           </a:p>
         </p:txBody>
       </p:sp>
-      <p:graphicFrame>
-        <p:nvGraphicFramePr>
-          <p:cNvPr id="23" name="內容版面配置區 22"/>
-          <p:cNvGraphicFramePr>
-            <a:graphicFrameLocks noGrp="1"/>
-          </p:cNvGraphicFramePr>
-          <p:nvPr>
-            <p:ph idx="1"/>
-            <p:extLst>
-              <p:ext uri="{D42A27DB-BD31-4B8C-83A1-F6EECF244321}">
-                <p14:modId xmlns:p14="http://schemas.microsoft.com/office/powerpoint/2010/main" val="415230077"/>
-              </p:ext>
-            </p:extLst>
-          </p:nvPr>
-        </p:nvGraphicFramePr>
-        <p:xfrm>
-          <a:off x="628650" y="1825625"/>
-          <a:ext cx="7886700" cy="4351338"/>
-        </p:xfrm>
-        <a:graphic>
-          <a:graphicData uri="http://schemas.openxmlformats.org/drawingml/2006/chart">
-            <c:chart xmlns:c="http://schemas.openxmlformats.org/drawingml/2006/chart" xmlns:r="http://schemas.openxmlformats.org/officeDocument/2006/relationships" r:id="rId2"/>
-          </a:graphicData>
-        </a:graphic>
-      </p:graphicFrame>
-      <p:sp>
-        <p:nvSpPr>
-          <p:cNvPr id="7" name="日期版面配置區 6"/>
+      <p:sp>
+        <p:nvSpPr>
+          <p:cNvPr id="7" name="文字版面配置區 6"/>
+          <p:cNvSpPr>
+            <a:spLocks noGrp="1"/>
+          </p:cNvSpPr>
+          <p:nvPr>
+            <p:ph type="body" idx="1"/>
+          </p:nvPr>
+        </p:nvSpPr>
+        <p:spPr/>
+        <p:txBody>
+          <a:bodyPr/>
+          <a:lstStyle/>
+          <a:p>
+            <a:r>
+              <a:rPr lang="en-US" altLang="zh-TW" dirty="0" smtClean="0"/>
+              <a:t>AAA</a:t>
+            </a:r>
+            <a:endParaRPr lang="zh-TW" altLang="en-US" dirty="0"/>
+          </a:p>
+        </p:txBody>
+      </p:sp>
+      <p:sp>
+        <p:nvSpPr>
+          <p:cNvPr id="8" name="內容版面配置區 7"/>
+          <p:cNvSpPr>
+            <a:spLocks noGrp="1"/>
+          </p:cNvSpPr>
+          <p:nvPr>
+            <p:ph sz="half" idx="2"/>
+          </p:nvPr>
+        </p:nvSpPr>
+        <p:spPr/>
+        <p:txBody>
+          <a:bodyPr/>
+          <a:lstStyle/>
+          <a:p>
+            <a:r>
+              <a:rPr lang="en-US" altLang="zh-TW" dirty="0" smtClean="0"/>
+              <a:t>QQQ</a:t>
+            </a:r>
+          </a:p>
+          <a:p>
+            <a:r>
+              <a:rPr lang="en-US" altLang="zh-TW" dirty="0" smtClean="0"/>
+              <a:t>BE</a:t>
+            </a:r>
+          </a:p>
+          <a:p>
+            <a:pPr lvl="1"/>
+            <a:r>
+              <a:rPr lang="en-US" altLang="zh-TW" dirty="0" smtClean="0"/>
+              <a:t>DQ</a:t>
+            </a:r>
+          </a:p>
+          <a:p>
+            <a:pPr lvl="1"/>
+            <a:r>
+              <a:rPr lang="en-US" altLang="zh-TW" dirty="0" err="1" smtClean="0"/>
+              <a:t>Fgg</a:t>
+            </a:r>
+            <a:endParaRPr lang="en-US" altLang="zh-TW" dirty="0" smtClean="0"/>
+          </a:p>
+          <a:p>
+            <a:pPr lvl="2"/>
+            <a:r>
+              <a:rPr lang="en-US" altLang="zh-TW" dirty="0" err="1" smtClean="0"/>
+              <a:t>Sfdhggfh</a:t>
+            </a:r>
+            <a:endParaRPr lang="en-US" altLang="zh-TW" dirty="0" smtClean="0"/>
+          </a:p>
+          <a:p>
+            <a:pPr lvl="2"/>
+            <a:r>
+              <a:rPr lang="en-US" altLang="zh-TW" dirty="0" err="1" smtClean="0"/>
+              <a:t>fdhdfh</a:t>
+            </a:r>
+            <a:endParaRPr lang="zh-TW" altLang="en-US" dirty="0"/>
+          </a:p>
+        </p:txBody>
+      </p:sp>
+      <p:sp>
+        <p:nvSpPr>
+          <p:cNvPr id="9" name="文字版面配置區 8"/>
+          <p:cNvSpPr>
+            <a:spLocks noGrp="1"/>
+          </p:cNvSpPr>
+          <p:nvPr>
+            <p:ph type="body" sz="quarter" idx="3"/>
+          </p:nvPr>
+        </p:nvSpPr>
+        <p:spPr/>
+        <p:txBody>
+          <a:bodyPr/>
+          <a:lstStyle/>
+          <a:p>
+            <a:r>
+              <a:rPr lang="en-US" altLang="zh-TW" dirty="0" smtClean="0"/>
+              <a:t>BBB</a:t>
+            </a:r>
+            <a:endParaRPr lang="zh-TW" altLang="en-US" dirty="0"/>
+          </a:p>
+        </p:txBody>
+      </p:sp>
+      <p:sp>
+        <p:nvSpPr>
+          <p:cNvPr id="10" name="內容版面配置區 9"/>
+          <p:cNvSpPr>
+            <a:spLocks noGrp="1"/>
+          </p:cNvSpPr>
+          <p:nvPr>
+            <p:ph sz="quarter" idx="4"/>
+          </p:nvPr>
+        </p:nvSpPr>
+        <p:spPr/>
+        <p:txBody>
+          <a:bodyPr/>
+          <a:lstStyle/>
+          <a:p>
+            <a:pPr>
+              <a:buFont typeface="Wingdings" panose="05000000000000000000" pitchFamily="2" charset="2"/>
+              <a:buChar char="Ø"/>
+            </a:pPr>
+            <a:r>
+              <a:rPr lang="en-US" altLang="zh-TW" dirty="0" smtClean="0"/>
+              <a:t>65465</a:t>
+            </a:r>
+          </a:p>
+          <a:p>
+            <a:pPr>
+              <a:buFont typeface="Wingdings" panose="05000000000000000000" pitchFamily="2" charset="2"/>
+              <a:buChar char="Ø"/>
+            </a:pPr>
+            <a:r>
+              <a:rPr lang="en-US" altLang="zh-TW" dirty="0" smtClean="0"/>
+              <a:t>65464</a:t>
+            </a:r>
+          </a:p>
+          <a:p>
+            <a:pPr>
+              <a:buFont typeface="Wingdings" panose="05000000000000000000" pitchFamily="2" charset="2"/>
+              <a:buChar char="Ø"/>
+            </a:pPr>
+            <a:r>
+              <a:rPr lang="en-US" altLang="zh-TW" dirty="0" smtClean="0"/>
+              <a:t>6546</a:t>
+            </a:r>
+            <a:endParaRPr lang="zh-TW" altLang="en-US" dirty="0"/>
+          </a:p>
+        </p:txBody>
+      </p:sp>
+      <p:sp>
+        <p:nvSpPr>
+          <p:cNvPr id="4" name="日期版面配置區 3"/>
           <p:cNvSpPr>
             <a:spLocks noGrp="1"/>
           </p:cNvSpPr>
@@ -8082,9 +8870,9 @@
           <a:bodyPr/>
           <a:lstStyle/>
           <a:p>
-            <a:fld id="{C11F5D98-A40D-4F6A-B778-B48D2F7EC464}" type="datetime1">
-              <a:rPr lang="zh-TW" altLang="en-US" smtClean="0"/>
-              <a:t>2015/11/22</a:t>
+            <a:fld id="{C60B81E8-7334-464F-8B48-45CA70843E0C}" type="datetime1">
+              <a:rPr lang="zh-TW" altLang="en-US" smtClean="0"/>
+              <a:t>2015/11/24</a:t>
             </a:fld>
             <a:endParaRPr lang="zh-TW" altLang="en-US"/>
           </a:p>
@@ -8092,7 +8880,7 @@
       </p:sp>
       <p:sp>
         <p:nvSpPr>
-          <p:cNvPr id="8" name="投影片編號版面配置區 7"/>
+          <p:cNvPr id="5" name="投影片編號版面配置區 4"/>
           <p:cNvSpPr>
             <a:spLocks noGrp="1"/>
           </p:cNvSpPr>
@@ -8116,7 +8904,7 @@
     </p:spTree>
     <p:extLst>
       <p:ext uri="{BB962C8B-B14F-4D97-AF65-F5344CB8AC3E}">
-        <p14:creationId xmlns:p14="http://schemas.microsoft.com/office/powerpoint/2010/main" val="3745250516"/>
+        <p14:creationId xmlns:p14="http://schemas.microsoft.com/office/powerpoint/2010/main" val="2611549055"/>
       </p:ext>
     </p:extLst>
   </p:cSld>

</xml_diff>

<commit_message>
Support single color background in slide
</commit_message>
<xml_diff>
--- a/files/test.pptx
+++ b/files/test.pptx
@@ -5,19 +5,20 @@
     <p:sldMasterId id="2147483660" r:id="rId1"/>
   </p:sldMasterIdLst>
   <p:notesMasterIdLst>
-    <p:notesMasterId r:id="rId12"/>
+    <p:notesMasterId r:id="rId13"/>
   </p:notesMasterIdLst>
   <p:sldIdLst>
     <p:sldId id="256" r:id="rId2"/>
     <p:sldId id="257" r:id="rId3"/>
-    <p:sldId id="258" r:id="rId4"/>
-    <p:sldId id="265" r:id="rId5"/>
-    <p:sldId id="259" r:id="rId6"/>
-    <p:sldId id="260" r:id="rId7"/>
-    <p:sldId id="261" r:id="rId8"/>
-    <p:sldId id="262" r:id="rId9"/>
-    <p:sldId id="263" r:id="rId10"/>
-    <p:sldId id="264" r:id="rId11"/>
+    <p:sldId id="266" r:id="rId4"/>
+    <p:sldId id="258" r:id="rId5"/>
+    <p:sldId id="265" r:id="rId6"/>
+    <p:sldId id="259" r:id="rId7"/>
+    <p:sldId id="260" r:id="rId8"/>
+    <p:sldId id="261" r:id="rId9"/>
+    <p:sldId id="262" r:id="rId10"/>
+    <p:sldId id="263" r:id="rId11"/>
+    <p:sldId id="264" r:id="rId12"/>
   </p:sldIdLst>
   <p:sldSz cx="9144000" cy="6858000" type="screen4x3"/>
   <p:notesSz cx="6858000" cy="9144000"/>
@@ -427,11 +428,11 @@
         </c:dLbls>
         <c:marker val="1"/>
         <c:smooth val="0"/>
-        <c:axId val="-1818367952"/>
-        <c:axId val="-1818371216"/>
+        <c:axId val="811598368"/>
+        <c:axId val="811605984"/>
       </c:lineChart>
       <c:catAx>
-        <c:axId val="-1818367952"/>
+        <c:axId val="811598368"/>
         <c:scaling>
           <c:orientation val="minMax"/>
         </c:scaling>
@@ -474,7 +475,7 @@
             <a:endParaRPr lang="zh-TW"/>
           </a:p>
         </c:txPr>
-        <c:crossAx val="-1818371216"/>
+        <c:crossAx val="811605984"/>
         <c:crosses val="autoZero"/>
         <c:auto val="1"/>
         <c:lblAlgn val="ctr"/>
@@ -482,7 +483,7 @@
         <c:noMultiLvlLbl val="0"/>
       </c:catAx>
       <c:valAx>
-        <c:axId val="-1818371216"/>
+        <c:axId val="811605984"/>
         <c:scaling>
           <c:orientation val="minMax"/>
         </c:scaling>
@@ -533,7 +534,7 @@
             <a:endParaRPr lang="zh-TW"/>
           </a:p>
         </c:txPr>
-        <c:crossAx val="-1818367952"/>
+        <c:crossAx val="811598368"/>
         <c:crosses val="autoZero"/>
         <c:crossBetween val="between"/>
       </c:valAx>
@@ -1228,7 +1229,7 @@
           <a:p>
             <a:fld id="{F80196F6-7584-4650-82DD-1A823E372E93}" type="datetimeFigureOut">
               <a:rPr lang="zh-TW" altLang="en-US" smtClean="0"/>
-              <a:t>2015/11/24</a:t>
+              <a:t>2015/11/25</a:t>
             </a:fld>
             <a:endParaRPr lang="zh-TW" altLang="en-US"/>
           </a:p>
@@ -1711,7 +1712,7 @@
           <a:p>
             <a:fld id="{E7A87A2D-0523-400E-8364-8FCFDAAEE150}" type="datetime1">
               <a:rPr lang="zh-TW" altLang="en-US" smtClean="0"/>
-              <a:t>2015/11/24</a:t>
+              <a:t>2015/11/25</a:t>
             </a:fld>
             <a:endParaRPr lang="zh-TW" altLang="en-US"/>
           </a:p>
@@ -1881,7 +1882,7 @@
           <a:p>
             <a:fld id="{4470E85D-BD6F-4D26-B110-7E28230C593F}" type="datetime1">
               <a:rPr lang="zh-TW" altLang="en-US" smtClean="0"/>
-              <a:t>2015/11/24</a:t>
+              <a:t>2015/11/25</a:t>
             </a:fld>
             <a:endParaRPr lang="zh-TW" altLang="en-US"/>
           </a:p>
@@ -2061,7 +2062,7 @@
           <a:p>
             <a:fld id="{D6E993F5-55DB-4F1A-9A97-9192FB5AEB42}" type="datetime1">
               <a:rPr lang="zh-TW" altLang="en-US" smtClean="0"/>
-              <a:t>2015/11/24</a:t>
+              <a:t>2015/11/25</a:t>
             </a:fld>
             <a:endParaRPr lang="zh-TW" altLang="en-US"/>
           </a:p>
@@ -2231,7 +2232,7 @@
           <a:p>
             <a:fld id="{C60B81E8-7334-464F-8B48-45CA70843E0C}" type="datetime1">
               <a:rPr lang="zh-TW" altLang="en-US" smtClean="0"/>
-              <a:t>2015/11/24</a:t>
+              <a:t>2015/11/25</a:t>
             </a:fld>
             <a:endParaRPr lang="zh-TW" altLang="en-US"/>
           </a:p>
@@ -2475,7 +2476,7 @@
           <a:p>
             <a:fld id="{D47ED321-95FB-497B-BD7E-3BD909DE64AD}" type="datetime1">
               <a:rPr lang="zh-TW" altLang="en-US" smtClean="0"/>
-              <a:t>2015/11/24</a:t>
+              <a:t>2015/11/25</a:t>
             </a:fld>
             <a:endParaRPr lang="zh-TW" altLang="en-US"/>
           </a:p>
@@ -2707,7 +2708,7 @@
           <a:p>
             <a:fld id="{497E4E27-12DC-43A4-A531-93F92B4B5AEB}" type="datetime1">
               <a:rPr lang="zh-TW" altLang="en-US" smtClean="0"/>
-              <a:t>2015/11/24</a:t>
+              <a:t>2015/11/25</a:t>
             </a:fld>
             <a:endParaRPr lang="zh-TW" altLang="en-US"/>
           </a:p>
@@ -3074,7 +3075,7 @@
           <a:p>
             <a:fld id="{C11F5D98-A40D-4F6A-B778-B48D2F7EC464}" type="datetime1">
               <a:rPr lang="zh-TW" altLang="en-US" smtClean="0"/>
-              <a:t>2015/11/24</a:t>
+              <a:t>2015/11/25</a:t>
             </a:fld>
             <a:endParaRPr lang="zh-TW" altLang="en-US"/>
           </a:p>
@@ -3192,7 +3193,7 @@
           <a:p>
             <a:fld id="{37540F8D-04B0-4510-8208-7A8AB7D75261}" type="datetime1">
               <a:rPr lang="zh-TW" altLang="en-US" smtClean="0"/>
-              <a:t>2015/11/24</a:t>
+              <a:t>2015/11/25</a:t>
             </a:fld>
             <a:endParaRPr lang="zh-TW" altLang="en-US"/>
           </a:p>
@@ -3287,7 +3288,7 @@
           <a:p>
             <a:fld id="{ED8E83AE-CBBB-4AB3-9A7C-32D18F7AB593}" type="datetime1">
               <a:rPr lang="zh-TW" altLang="en-US" smtClean="0"/>
-              <a:t>2015/11/24</a:t>
+              <a:t>2015/11/25</a:t>
             </a:fld>
             <a:endParaRPr lang="zh-TW" altLang="en-US"/>
           </a:p>
@@ -3564,7 +3565,7 @@
           <a:p>
             <a:fld id="{CF1BA43A-76D7-43A7-8042-3520281B1840}" type="datetime1">
               <a:rPr lang="zh-TW" altLang="en-US" smtClean="0"/>
-              <a:t>2015/11/24</a:t>
+              <a:t>2015/11/25</a:t>
             </a:fld>
             <a:endParaRPr lang="zh-TW" altLang="en-US"/>
           </a:p>
@@ -3821,7 +3822,7 @@
           <a:p>
             <a:fld id="{BB28C0ED-AAF8-4DB2-AF56-EE0DC21174BB}" type="datetime1">
               <a:rPr lang="zh-TW" altLang="en-US" smtClean="0"/>
-              <a:t>2015/11/24</a:t>
+              <a:t>2015/11/25</a:t>
             </a:fld>
             <a:endParaRPr lang="zh-TW" altLang="en-US"/>
           </a:p>
@@ -4034,7 +4035,7 @@
           <a:p>
             <a:fld id="{991B9CC3-7329-43C8-BC56-DBF8F15634F0}" type="datetime1">
               <a:rPr lang="zh-TW" altLang="en-US" smtClean="0"/>
-              <a:t>2015/11/24</a:t>
+              <a:t>2015/11/25</a:t>
             </a:fld>
             <a:endParaRPr lang="zh-TW" altLang="en-US"/>
           </a:p>
@@ -4503,7 +4504,7 @@
           <a:p>
             <a:fld id="{E49FC7B0-3E75-4441-B63F-4CC3A5531728}" type="datetime1">
               <a:rPr lang="zh-TW" altLang="en-US" smtClean="0"/>
-              <a:t>2015/11/24</a:t>
+              <a:t>2015/11/25</a:t>
             </a:fld>
             <a:endParaRPr lang="zh-TW" altLang="en-US"/>
           </a:p>
@@ -4564,6 +4565,261 @@
       </p:grpSpPr>
       <p:sp>
         <p:nvSpPr>
+          <p:cNvPr id="6" name="標題 5"/>
+          <p:cNvSpPr>
+            <a:spLocks noGrp="1"/>
+          </p:cNvSpPr>
+          <p:nvPr>
+            <p:ph type="title"/>
+          </p:nvPr>
+        </p:nvSpPr>
+        <p:spPr/>
+        <p:txBody>
+          <a:bodyPr/>
+          <a:lstStyle/>
+          <a:p>
+            <a:r>
+              <a:rPr lang="zh-TW" altLang="en-US" dirty="0" smtClean="0"/>
+              <a:t>版面</a:t>
+            </a:r>
+            <a:r>
+              <a:rPr lang="en-US" altLang="zh-TW" dirty="0"/>
+              <a:t>5</a:t>
+            </a:r>
+            <a:endParaRPr lang="zh-TW" altLang="en-US" dirty="0"/>
+          </a:p>
+        </p:txBody>
+      </p:sp>
+      <p:sp>
+        <p:nvSpPr>
+          <p:cNvPr id="7" name="文字版面配置區 6"/>
+          <p:cNvSpPr>
+            <a:spLocks noGrp="1"/>
+          </p:cNvSpPr>
+          <p:nvPr>
+            <p:ph type="body" idx="1"/>
+          </p:nvPr>
+        </p:nvSpPr>
+        <p:spPr/>
+        <p:txBody>
+          <a:bodyPr/>
+          <a:lstStyle/>
+          <a:p>
+            <a:r>
+              <a:rPr lang="en-US" altLang="zh-TW" dirty="0" smtClean="0"/>
+              <a:t>AAA</a:t>
+            </a:r>
+            <a:endParaRPr lang="zh-TW" altLang="en-US" dirty="0"/>
+          </a:p>
+        </p:txBody>
+      </p:sp>
+      <p:sp>
+        <p:nvSpPr>
+          <p:cNvPr id="8" name="內容版面配置區 7"/>
+          <p:cNvSpPr>
+            <a:spLocks noGrp="1"/>
+          </p:cNvSpPr>
+          <p:nvPr>
+            <p:ph sz="half" idx="2"/>
+          </p:nvPr>
+        </p:nvSpPr>
+        <p:spPr/>
+        <p:txBody>
+          <a:bodyPr/>
+          <a:lstStyle/>
+          <a:p>
+            <a:r>
+              <a:rPr lang="en-US" altLang="zh-TW" dirty="0" smtClean="0"/>
+              <a:t>QQQ</a:t>
+            </a:r>
+          </a:p>
+          <a:p>
+            <a:r>
+              <a:rPr lang="en-US" altLang="zh-TW" dirty="0" smtClean="0"/>
+              <a:t>BE</a:t>
+            </a:r>
+          </a:p>
+          <a:p>
+            <a:pPr lvl="1"/>
+            <a:r>
+              <a:rPr lang="en-US" altLang="zh-TW" dirty="0" smtClean="0"/>
+              <a:t>DQ</a:t>
+            </a:r>
+          </a:p>
+          <a:p>
+            <a:pPr lvl="1"/>
+            <a:r>
+              <a:rPr lang="en-US" altLang="zh-TW" dirty="0" err="1" smtClean="0"/>
+              <a:t>Fgg</a:t>
+            </a:r>
+            <a:endParaRPr lang="en-US" altLang="zh-TW" dirty="0" smtClean="0"/>
+          </a:p>
+          <a:p>
+            <a:pPr lvl="2"/>
+            <a:r>
+              <a:rPr lang="en-US" altLang="zh-TW" dirty="0" err="1" smtClean="0"/>
+              <a:t>Sfdhggfh</a:t>
+            </a:r>
+            <a:endParaRPr lang="en-US" altLang="zh-TW" dirty="0" smtClean="0"/>
+          </a:p>
+          <a:p>
+            <a:pPr lvl="2"/>
+            <a:r>
+              <a:rPr lang="en-US" altLang="zh-TW" dirty="0" err="1" smtClean="0"/>
+              <a:t>fdhdfh</a:t>
+            </a:r>
+            <a:endParaRPr lang="zh-TW" altLang="en-US" dirty="0"/>
+          </a:p>
+        </p:txBody>
+      </p:sp>
+      <p:sp>
+        <p:nvSpPr>
+          <p:cNvPr id="9" name="文字版面配置區 8"/>
+          <p:cNvSpPr>
+            <a:spLocks noGrp="1"/>
+          </p:cNvSpPr>
+          <p:nvPr>
+            <p:ph type="body" sz="quarter" idx="3"/>
+          </p:nvPr>
+        </p:nvSpPr>
+        <p:spPr/>
+        <p:txBody>
+          <a:bodyPr/>
+          <a:lstStyle/>
+          <a:p>
+            <a:r>
+              <a:rPr lang="en-US" altLang="zh-TW" dirty="0" smtClean="0"/>
+              <a:t>BBB</a:t>
+            </a:r>
+            <a:endParaRPr lang="zh-TW" altLang="en-US" dirty="0"/>
+          </a:p>
+        </p:txBody>
+      </p:sp>
+      <p:sp>
+        <p:nvSpPr>
+          <p:cNvPr id="10" name="內容版面配置區 9"/>
+          <p:cNvSpPr>
+            <a:spLocks noGrp="1"/>
+          </p:cNvSpPr>
+          <p:nvPr>
+            <p:ph sz="quarter" idx="4"/>
+          </p:nvPr>
+        </p:nvSpPr>
+        <p:spPr/>
+        <p:txBody>
+          <a:bodyPr/>
+          <a:lstStyle/>
+          <a:p>
+            <a:pPr>
+              <a:buFont typeface="Wingdings" panose="05000000000000000000" pitchFamily="2" charset="2"/>
+              <a:buChar char="Ø"/>
+            </a:pPr>
+            <a:r>
+              <a:rPr lang="en-US" altLang="zh-TW" dirty="0" smtClean="0"/>
+              <a:t>65465</a:t>
+            </a:r>
+          </a:p>
+          <a:p>
+            <a:pPr>
+              <a:buFont typeface="Wingdings" panose="05000000000000000000" pitchFamily="2" charset="2"/>
+              <a:buChar char="Ø"/>
+            </a:pPr>
+            <a:r>
+              <a:rPr lang="en-US" altLang="zh-TW" dirty="0" smtClean="0"/>
+              <a:t>65464</a:t>
+            </a:r>
+          </a:p>
+          <a:p>
+            <a:pPr>
+              <a:buFont typeface="Wingdings" panose="05000000000000000000" pitchFamily="2" charset="2"/>
+              <a:buChar char="Ø"/>
+            </a:pPr>
+            <a:r>
+              <a:rPr lang="en-US" altLang="zh-TW" dirty="0" smtClean="0"/>
+              <a:t>6546</a:t>
+            </a:r>
+            <a:endParaRPr lang="zh-TW" altLang="en-US" dirty="0"/>
+          </a:p>
+        </p:txBody>
+      </p:sp>
+      <p:sp>
+        <p:nvSpPr>
+          <p:cNvPr id="4" name="日期版面配置區 3"/>
+          <p:cNvSpPr>
+            <a:spLocks noGrp="1"/>
+          </p:cNvSpPr>
+          <p:nvPr>
+            <p:ph type="dt" sz="half" idx="10"/>
+          </p:nvPr>
+        </p:nvSpPr>
+        <p:spPr/>
+        <p:txBody>
+          <a:bodyPr/>
+          <a:lstStyle/>
+          <a:p>
+            <a:fld id="{C60B81E8-7334-464F-8B48-45CA70843E0C}" type="datetime1">
+              <a:rPr lang="zh-TW" altLang="en-US" smtClean="0"/>
+              <a:t>2015/11/25</a:t>
+            </a:fld>
+            <a:endParaRPr lang="zh-TW" altLang="en-US"/>
+          </a:p>
+        </p:txBody>
+      </p:sp>
+      <p:sp>
+        <p:nvSpPr>
+          <p:cNvPr id="5" name="投影片編號版面配置區 4"/>
+          <p:cNvSpPr>
+            <a:spLocks noGrp="1"/>
+          </p:cNvSpPr>
+          <p:nvPr>
+            <p:ph type="sldNum" sz="quarter" idx="12"/>
+          </p:nvPr>
+        </p:nvSpPr>
+        <p:spPr/>
+        <p:txBody>
+          <a:bodyPr/>
+          <a:lstStyle/>
+          <a:p>
+            <a:fld id="{6923F3CB-4711-4FC8-9867-5888834CD7FE}" type="slidenum">
+              <a:rPr lang="zh-TW" altLang="en-US" smtClean="0"/>
+              <a:t>10</a:t>
+            </a:fld>
+            <a:endParaRPr lang="zh-TW" altLang="en-US"/>
+          </a:p>
+        </p:txBody>
+      </p:sp>
+    </p:spTree>
+    <p:extLst>
+      <p:ext uri="{BB962C8B-B14F-4D97-AF65-F5344CB8AC3E}">
+        <p14:creationId xmlns:p14="http://schemas.microsoft.com/office/powerpoint/2010/main" val="2611549055"/>
+      </p:ext>
+    </p:extLst>
+  </p:cSld>
+  <p:clrMapOvr>
+    <a:masterClrMapping/>
+  </p:clrMapOvr>
+</p:sld>
+</file>
+
+<file path=ppt/slides/slide11.xml><?xml version="1.0" encoding="utf-8"?>
+<p:sld xmlns:a="http://schemas.openxmlformats.org/drawingml/2006/main" xmlns:r="http://schemas.openxmlformats.org/officeDocument/2006/relationships" xmlns:p="http://schemas.openxmlformats.org/presentationml/2006/main">
+  <p:cSld>
+    <p:spTree>
+      <p:nvGrpSpPr>
+        <p:cNvPr id="1" name=""/>
+        <p:cNvGrpSpPr/>
+        <p:nvPr/>
+      </p:nvGrpSpPr>
+      <p:grpSpPr>
+        <a:xfrm>
+          <a:off x="0" y="0"/>
+          <a:ext cx="0" cy="0"/>
+          <a:chOff x="0" y="0"/>
+          <a:chExt cx="0" cy="0"/>
+        </a:xfrm>
+      </p:grpSpPr>
+      <p:sp>
+        <p:nvSpPr>
           <p:cNvPr id="11" name="標題 10"/>
           <p:cNvSpPr>
             <a:spLocks noGrp="1"/>
@@ -4627,7 +4883,7 @@
           <a:p>
             <a:fld id="{C11F5D98-A40D-4F6A-B778-B48D2F7EC464}" type="datetime1">
               <a:rPr lang="zh-TW" altLang="en-US" smtClean="0"/>
-              <a:t>2015/11/24</a:t>
+              <a:t>2015/11/25</a:t>
             </a:fld>
             <a:endParaRPr lang="zh-TW" altLang="en-US"/>
           </a:p>
@@ -4650,7 +4906,7 @@
           <a:p>
             <a:fld id="{6923F3CB-4711-4FC8-9867-5888834CD7FE}" type="slidenum">
               <a:rPr lang="zh-TW" altLang="en-US" smtClean="0"/>
-              <a:t>10</a:t>
+              <a:t>11</a:t>
             </a:fld>
             <a:endParaRPr lang="zh-TW" altLang="en-US"/>
           </a:p>
@@ -4761,7 +5017,7 @@
           <a:p>
             <a:fld id="{7D259E43-2377-4BD5-9EF1-8A04A4F66F0C}" type="datetime1">
               <a:rPr lang="zh-TW" altLang="en-US" smtClean="0"/>
-              <a:t>2015/11/24</a:t>
+              <a:t>2015/11/25</a:t>
             </a:fld>
             <a:endParaRPr lang="zh-TW" altLang="en-US"/>
           </a:p>
@@ -4806,6 +5062,14 @@
 <file path=ppt/slides/slide3.xml><?xml version="1.0" encoding="utf-8"?>
 <p:sld xmlns:a="http://schemas.openxmlformats.org/drawingml/2006/main" xmlns:r="http://schemas.openxmlformats.org/officeDocument/2006/relationships" xmlns:p="http://schemas.openxmlformats.org/presentationml/2006/main">
   <p:cSld>
+    <p:bg>
+      <p:bgPr>
+        <a:solidFill>
+          <a:srgbClr val="A7F175"/>
+        </a:solidFill>
+        <a:effectLst/>
+      </p:bgPr>
+    </p:bg>
     <p:spTree>
       <p:nvGrpSpPr>
         <p:cNvPr id="1" name=""/>
@@ -4835,53 +5099,36 @@
           <a:bodyPr/>
           <a:lstStyle/>
           <a:p>
-            <a:pPr algn="ctr"/>
-            <a:r>
-              <a:rPr lang="zh-TW" altLang="en-US" i="1" u="sng" dirty="0" smtClean="0">
-                <a:latin typeface="標楷體" panose="03000509000000000000" pitchFamily="65" charset="-120"/>
-                <a:ea typeface="標楷體" panose="03000509000000000000" pitchFamily="65" charset="-120"/>
-              </a:rPr>
-              <a:t>圖片測試</a:t>
-            </a:r>
-            <a:endParaRPr lang="zh-TW" altLang="en-US" i="1" u="sng" dirty="0">
-              <a:latin typeface="標楷體" panose="03000509000000000000" pitchFamily="65" charset="-120"/>
-              <a:ea typeface="標楷體" panose="03000509000000000000" pitchFamily="65" charset="-120"/>
-            </a:endParaRPr>
-          </a:p>
-        </p:txBody>
-      </p:sp>
-      <p:pic>
-        <p:nvPicPr>
-          <p:cNvPr id="4" name="內容版面配置區 3"/>
-          <p:cNvPicPr>
-            <a:picLocks noGrp="1" noChangeAspect="1"/>
-          </p:cNvPicPr>
+            <a:r>
+              <a:rPr lang="zh-TW" altLang="en-US" dirty="0" smtClean="0"/>
+              <a:t>背景測試</a:t>
+            </a:r>
+            <a:endParaRPr lang="zh-TW" altLang="en-US" dirty="0"/>
+          </a:p>
+        </p:txBody>
+      </p:sp>
+      <p:sp>
+        <p:nvSpPr>
+          <p:cNvPr id="3" name="內容版面配置區 2"/>
+          <p:cNvSpPr>
+            <a:spLocks noGrp="1"/>
+          </p:cNvSpPr>
           <p:nvPr>
             <p:ph idx="1"/>
           </p:nvPr>
-        </p:nvPicPr>
-        <p:blipFill>
-          <a:blip r:embed="rId2">
-            <a:extLst>
-              <a:ext uri="{28A0092B-C50C-407E-A947-70E740481C1C}">
-                <a14:useLocalDpi xmlns:a14="http://schemas.microsoft.com/office/drawing/2010/main" val="0"/>
-              </a:ext>
-            </a:extLst>
-          </a:blip>
-          <a:stretch>
-            <a:fillRect/>
-          </a:stretch>
-        </p:blipFill>
-        <p:spPr>
-          <a:xfrm>
-            <a:off x="628650" y="1957762"/>
-            <a:ext cx="7886700" cy="4087063"/>
-          </a:xfrm>
-        </p:spPr>
-      </p:pic>
-      <p:sp>
-        <p:nvSpPr>
-          <p:cNvPr id="3" name="日期版面配置區 2"/>
+        </p:nvSpPr>
+        <p:spPr/>
+        <p:txBody>
+          <a:bodyPr/>
+          <a:lstStyle/>
+          <a:p>
+            <a:endParaRPr lang="zh-TW" altLang="en-US"/>
+          </a:p>
+        </p:txBody>
+      </p:sp>
+      <p:sp>
+        <p:nvSpPr>
+          <p:cNvPr id="4" name="日期版面配置區 3"/>
           <p:cNvSpPr>
             <a:spLocks noGrp="1"/>
           </p:cNvSpPr>
@@ -4894,9 +5141,9 @@
           <a:bodyPr/>
           <a:lstStyle/>
           <a:p>
-            <a:fld id="{3E86548D-D54C-4064-8B18-89FB2D942122}" type="datetime1">
-              <a:rPr lang="zh-TW" altLang="en-US" smtClean="0"/>
-              <a:t>2015/11/24</a:t>
+            <a:fld id="{C60B81E8-7334-464F-8B48-45CA70843E0C}" type="datetime1">
+              <a:rPr lang="zh-TW" altLang="en-US" smtClean="0"/>
+              <a:t>2015/11/25</a:t>
             </a:fld>
             <a:endParaRPr lang="zh-TW" altLang="en-US"/>
           </a:p>
@@ -4928,7 +5175,7 @@
     </p:spTree>
     <p:extLst>
       <p:ext uri="{BB962C8B-B14F-4D97-AF65-F5344CB8AC3E}">
-        <p14:creationId xmlns:p14="http://schemas.microsoft.com/office/powerpoint/2010/main" val="2831287719"/>
+        <p14:creationId xmlns:p14="http://schemas.microsoft.com/office/powerpoint/2010/main" val="81424645"/>
       </p:ext>
     </p:extLst>
   </p:cSld>
@@ -4970,6 +5217,141 @@
           <a:bodyPr/>
           <a:lstStyle/>
           <a:p>
+            <a:pPr algn="ctr"/>
+            <a:r>
+              <a:rPr lang="zh-TW" altLang="en-US" i="1" u="sng" dirty="0" smtClean="0">
+                <a:latin typeface="標楷體" panose="03000509000000000000" pitchFamily="65" charset="-120"/>
+                <a:ea typeface="標楷體" panose="03000509000000000000" pitchFamily="65" charset="-120"/>
+              </a:rPr>
+              <a:t>圖片測試</a:t>
+            </a:r>
+            <a:endParaRPr lang="zh-TW" altLang="en-US" i="1" u="sng" dirty="0">
+              <a:latin typeface="標楷體" panose="03000509000000000000" pitchFamily="65" charset="-120"/>
+              <a:ea typeface="標楷體" panose="03000509000000000000" pitchFamily="65" charset="-120"/>
+            </a:endParaRPr>
+          </a:p>
+        </p:txBody>
+      </p:sp>
+      <p:pic>
+        <p:nvPicPr>
+          <p:cNvPr id="4" name="內容版面配置區 3"/>
+          <p:cNvPicPr>
+            <a:picLocks noGrp="1" noChangeAspect="1"/>
+          </p:cNvPicPr>
+          <p:nvPr>
+            <p:ph idx="1"/>
+          </p:nvPr>
+        </p:nvPicPr>
+        <p:blipFill>
+          <a:blip r:embed="rId2">
+            <a:extLst>
+              <a:ext uri="{28A0092B-C50C-407E-A947-70E740481C1C}">
+                <a14:useLocalDpi xmlns:a14="http://schemas.microsoft.com/office/drawing/2010/main" val="0"/>
+              </a:ext>
+            </a:extLst>
+          </a:blip>
+          <a:stretch>
+            <a:fillRect/>
+          </a:stretch>
+        </p:blipFill>
+        <p:spPr>
+          <a:xfrm>
+            <a:off x="628650" y="1957762"/>
+            <a:ext cx="7886700" cy="4087063"/>
+          </a:xfrm>
+        </p:spPr>
+      </p:pic>
+      <p:sp>
+        <p:nvSpPr>
+          <p:cNvPr id="3" name="日期版面配置區 2"/>
+          <p:cNvSpPr>
+            <a:spLocks noGrp="1"/>
+          </p:cNvSpPr>
+          <p:nvPr>
+            <p:ph type="dt" sz="half" idx="10"/>
+          </p:nvPr>
+        </p:nvSpPr>
+        <p:spPr/>
+        <p:txBody>
+          <a:bodyPr/>
+          <a:lstStyle/>
+          <a:p>
+            <a:fld id="{3E86548D-D54C-4064-8B18-89FB2D942122}" type="datetime1">
+              <a:rPr lang="zh-TW" altLang="en-US" smtClean="0"/>
+              <a:t>2015/11/25</a:t>
+            </a:fld>
+            <a:endParaRPr lang="zh-TW" altLang="en-US"/>
+          </a:p>
+        </p:txBody>
+      </p:sp>
+      <p:sp>
+        <p:nvSpPr>
+          <p:cNvPr id="5" name="投影片編號版面配置區 4"/>
+          <p:cNvSpPr>
+            <a:spLocks noGrp="1"/>
+          </p:cNvSpPr>
+          <p:nvPr>
+            <p:ph type="sldNum" sz="quarter" idx="12"/>
+          </p:nvPr>
+        </p:nvSpPr>
+        <p:spPr/>
+        <p:txBody>
+          <a:bodyPr/>
+          <a:lstStyle/>
+          <a:p>
+            <a:fld id="{6923F3CB-4711-4FC8-9867-5888834CD7FE}" type="slidenum">
+              <a:rPr lang="zh-TW" altLang="en-US" smtClean="0"/>
+              <a:t>4</a:t>
+            </a:fld>
+            <a:endParaRPr lang="zh-TW" altLang="en-US"/>
+          </a:p>
+        </p:txBody>
+      </p:sp>
+    </p:spTree>
+    <p:extLst>
+      <p:ext uri="{BB962C8B-B14F-4D97-AF65-F5344CB8AC3E}">
+        <p14:creationId xmlns:p14="http://schemas.microsoft.com/office/powerpoint/2010/main" val="2831287719"/>
+      </p:ext>
+    </p:extLst>
+  </p:cSld>
+  <p:clrMapOvr>
+    <a:masterClrMapping/>
+  </p:clrMapOvr>
+</p:sld>
+</file>
+
+<file path=ppt/slides/slide5.xml><?xml version="1.0" encoding="utf-8"?>
+<p:sld xmlns:a="http://schemas.openxmlformats.org/drawingml/2006/main" xmlns:r="http://schemas.openxmlformats.org/officeDocument/2006/relationships" xmlns:p="http://schemas.openxmlformats.org/presentationml/2006/main">
+  <p:cSld>
+    <p:spTree>
+      <p:nvGrpSpPr>
+        <p:cNvPr id="1" name=""/>
+        <p:cNvGrpSpPr/>
+        <p:nvPr/>
+      </p:nvGrpSpPr>
+      <p:grpSpPr>
+        <a:xfrm>
+          <a:off x="0" y="0"/>
+          <a:ext cx="0" cy="0"/>
+          <a:chOff x="0" y="0"/>
+          <a:chExt cx="0" cy="0"/>
+        </a:xfrm>
+      </p:grpSpPr>
+      <p:sp>
+        <p:nvSpPr>
+          <p:cNvPr id="2" name="標題 1"/>
+          <p:cNvSpPr>
+            <a:spLocks noGrp="1"/>
+          </p:cNvSpPr>
+          <p:nvPr>
+            <p:ph type="title"/>
+          </p:nvPr>
+        </p:nvSpPr>
+        <p:spPr/>
+        <p:txBody>
+          <a:bodyPr/>
+          <a:lstStyle/>
+          <a:p>
             <a:pPr algn="r"/>
             <a:r>
               <a:rPr lang="zh-TW" altLang="en-US" i="1" u="sng" dirty="0" smtClean="0">
@@ -5031,7 +5413,7 @@
           <a:p>
             <a:fld id="{3E86548D-D54C-4064-8B18-89FB2D942122}" type="datetime1">
               <a:rPr lang="zh-TW" altLang="en-US" smtClean="0"/>
-              <a:t>2015/11/24</a:t>
+              <a:t>2015/11/25</a:t>
             </a:fld>
             <a:endParaRPr lang="zh-TW" altLang="en-US"/>
           </a:p>
@@ -5054,7 +5436,7 @@
           <a:p>
             <a:fld id="{6923F3CB-4711-4FC8-9867-5888834CD7FE}" type="slidenum">
               <a:rPr lang="zh-TW" altLang="en-US" smtClean="0"/>
-              <a:t>4</a:t>
+              <a:t>5</a:t>
             </a:fld>
             <a:endParaRPr lang="zh-TW" altLang="en-US"/>
           </a:p>
@@ -5103,7 +5485,7 @@
 </p:sld>
 </file>
 
-<file path=ppt/slides/slide5.xml><?xml version="1.0" encoding="utf-8"?>
+<file path=ppt/slides/slide6.xml><?xml version="1.0" encoding="utf-8"?>
 <p:sld xmlns:a="http://schemas.openxmlformats.org/drawingml/2006/main" xmlns:r="http://schemas.openxmlformats.org/officeDocument/2006/relationships" xmlns:p="http://schemas.openxmlformats.org/presentationml/2006/main">
   <p:cSld>
     <p:spTree>
@@ -5540,7 +5922,7 @@
           <a:p>
             <a:fld id="{94FA48B1-D508-49FA-BBA0-5047EEF68D44}" type="datetime1">
               <a:rPr lang="zh-TW" altLang="en-US" smtClean="0"/>
-              <a:t>2015/11/24</a:t>
+              <a:t>2015/11/25</a:t>
             </a:fld>
             <a:endParaRPr lang="zh-TW" altLang="en-US"/>
           </a:p>
@@ -5563,7 +5945,7 @@
           <a:p>
             <a:fld id="{6923F3CB-4711-4FC8-9867-5888834CD7FE}" type="slidenum">
               <a:rPr lang="zh-TW" altLang="en-US" smtClean="0"/>
-              <a:t>5</a:t>
+              <a:t>6</a:t>
             </a:fld>
             <a:endParaRPr lang="zh-TW" altLang="en-US"/>
           </a:p>
@@ -5582,7 +5964,7 @@
 </p:sld>
 </file>
 
-<file path=ppt/slides/slide6.xml><?xml version="1.0" encoding="utf-8"?>
+<file path=ppt/slides/slide7.xml><?xml version="1.0" encoding="utf-8"?>
 <p:sld xmlns:a="http://schemas.openxmlformats.org/drawingml/2006/main" xmlns:r="http://schemas.openxmlformats.org/officeDocument/2006/relationships" xmlns:p="http://schemas.openxmlformats.org/presentationml/2006/main">
   <p:cSld>
     <p:spTree>
@@ -5776,7 +6158,7 @@
           <a:p>
             <a:fld id="{E0EFF268-3616-48FD-9778-BBA6A4676333}" type="datetime1">
               <a:rPr lang="zh-TW" altLang="en-US" smtClean="0"/>
-              <a:t>2015/11/24</a:t>
+              <a:t>2015/11/25</a:t>
             </a:fld>
             <a:endParaRPr lang="zh-TW" altLang="en-US"/>
           </a:p>
@@ -5799,7 +6181,7 @@
           <a:p>
             <a:fld id="{6923F3CB-4711-4FC8-9867-5888834CD7FE}" type="slidenum">
               <a:rPr lang="zh-TW" altLang="en-US" smtClean="0"/>
-              <a:t>6</a:t>
+              <a:t>7</a:t>
             </a:fld>
             <a:endParaRPr lang="zh-TW" altLang="en-US"/>
           </a:p>
@@ -6893,7 +7275,7 @@
 </p:sld>
 </file>
 
-<file path=ppt/slides/slide7.xml><?xml version="1.0" encoding="utf-8"?>
+<file path=ppt/slides/slide8.xml><?xml version="1.0" encoding="utf-8"?>
 <p:sld xmlns:a="http://schemas.openxmlformats.org/drawingml/2006/main" xmlns:r="http://schemas.openxmlformats.org/officeDocument/2006/relationships" xmlns:p="http://schemas.openxmlformats.org/presentationml/2006/main">
   <p:cSld>
     <p:spTree>
@@ -7195,7 +7577,7 @@
           <a:p>
             <a:fld id="{5A0B17C9-1A35-4216-82FA-299D192A2D4E}" type="datetime1">
               <a:rPr lang="zh-TW" altLang="en-US" smtClean="0"/>
-              <a:t>2015/11/24</a:t>
+              <a:t>2015/11/25</a:t>
             </a:fld>
             <a:endParaRPr lang="zh-TW" altLang="en-US"/>
           </a:p>
@@ -7218,7 +7600,7 @@
           <a:p>
             <a:fld id="{6923F3CB-4711-4FC8-9867-5888834CD7FE}" type="slidenum">
               <a:rPr lang="zh-TW" altLang="en-US" smtClean="0"/>
-              <a:t>7</a:t>
+              <a:t>8</a:t>
             </a:fld>
             <a:endParaRPr lang="zh-TW" altLang="en-US"/>
           </a:p>
@@ -7859,7 +8241,7 @@
 </p:sld>
 </file>
 
-<file path=ppt/slides/slide8.xml><?xml version="1.0" encoding="utf-8"?>
+<file path=ppt/slides/slide9.xml><?xml version="1.0" encoding="utf-8"?>
 <p:sld xmlns:a="http://schemas.openxmlformats.org/drawingml/2006/main" xmlns:r="http://schemas.openxmlformats.org/officeDocument/2006/relationships" xmlns:p="http://schemas.openxmlformats.org/presentationml/2006/main">
   <p:cSld>
     <p:spTree>
@@ -7916,7 +8298,7 @@
           <a:p>
             <a:fld id="{C60B81E8-7334-464F-8B48-45CA70843E0C}" type="datetime1">
               <a:rPr lang="zh-TW" altLang="en-US" smtClean="0"/>
-              <a:t>2015/11/24</a:t>
+              <a:t>2015/11/25</a:t>
             </a:fld>
             <a:endParaRPr lang="zh-TW" altLang="en-US"/>
           </a:p>
@@ -7939,7 +8321,7 @@
           <a:p>
             <a:fld id="{6923F3CB-4711-4FC8-9867-5888834CD7FE}" type="slidenum">
               <a:rPr lang="zh-TW" altLang="en-US" smtClean="0"/>
-              <a:t>8</a:t>
+              <a:t>9</a:t>
             </a:fld>
             <a:endParaRPr lang="zh-TW" altLang="en-US"/>
           </a:p>
@@ -8650,261 +9032,6 @@
     <p:extLst>
       <p:ext uri="{BB962C8B-B14F-4D97-AF65-F5344CB8AC3E}">
         <p14:creationId xmlns:p14="http://schemas.microsoft.com/office/powerpoint/2010/main" val="3076910671"/>
-      </p:ext>
-    </p:extLst>
-  </p:cSld>
-  <p:clrMapOvr>
-    <a:masterClrMapping/>
-  </p:clrMapOvr>
-</p:sld>
-</file>
-
-<file path=ppt/slides/slide9.xml><?xml version="1.0" encoding="utf-8"?>
-<p:sld xmlns:a="http://schemas.openxmlformats.org/drawingml/2006/main" xmlns:r="http://schemas.openxmlformats.org/officeDocument/2006/relationships" xmlns:p="http://schemas.openxmlformats.org/presentationml/2006/main">
-  <p:cSld>
-    <p:spTree>
-      <p:nvGrpSpPr>
-        <p:cNvPr id="1" name=""/>
-        <p:cNvGrpSpPr/>
-        <p:nvPr/>
-      </p:nvGrpSpPr>
-      <p:grpSpPr>
-        <a:xfrm>
-          <a:off x="0" y="0"/>
-          <a:ext cx="0" cy="0"/>
-          <a:chOff x="0" y="0"/>
-          <a:chExt cx="0" cy="0"/>
-        </a:xfrm>
-      </p:grpSpPr>
-      <p:sp>
-        <p:nvSpPr>
-          <p:cNvPr id="6" name="標題 5"/>
-          <p:cNvSpPr>
-            <a:spLocks noGrp="1"/>
-          </p:cNvSpPr>
-          <p:nvPr>
-            <p:ph type="title"/>
-          </p:nvPr>
-        </p:nvSpPr>
-        <p:spPr/>
-        <p:txBody>
-          <a:bodyPr/>
-          <a:lstStyle/>
-          <a:p>
-            <a:r>
-              <a:rPr lang="zh-TW" altLang="en-US" dirty="0" smtClean="0"/>
-              <a:t>版面</a:t>
-            </a:r>
-            <a:r>
-              <a:rPr lang="en-US" altLang="zh-TW" dirty="0"/>
-              <a:t>5</a:t>
-            </a:r>
-            <a:endParaRPr lang="zh-TW" altLang="en-US" dirty="0"/>
-          </a:p>
-        </p:txBody>
-      </p:sp>
-      <p:sp>
-        <p:nvSpPr>
-          <p:cNvPr id="7" name="文字版面配置區 6"/>
-          <p:cNvSpPr>
-            <a:spLocks noGrp="1"/>
-          </p:cNvSpPr>
-          <p:nvPr>
-            <p:ph type="body" idx="1"/>
-          </p:nvPr>
-        </p:nvSpPr>
-        <p:spPr/>
-        <p:txBody>
-          <a:bodyPr/>
-          <a:lstStyle/>
-          <a:p>
-            <a:r>
-              <a:rPr lang="en-US" altLang="zh-TW" dirty="0" smtClean="0"/>
-              <a:t>AAA</a:t>
-            </a:r>
-            <a:endParaRPr lang="zh-TW" altLang="en-US" dirty="0"/>
-          </a:p>
-        </p:txBody>
-      </p:sp>
-      <p:sp>
-        <p:nvSpPr>
-          <p:cNvPr id="8" name="內容版面配置區 7"/>
-          <p:cNvSpPr>
-            <a:spLocks noGrp="1"/>
-          </p:cNvSpPr>
-          <p:nvPr>
-            <p:ph sz="half" idx="2"/>
-          </p:nvPr>
-        </p:nvSpPr>
-        <p:spPr/>
-        <p:txBody>
-          <a:bodyPr/>
-          <a:lstStyle/>
-          <a:p>
-            <a:r>
-              <a:rPr lang="en-US" altLang="zh-TW" dirty="0" smtClean="0"/>
-              <a:t>QQQ</a:t>
-            </a:r>
-          </a:p>
-          <a:p>
-            <a:r>
-              <a:rPr lang="en-US" altLang="zh-TW" dirty="0" smtClean="0"/>
-              <a:t>BE</a:t>
-            </a:r>
-          </a:p>
-          <a:p>
-            <a:pPr lvl="1"/>
-            <a:r>
-              <a:rPr lang="en-US" altLang="zh-TW" dirty="0" smtClean="0"/>
-              <a:t>DQ</a:t>
-            </a:r>
-          </a:p>
-          <a:p>
-            <a:pPr lvl="1"/>
-            <a:r>
-              <a:rPr lang="en-US" altLang="zh-TW" dirty="0" err="1" smtClean="0"/>
-              <a:t>Fgg</a:t>
-            </a:r>
-            <a:endParaRPr lang="en-US" altLang="zh-TW" dirty="0" smtClean="0"/>
-          </a:p>
-          <a:p>
-            <a:pPr lvl="2"/>
-            <a:r>
-              <a:rPr lang="en-US" altLang="zh-TW" dirty="0" err="1" smtClean="0"/>
-              <a:t>Sfdhggfh</a:t>
-            </a:r>
-            <a:endParaRPr lang="en-US" altLang="zh-TW" dirty="0" smtClean="0"/>
-          </a:p>
-          <a:p>
-            <a:pPr lvl="2"/>
-            <a:r>
-              <a:rPr lang="en-US" altLang="zh-TW" dirty="0" err="1" smtClean="0"/>
-              <a:t>fdhdfh</a:t>
-            </a:r>
-            <a:endParaRPr lang="zh-TW" altLang="en-US" dirty="0"/>
-          </a:p>
-        </p:txBody>
-      </p:sp>
-      <p:sp>
-        <p:nvSpPr>
-          <p:cNvPr id="9" name="文字版面配置區 8"/>
-          <p:cNvSpPr>
-            <a:spLocks noGrp="1"/>
-          </p:cNvSpPr>
-          <p:nvPr>
-            <p:ph type="body" sz="quarter" idx="3"/>
-          </p:nvPr>
-        </p:nvSpPr>
-        <p:spPr/>
-        <p:txBody>
-          <a:bodyPr/>
-          <a:lstStyle/>
-          <a:p>
-            <a:r>
-              <a:rPr lang="en-US" altLang="zh-TW" dirty="0" smtClean="0"/>
-              <a:t>BBB</a:t>
-            </a:r>
-            <a:endParaRPr lang="zh-TW" altLang="en-US" dirty="0"/>
-          </a:p>
-        </p:txBody>
-      </p:sp>
-      <p:sp>
-        <p:nvSpPr>
-          <p:cNvPr id="10" name="內容版面配置區 9"/>
-          <p:cNvSpPr>
-            <a:spLocks noGrp="1"/>
-          </p:cNvSpPr>
-          <p:nvPr>
-            <p:ph sz="quarter" idx="4"/>
-          </p:nvPr>
-        </p:nvSpPr>
-        <p:spPr/>
-        <p:txBody>
-          <a:bodyPr/>
-          <a:lstStyle/>
-          <a:p>
-            <a:pPr>
-              <a:buFont typeface="Wingdings" panose="05000000000000000000" pitchFamily="2" charset="2"/>
-              <a:buChar char="Ø"/>
-            </a:pPr>
-            <a:r>
-              <a:rPr lang="en-US" altLang="zh-TW" dirty="0" smtClean="0"/>
-              <a:t>65465</a:t>
-            </a:r>
-          </a:p>
-          <a:p>
-            <a:pPr>
-              <a:buFont typeface="Wingdings" panose="05000000000000000000" pitchFamily="2" charset="2"/>
-              <a:buChar char="Ø"/>
-            </a:pPr>
-            <a:r>
-              <a:rPr lang="en-US" altLang="zh-TW" dirty="0" smtClean="0"/>
-              <a:t>65464</a:t>
-            </a:r>
-          </a:p>
-          <a:p>
-            <a:pPr>
-              <a:buFont typeface="Wingdings" panose="05000000000000000000" pitchFamily="2" charset="2"/>
-              <a:buChar char="Ø"/>
-            </a:pPr>
-            <a:r>
-              <a:rPr lang="en-US" altLang="zh-TW" dirty="0" smtClean="0"/>
-              <a:t>6546</a:t>
-            </a:r>
-            <a:endParaRPr lang="zh-TW" altLang="en-US" dirty="0"/>
-          </a:p>
-        </p:txBody>
-      </p:sp>
-      <p:sp>
-        <p:nvSpPr>
-          <p:cNvPr id="4" name="日期版面配置區 3"/>
-          <p:cNvSpPr>
-            <a:spLocks noGrp="1"/>
-          </p:cNvSpPr>
-          <p:nvPr>
-            <p:ph type="dt" sz="half" idx="10"/>
-          </p:nvPr>
-        </p:nvSpPr>
-        <p:spPr/>
-        <p:txBody>
-          <a:bodyPr/>
-          <a:lstStyle/>
-          <a:p>
-            <a:fld id="{C60B81E8-7334-464F-8B48-45CA70843E0C}" type="datetime1">
-              <a:rPr lang="zh-TW" altLang="en-US" smtClean="0"/>
-              <a:t>2015/11/24</a:t>
-            </a:fld>
-            <a:endParaRPr lang="zh-TW" altLang="en-US"/>
-          </a:p>
-        </p:txBody>
-      </p:sp>
-      <p:sp>
-        <p:nvSpPr>
-          <p:cNvPr id="5" name="投影片編號版面配置區 4"/>
-          <p:cNvSpPr>
-            <a:spLocks noGrp="1"/>
-          </p:cNvSpPr>
-          <p:nvPr>
-            <p:ph type="sldNum" sz="quarter" idx="12"/>
-          </p:nvPr>
-        </p:nvSpPr>
-        <p:spPr/>
-        <p:txBody>
-          <a:bodyPr/>
-          <a:lstStyle/>
-          <a:p>
-            <a:fld id="{6923F3CB-4711-4FC8-9867-5888834CD7FE}" type="slidenum">
-              <a:rPr lang="zh-TW" altLang="en-US" smtClean="0"/>
-              <a:t>9</a:t>
-            </a:fld>
-            <a:endParaRPr lang="zh-TW" altLang="en-US"/>
-          </a:p>
-        </p:txBody>
-      </p:sp>
-    </p:spTree>
-    <p:extLst>
-      <p:ext uri="{BB962C8B-B14F-4D97-AF65-F5344CB8AC3E}">
-        <p14:creationId xmlns:p14="http://schemas.microsoft.com/office/powerpoint/2010/main" val="2611549055"/>
       </p:ext>
     </p:extLst>
   </p:cSld>

</xml_diff>

<commit_message>
Support basic text hyperlink, close #4
Support basic text hyperlink
</commit_message>
<xml_diff>
--- a/files/test.pptx
+++ b/files/test.pptx
@@ -5,7 +5,7 @@
     <p:sldMasterId id="2147483660" r:id="rId1"/>
   </p:sldMasterIdLst>
   <p:notesMasterIdLst>
-    <p:notesMasterId r:id="rId20"/>
+    <p:notesMasterId r:id="rId21"/>
   </p:notesMasterIdLst>
   <p:sldIdLst>
     <p:sldId id="256" r:id="rId2"/>
@@ -26,6 +26,7 @@
     <p:sldId id="273" r:id="rId17"/>
     <p:sldId id="268" r:id="rId18"/>
     <p:sldId id="269" r:id="rId19"/>
+    <p:sldId id="274" r:id="rId20"/>
   </p:sldIdLst>
   <p:sldSz cx="9144000" cy="6858000" type="screen4x3"/>
   <p:notesSz cx="6858000" cy="9144000"/>
@@ -133,7 +134,7 @@
 </file>
 
 <file path=ppt/charts/chart1.xml><?xml version="1.0" encoding="utf-8"?>
-<c:chartSpace xmlns:c="http://schemas.openxmlformats.org/drawingml/2006/chart" xmlns:a="http://schemas.openxmlformats.org/drawingml/2006/main" xmlns:r="http://schemas.openxmlformats.org/officeDocument/2006/relationships">
+<c:chartSpace xmlns:c="http://schemas.openxmlformats.org/drawingml/2006/chart" xmlns:a="http://schemas.openxmlformats.org/drawingml/2006/main" xmlns:r="http://schemas.openxmlformats.org/officeDocument/2006/relationships" xmlns:c16r2="http://schemas.microsoft.com/office/drawing/2015/06/chart">
   <c:date1904 val="0"/>
   <c:lang val="zh-TW"/>
   <c:roundedCorners val="0"/>
@@ -260,6 +261,11 @@
             </c:numRef>
           </c:val>
           <c:smooth val="0"/>
+          <c:extLst>
+            <c:ext xmlns:c16="http://schemas.microsoft.com/office/drawing/2014/chart" uri="{C3380CC4-5D6E-409C-BE32-E72D297353CC}">
+              <c16:uniqueId val="{00000000-360D-456F-B485-3CB5385A1568}"/>
+            </c:ext>
+          </c:extLst>
         </c:ser>
         <c:ser>
           <c:idx val="1"/>
@@ -341,6 +347,11 @@
             </c:numRef>
           </c:val>
           <c:smooth val="0"/>
+          <c:extLst>
+            <c:ext xmlns:c16="http://schemas.microsoft.com/office/drawing/2014/chart" uri="{C3380CC4-5D6E-409C-BE32-E72D297353CC}">
+              <c16:uniqueId val="{00000001-360D-456F-B485-3CB5385A1568}"/>
+            </c:ext>
+          </c:extLst>
         </c:ser>
         <c:ser>
           <c:idx val="2"/>
@@ -422,6 +433,11 @@
             </c:numRef>
           </c:val>
           <c:smooth val="0"/>
+          <c:extLst>
+            <c:ext xmlns:c16="http://schemas.microsoft.com/office/drawing/2014/chart" uri="{C3380CC4-5D6E-409C-BE32-E72D297353CC}">
+              <c16:uniqueId val="{00000002-360D-456F-B485-3CB5385A1568}"/>
+            </c:ext>
+          </c:extLst>
         </c:ser>
         <c:dLbls>
           <c:showLegendKey val="0"/>
@@ -606,7 +622,7 @@
 </file>
 
 <file path=ppt/charts/chart2.xml><?xml version="1.0" encoding="utf-8"?>
-<c:chartSpace xmlns:c="http://schemas.openxmlformats.org/drawingml/2006/chart" xmlns:a="http://schemas.openxmlformats.org/drawingml/2006/main" xmlns:r="http://schemas.openxmlformats.org/officeDocument/2006/relationships">
+<c:chartSpace xmlns:c="http://schemas.openxmlformats.org/drawingml/2006/chart" xmlns:a="http://schemas.openxmlformats.org/drawingml/2006/main" xmlns:r="http://schemas.openxmlformats.org/officeDocument/2006/relationships" xmlns:c16r2="http://schemas.microsoft.com/office/drawing/2015/06/chart">
   <c:date1904 val="0"/>
   <c:lang val="zh-TW"/>
   <c:roundedCorners val="0"/>
@@ -719,6 +735,11 @@
               </c:numCache>
             </c:numRef>
           </c:val>
+          <c:extLst>
+            <c:ext xmlns:c16="http://schemas.microsoft.com/office/drawing/2014/chart" uri="{C3380CC4-5D6E-409C-BE32-E72D297353CC}">
+              <c16:uniqueId val="{00000000-19E1-4120-8E70-2163F4B61ABC}"/>
+            </c:ext>
+          </c:extLst>
         </c:ser>
         <c:ser>
           <c:idx val="1"/>
@@ -785,6 +806,11 @@
               </c:numCache>
             </c:numRef>
           </c:val>
+          <c:extLst>
+            <c:ext xmlns:c16="http://schemas.microsoft.com/office/drawing/2014/chart" uri="{C3380CC4-5D6E-409C-BE32-E72D297353CC}">
+              <c16:uniqueId val="{00000001-19E1-4120-8E70-2163F4B61ABC}"/>
+            </c:ext>
+          </c:extLst>
         </c:ser>
         <c:ser>
           <c:idx val="2"/>
@@ -851,6 +877,11 @@
               </c:numCache>
             </c:numRef>
           </c:val>
+          <c:extLst>
+            <c:ext xmlns:c16="http://schemas.microsoft.com/office/drawing/2014/chart" uri="{C3380CC4-5D6E-409C-BE32-E72D297353CC}">
+              <c16:uniqueId val="{00000002-19E1-4120-8E70-2163F4B61ABC}"/>
+            </c:ext>
+          </c:extLst>
         </c:ser>
         <c:dLbls>
           <c:showLegendKey val="0"/>
@@ -1035,7 +1066,7 @@
 </file>
 
 <file path=ppt/charts/chart3.xml><?xml version="1.0" encoding="utf-8"?>
-<c:chartSpace xmlns:c="http://schemas.openxmlformats.org/drawingml/2006/chart" xmlns:a="http://schemas.openxmlformats.org/drawingml/2006/main" xmlns:r="http://schemas.openxmlformats.org/officeDocument/2006/relationships">
+<c:chartSpace xmlns:c="http://schemas.openxmlformats.org/drawingml/2006/chart" xmlns:a="http://schemas.openxmlformats.org/drawingml/2006/main" xmlns:r="http://schemas.openxmlformats.org/officeDocument/2006/relationships" xmlns:c16r2="http://schemas.microsoft.com/office/drawing/2015/06/chart">
   <c:date1904 val="0"/>
   <c:lang val="zh-TW"/>
   <c:roundedCorners val="0"/>
@@ -1148,6 +1179,11 @@
               </c:numCache>
             </c:numRef>
           </c:val>
+          <c:extLst>
+            <c:ext xmlns:c16="http://schemas.microsoft.com/office/drawing/2014/chart" uri="{C3380CC4-5D6E-409C-BE32-E72D297353CC}">
+              <c16:uniqueId val="{00000000-94B1-499E-A542-A3E69BAAA7FA}"/>
+            </c:ext>
+          </c:extLst>
         </c:ser>
         <c:ser>
           <c:idx val="1"/>
@@ -1214,6 +1250,11 @@
               </c:numCache>
             </c:numRef>
           </c:val>
+          <c:extLst>
+            <c:ext xmlns:c16="http://schemas.microsoft.com/office/drawing/2014/chart" uri="{C3380CC4-5D6E-409C-BE32-E72D297353CC}">
+              <c16:uniqueId val="{00000001-94B1-499E-A542-A3E69BAAA7FA}"/>
+            </c:ext>
+          </c:extLst>
         </c:ser>
         <c:ser>
           <c:idx val="2"/>
@@ -1280,6 +1321,11 @@
               </c:numCache>
             </c:numRef>
           </c:val>
+          <c:extLst>
+            <c:ext xmlns:c16="http://schemas.microsoft.com/office/drawing/2014/chart" uri="{C3380CC4-5D6E-409C-BE32-E72D297353CC}">
+              <c16:uniqueId val="{00000002-94B1-499E-A542-A3E69BAAA7FA}"/>
+            </c:ext>
+          </c:extLst>
         </c:ser>
         <c:dLbls>
           <c:showLegendKey val="0"/>
@@ -1464,7 +1510,7 @@
 </file>
 
 <file path=ppt/charts/chart4.xml><?xml version="1.0" encoding="utf-8"?>
-<c:chartSpace xmlns:c="http://schemas.openxmlformats.org/drawingml/2006/chart" xmlns:a="http://schemas.openxmlformats.org/drawingml/2006/main" xmlns:r="http://schemas.openxmlformats.org/officeDocument/2006/relationships">
+<c:chartSpace xmlns:c="http://schemas.openxmlformats.org/drawingml/2006/chart" xmlns:a="http://schemas.openxmlformats.org/drawingml/2006/main" xmlns:r="http://schemas.openxmlformats.org/officeDocument/2006/relationships" xmlns:c16r2="http://schemas.microsoft.com/office/drawing/2015/06/chart">
   <c:date1904 val="0"/>
   <c:lang val="zh-TW"/>
   <c:roundedCorners val="0"/>
@@ -1584,6 +1630,11 @@
               </c:numCache>
             </c:numRef>
           </c:val>
+          <c:extLst>
+            <c:ext xmlns:c16="http://schemas.microsoft.com/office/drawing/2014/chart" uri="{C3380CC4-5D6E-409C-BE32-E72D297353CC}">
+              <c16:uniqueId val="{00000000-1E5F-4179-8772-970DD4381154}"/>
+            </c:ext>
+          </c:extLst>
         </c:ser>
         <c:ser>
           <c:idx val="1"/>
@@ -1655,6 +1706,11 @@
               </c:numCache>
             </c:numRef>
           </c:val>
+          <c:extLst>
+            <c:ext xmlns:c16="http://schemas.microsoft.com/office/drawing/2014/chart" uri="{C3380CC4-5D6E-409C-BE32-E72D297353CC}">
+              <c16:uniqueId val="{00000001-1E5F-4179-8772-970DD4381154}"/>
+            </c:ext>
+          </c:extLst>
         </c:ser>
         <c:dLbls>
           <c:showLegendKey val="0"/>
@@ -1842,7 +1898,7 @@
 </file>
 
 <file path=ppt/charts/chart5.xml><?xml version="1.0" encoding="utf-8"?>
-<c:chartSpace xmlns:c="http://schemas.openxmlformats.org/drawingml/2006/chart" xmlns:a="http://schemas.openxmlformats.org/drawingml/2006/main" xmlns:r="http://schemas.openxmlformats.org/officeDocument/2006/relationships">
+<c:chartSpace xmlns:c="http://schemas.openxmlformats.org/drawingml/2006/chart" xmlns:a="http://schemas.openxmlformats.org/drawingml/2006/main" xmlns:r="http://schemas.openxmlformats.org/officeDocument/2006/relationships" xmlns:c16r2="http://schemas.microsoft.com/office/drawing/2015/06/chart">
   <c:date1904 val="0"/>
   <c:lang val="zh-TW"/>
   <c:roundedCorners val="0"/>
@@ -1962,6 +2018,11 @@
               </c:numCache>
             </c:numRef>
           </c:val>
+          <c:extLst>
+            <c:ext xmlns:c16="http://schemas.microsoft.com/office/drawing/2014/chart" uri="{C3380CC4-5D6E-409C-BE32-E72D297353CC}">
+              <c16:uniqueId val="{00000000-BB60-4AB2-A333-315827508689}"/>
+            </c:ext>
+          </c:extLst>
         </c:ser>
         <c:ser>
           <c:idx val="1"/>
@@ -2033,6 +2094,11 @@
               </c:numCache>
             </c:numRef>
           </c:val>
+          <c:extLst>
+            <c:ext xmlns:c16="http://schemas.microsoft.com/office/drawing/2014/chart" uri="{C3380CC4-5D6E-409C-BE32-E72D297353CC}">
+              <c16:uniqueId val="{00000001-BB60-4AB2-A333-315827508689}"/>
+            </c:ext>
+          </c:extLst>
         </c:ser>
         <c:dLbls>
           <c:showLegendKey val="0"/>
@@ -2220,7 +2286,7 @@
 </file>
 
 <file path=ppt/charts/chart6.xml><?xml version="1.0" encoding="utf-8"?>
-<c:chartSpace xmlns:c="http://schemas.openxmlformats.org/drawingml/2006/chart" xmlns:a="http://schemas.openxmlformats.org/drawingml/2006/main" xmlns:r="http://schemas.openxmlformats.org/officeDocument/2006/relationships">
+<c:chartSpace xmlns:c="http://schemas.openxmlformats.org/drawingml/2006/chart" xmlns:a="http://schemas.openxmlformats.org/drawingml/2006/main" xmlns:r="http://schemas.openxmlformats.org/officeDocument/2006/relationships" xmlns:c16r2="http://schemas.microsoft.com/office/drawing/2015/06/chart">
   <c:date1904 val="0"/>
   <c:lang val="zh-TW"/>
   <c:roundedCorners val="0"/>
@@ -2355,6 +2421,11 @@
             </c:numRef>
           </c:yVal>
           <c:smooth val="0"/>
+          <c:extLst>
+            <c:ext xmlns:c16="http://schemas.microsoft.com/office/drawing/2014/chart" uri="{C3380CC4-5D6E-409C-BE32-E72D297353CC}">
+              <c16:uniqueId val="{00000000-98BD-45B4-82EA-F3A5DAFE63CC}"/>
+            </c:ext>
+          </c:extLst>
         </c:ser>
         <c:dLbls>
           <c:showLegendKey val="0"/>
@@ -2527,7 +2598,7 @@
 </file>
 
 <file path=ppt/charts/chart7.xml><?xml version="1.0" encoding="utf-8"?>
-<c:chartSpace xmlns:c="http://schemas.openxmlformats.org/drawingml/2006/chart" xmlns:a="http://schemas.openxmlformats.org/drawingml/2006/main" xmlns:r="http://schemas.openxmlformats.org/officeDocument/2006/relationships">
+<c:chartSpace xmlns:c="http://schemas.openxmlformats.org/drawingml/2006/chart" xmlns:a="http://schemas.openxmlformats.org/drawingml/2006/main" xmlns:r="http://schemas.openxmlformats.org/officeDocument/2006/relationships" xmlns:c16r2="http://schemas.microsoft.com/office/drawing/2015/06/chart">
   <c:date1904 val="0"/>
   <c:lang val="zh-TW"/>
   <c:roundedCorners val="0"/>
@@ -2601,6 +2672,11 @@
               </a:ln>
               <a:effectLst/>
             </c:spPr>
+            <c:extLst>
+              <c:ext xmlns:c16="http://schemas.microsoft.com/office/drawing/2014/chart" uri="{C3380CC4-5D6E-409C-BE32-E72D297353CC}">
+                <c16:uniqueId val="{00000001-6E8D-4B9C-954D-3A7CECD841D3}"/>
+              </c:ext>
+            </c:extLst>
           </c:dPt>
           <c:dPt>
             <c:idx val="1"/>
@@ -2616,6 +2692,11 @@
               </a:ln>
               <a:effectLst/>
             </c:spPr>
+            <c:extLst>
+              <c:ext xmlns:c16="http://schemas.microsoft.com/office/drawing/2014/chart" uri="{C3380CC4-5D6E-409C-BE32-E72D297353CC}">
+                <c16:uniqueId val="{00000003-6E8D-4B9C-954D-3A7CECD841D3}"/>
+              </c:ext>
+            </c:extLst>
           </c:dPt>
           <c:dPt>
             <c:idx val="2"/>
@@ -2631,6 +2712,11 @@
               </a:ln>
               <a:effectLst/>
             </c:spPr>
+            <c:extLst>
+              <c:ext xmlns:c16="http://schemas.microsoft.com/office/drawing/2014/chart" uri="{C3380CC4-5D6E-409C-BE32-E72D297353CC}">
+                <c16:uniqueId val="{00000005-6E8D-4B9C-954D-3A7CECD841D3}"/>
+              </c:ext>
+            </c:extLst>
           </c:dPt>
           <c:dPt>
             <c:idx val="3"/>
@@ -2646,6 +2732,11 @@
               </a:ln>
               <a:effectLst/>
             </c:spPr>
+            <c:extLst>
+              <c:ext xmlns:c16="http://schemas.microsoft.com/office/drawing/2014/chart" uri="{C3380CC4-5D6E-409C-BE32-E72D297353CC}">
+                <c16:uniqueId val="{00000007-6E8D-4B9C-954D-3A7CECD841D3}"/>
+              </c:ext>
+            </c:extLst>
           </c:dPt>
           <c:dLbls>
             <c:spPr>
@@ -2745,6 +2836,11 @@
               </c:numCache>
             </c:numRef>
           </c:val>
+          <c:extLst>
+            <c:ext xmlns:c16="http://schemas.microsoft.com/office/drawing/2014/chart" uri="{C3380CC4-5D6E-409C-BE32-E72D297353CC}">
+              <c16:uniqueId val="{00000008-6E8D-4B9C-954D-3A7CECD841D3}"/>
+            </c:ext>
+          </c:extLst>
         </c:ser>
         <c:dLbls>
           <c:showLegendKey val="0"/>
@@ -2826,7 +2922,7 @@
 </file>
 
 <file path=ppt/charts/chart8.xml><?xml version="1.0" encoding="utf-8"?>
-<c:chartSpace xmlns:c="http://schemas.openxmlformats.org/drawingml/2006/chart" xmlns:a="http://schemas.openxmlformats.org/drawingml/2006/main" xmlns:r="http://schemas.openxmlformats.org/officeDocument/2006/relationships">
+<c:chartSpace xmlns:c="http://schemas.openxmlformats.org/drawingml/2006/chart" xmlns:a="http://schemas.openxmlformats.org/drawingml/2006/main" xmlns:r="http://schemas.openxmlformats.org/officeDocument/2006/relationships" xmlns:c16r2="http://schemas.microsoft.com/office/drawing/2015/06/chart">
   <c:date1904 val="0"/>
   <c:lang val="zh-TW"/>
   <c:roundedCorners val="0"/>
@@ -2944,6 +3040,11 @@
                 </a:contourClr>
               </a:sp3d>
             </c:spPr>
+            <c:extLst>
+              <c:ext xmlns:c16="http://schemas.microsoft.com/office/drawing/2014/chart" uri="{C3380CC4-5D6E-409C-BE32-E72D297353CC}">
+                <c16:uniqueId val="{00000001-5692-410B-87CF-9B374191BE2B}"/>
+              </c:ext>
+            </c:extLst>
           </c:dPt>
           <c:dPt>
             <c:idx val="1"/>
@@ -2964,6 +3065,11 @@
                 </a:contourClr>
               </a:sp3d>
             </c:spPr>
+            <c:extLst>
+              <c:ext xmlns:c16="http://schemas.microsoft.com/office/drawing/2014/chart" uri="{C3380CC4-5D6E-409C-BE32-E72D297353CC}">
+                <c16:uniqueId val="{00000003-5692-410B-87CF-9B374191BE2B}"/>
+              </c:ext>
+            </c:extLst>
           </c:dPt>
           <c:dPt>
             <c:idx val="2"/>
@@ -2984,6 +3090,11 @@
                 </a:contourClr>
               </a:sp3d>
             </c:spPr>
+            <c:extLst>
+              <c:ext xmlns:c16="http://schemas.microsoft.com/office/drawing/2014/chart" uri="{C3380CC4-5D6E-409C-BE32-E72D297353CC}">
+                <c16:uniqueId val="{00000005-5692-410B-87CF-9B374191BE2B}"/>
+              </c:ext>
+            </c:extLst>
           </c:dPt>
           <c:dPt>
             <c:idx val="3"/>
@@ -3004,6 +3115,11 @@
                 </a:contourClr>
               </a:sp3d>
             </c:spPr>
+            <c:extLst>
+              <c:ext xmlns:c16="http://schemas.microsoft.com/office/drawing/2014/chart" uri="{C3380CC4-5D6E-409C-BE32-E72D297353CC}">
+                <c16:uniqueId val="{00000007-5692-410B-87CF-9B374191BE2B}"/>
+              </c:ext>
+            </c:extLst>
           </c:dPt>
           <c:dLbls>
             <c:spPr>
@@ -3099,6 +3215,11 @@
               </c:numCache>
             </c:numRef>
           </c:val>
+          <c:extLst>
+            <c:ext xmlns:c16="http://schemas.microsoft.com/office/drawing/2014/chart" uri="{C3380CC4-5D6E-409C-BE32-E72D297353CC}">
+              <c16:uniqueId val="{00000008-5692-410B-87CF-9B374191BE2B}"/>
+            </c:ext>
+          </c:extLst>
         </c:ser>
         <c:dLbls>
           <c:showLegendKey val="0"/>
@@ -7687,7 +7808,7 @@
           <a:p>
             <a:fld id="{F80196F6-7584-4650-82DD-1A823E372E93}" type="datetimeFigureOut">
               <a:rPr lang="zh-TW" altLang="en-US" smtClean="0"/>
-              <a:t>2015/12/2</a:t>
+              <a:t>2016/12/3</a:t>
             </a:fld>
             <a:endParaRPr lang="zh-TW" altLang="en-US"/>
           </a:p>
@@ -8170,7 +8291,7 @@
           <a:p>
             <a:fld id="{E7A87A2D-0523-400E-8364-8FCFDAAEE150}" type="datetime1">
               <a:rPr lang="zh-TW" altLang="en-US" smtClean="0"/>
-              <a:t>2015/12/2</a:t>
+              <a:t>2016/12/3</a:t>
             </a:fld>
             <a:endParaRPr lang="zh-TW" altLang="en-US"/>
           </a:p>
@@ -8340,7 +8461,7 @@
           <a:p>
             <a:fld id="{4470E85D-BD6F-4D26-B110-7E28230C593F}" type="datetime1">
               <a:rPr lang="zh-TW" altLang="en-US" smtClean="0"/>
-              <a:t>2015/12/2</a:t>
+              <a:t>2016/12/3</a:t>
             </a:fld>
             <a:endParaRPr lang="zh-TW" altLang="en-US"/>
           </a:p>
@@ -8520,7 +8641,7 @@
           <a:p>
             <a:fld id="{D6E993F5-55DB-4F1A-9A97-9192FB5AEB42}" type="datetime1">
               <a:rPr lang="zh-TW" altLang="en-US" smtClean="0"/>
-              <a:t>2015/12/2</a:t>
+              <a:t>2016/12/3</a:t>
             </a:fld>
             <a:endParaRPr lang="zh-TW" altLang="en-US"/>
           </a:p>
@@ -8690,7 +8811,7 @@
           <a:p>
             <a:fld id="{C60B81E8-7334-464F-8B48-45CA70843E0C}" type="datetime1">
               <a:rPr lang="zh-TW" altLang="en-US" smtClean="0"/>
-              <a:t>2015/12/2</a:t>
+              <a:t>2016/12/3</a:t>
             </a:fld>
             <a:endParaRPr lang="zh-TW" altLang="en-US"/>
           </a:p>
@@ -8934,7 +9055,7 @@
           <a:p>
             <a:fld id="{D47ED321-95FB-497B-BD7E-3BD909DE64AD}" type="datetime1">
               <a:rPr lang="zh-TW" altLang="en-US" smtClean="0"/>
-              <a:t>2015/12/2</a:t>
+              <a:t>2016/12/3</a:t>
             </a:fld>
             <a:endParaRPr lang="zh-TW" altLang="en-US"/>
           </a:p>
@@ -9166,7 +9287,7 @@
           <a:p>
             <a:fld id="{497E4E27-12DC-43A4-A531-93F92B4B5AEB}" type="datetime1">
               <a:rPr lang="zh-TW" altLang="en-US" smtClean="0"/>
-              <a:t>2015/12/2</a:t>
+              <a:t>2016/12/3</a:t>
             </a:fld>
             <a:endParaRPr lang="zh-TW" altLang="en-US"/>
           </a:p>
@@ -9533,7 +9654,7 @@
           <a:p>
             <a:fld id="{C11F5D98-A40D-4F6A-B778-B48D2F7EC464}" type="datetime1">
               <a:rPr lang="zh-TW" altLang="en-US" smtClean="0"/>
-              <a:t>2015/12/2</a:t>
+              <a:t>2016/12/3</a:t>
             </a:fld>
             <a:endParaRPr lang="zh-TW" altLang="en-US"/>
           </a:p>
@@ -9651,7 +9772,7 @@
           <a:p>
             <a:fld id="{37540F8D-04B0-4510-8208-7A8AB7D75261}" type="datetime1">
               <a:rPr lang="zh-TW" altLang="en-US" smtClean="0"/>
-              <a:t>2015/12/2</a:t>
+              <a:t>2016/12/3</a:t>
             </a:fld>
             <a:endParaRPr lang="zh-TW" altLang="en-US"/>
           </a:p>
@@ -9746,7 +9867,7 @@
           <a:p>
             <a:fld id="{ED8E83AE-CBBB-4AB3-9A7C-32D18F7AB593}" type="datetime1">
               <a:rPr lang="zh-TW" altLang="en-US" smtClean="0"/>
-              <a:t>2015/12/2</a:t>
+              <a:t>2016/12/3</a:t>
             </a:fld>
             <a:endParaRPr lang="zh-TW" altLang="en-US"/>
           </a:p>
@@ -10023,7 +10144,7 @@
           <a:p>
             <a:fld id="{CF1BA43A-76D7-43A7-8042-3520281B1840}" type="datetime1">
               <a:rPr lang="zh-TW" altLang="en-US" smtClean="0"/>
-              <a:t>2015/12/2</a:t>
+              <a:t>2016/12/3</a:t>
             </a:fld>
             <a:endParaRPr lang="zh-TW" altLang="en-US"/>
           </a:p>
@@ -10280,7 +10401,7 @@
           <a:p>
             <a:fld id="{BB28C0ED-AAF8-4DB2-AF56-EE0DC21174BB}" type="datetime1">
               <a:rPr lang="zh-TW" altLang="en-US" smtClean="0"/>
-              <a:t>2015/12/2</a:t>
+              <a:t>2016/12/3</a:t>
             </a:fld>
             <a:endParaRPr lang="zh-TW" altLang="en-US"/>
           </a:p>
@@ -10493,7 +10614,7 @@
           <a:p>
             <a:fld id="{991B9CC3-7329-43C8-BC56-DBF8F15634F0}" type="datetime1">
               <a:rPr lang="zh-TW" altLang="en-US" smtClean="0"/>
-              <a:t>2015/12/2</a:t>
+              <a:t>2016/12/3</a:t>
             </a:fld>
             <a:endParaRPr lang="zh-TW" altLang="en-US"/>
           </a:p>
@@ -10962,7 +11083,7 @@
           <a:p>
             <a:fld id="{E49FC7B0-3E75-4441-B63F-4CC3A5531728}" type="datetime1">
               <a:rPr lang="zh-TW" altLang="en-US" smtClean="0"/>
-              <a:t>2015/12/2</a:t>
+              <a:t>2016/12/3</a:t>
             </a:fld>
             <a:endParaRPr lang="zh-TW" altLang="en-US"/>
           </a:p>
@@ -11001,6 +11122,13 @@
   <p:clrMapOvr>
     <a:masterClrMapping/>
   </p:clrMapOvr>
+  <p:timing>
+    <p:tnLst>
+      <p:par>
+        <p:cTn id="1" dur="indefinite" restart="never" nodeType="tmRoot"/>
+      </p:par>
+    </p:tnLst>
+  </p:timing>
 </p:sld>
 </file>
 
@@ -11217,7 +11345,7 @@
           <a:p>
             <a:fld id="{C60B81E8-7334-464F-8B48-45CA70843E0C}" type="datetime1">
               <a:rPr lang="zh-TW" altLang="en-US" smtClean="0"/>
-              <a:t>2015/12/2</a:t>
+              <a:t>2016/12/3</a:t>
             </a:fld>
             <a:endParaRPr lang="zh-TW" altLang="en-US"/>
           </a:p>
@@ -11256,6 +11384,13 @@
   <p:clrMapOvr>
     <a:masterClrMapping/>
   </p:clrMapOvr>
+  <p:timing>
+    <p:tnLst>
+      <p:par>
+        <p:cTn id="1" dur="indefinite" restart="never" nodeType="tmRoot"/>
+      </p:par>
+    </p:tnLst>
+  </p:timing>
 </p:sld>
 </file>
 
@@ -11350,7 +11485,7 @@
           <a:p>
             <a:fld id="{C11F5D98-A40D-4F6A-B778-B48D2F7EC464}" type="datetime1">
               <a:rPr lang="zh-TW" altLang="en-US" smtClean="0"/>
-              <a:t>2015/12/2</a:t>
+              <a:t>2016/12/3</a:t>
             </a:fld>
             <a:endParaRPr lang="zh-TW" altLang="en-US"/>
           </a:p>
@@ -11389,6 +11524,13 @@
   <p:clrMapOvr>
     <a:masterClrMapping/>
   </p:clrMapOvr>
+  <p:timing>
+    <p:tnLst>
+      <p:par>
+        <p:cTn id="1" dur="indefinite" restart="never" nodeType="tmRoot"/>
+      </p:par>
+    </p:tnLst>
+  </p:timing>
 </p:sld>
 </file>
 
@@ -11483,7 +11625,7 @@
           <a:p>
             <a:fld id="{C60B81E8-7334-464F-8B48-45CA70843E0C}" type="datetime1">
               <a:rPr lang="zh-TW" altLang="en-US" smtClean="0"/>
-              <a:t>2015/12/2</a:t>
+              <a:t>2016/12/3</a:t>
             </a:fld>
             <a:endParaRPr lang="zh-TW" altLang="en-US"/>
           </a:p>
@@ -11522,6 +11664,13 @@
   <p:clrMapOvr>
     <a:masterClrMapping/>
   </p:clrMapOvr>
+  <p:timing>
+    <p:tnLst>
+      <p:par>
+        <p:cTn id="1" dur="indefinite" restart="never" nodeType="tmRoot"/>
+      </p:par>
+    </p:tnLst>
+  </p:timing>
 </p:sld>
 </file>
 
@@ -11616,7 +11765,7 @@
           <a:p>
             <a:fld id="{C60B81E8-7334-464F-8B48-45CA70843E0C}" type="datetime1">
               <a:rPr lang="zh-TW" altLang="en-US" smtClean="0"/>
-              <a:t>2015/12/2</a:t>
+              <a:t>2016/12/3</a:t>
             </a:fld>
             <a:endParaRPr lang="zh-TW" altLang="en-US"/>
           </a:p>
@@ -11655,6 +11804,13 @@
   <p:clrMapOvr>
     <a:masterClrMapping/>
   </p:clrMapOvr>
+  <p:timing>
+    <p:tnLst>
+      <p:par>
+        <p:cTn id="1" dur="indefinite" restart="never" nodeType="tmRoot"/>
+      </p:par>
+    </p:tnLst>
+  </p:timing>
 </p:sld>
 </file>
 
@@ -11758,7 +11914,7 @@
           <a:p>
             <a:fld id="{C60B81E8-7334-464F-8B48-45CA70843E0C}" type="datetime1">
               <a:rPr lang="zh-TW" altLang="en-US" smtClean="0"/>
-              <a:t>2015/12/2</a:t>
+              <a:t>2016/12/3</a:t>
             </a:fld>
             <a:endParaRPr lang="zh-TW" altLang="en-US"/>
           </a:p>
@@ -11797,6 +11953,13 @@
   <p:clrMapOvr>
     <a:masterClrMapping/>
   </p:clrMapOvr>
+  <p:timing>
+    <p:tnLst>
+      <p:par>
+        <p:cTn id="1" dur="indefinite" restart="never" nodeType="tmRoot"/>
+      </p:par>
+    </p:tnLst>
+  </p:timing>
 </p:sld>
 </file>
 
@@ -11900,7 +12063,7 @@
           <a:p>
             <a:fld id="{C60B81E8-7334-464F-8B48-45CA70843E0C}" type="datetime1">
               <a:rPr lang="zh-TW" altLang="en-US" smtClean="0"/>
-              <a:t>2015/12/2</a:t>
+              <a:t>2016/12/3</a:t>
             </a:fld>
             <a:endParaRPr lang="zh-TW" altLang="en-US"/>
           </a:p>
@@ -11939,6 +12102,13 @@
   <p:clrMapOvr>
     <a:masterClrMapping/>
   </p:clrMapOvr>
+  <p:timing>
+    <p:tnLst>
+      <p:par>
+        <p:cTn id="1" dur="indefinite" restart="never" nodeType="tmRoot"/>
+      </p:par>
+    </p:tnLst>
+  </p:timing>
 </p:sld>
 </file>
 
@@ -12033,7 +12203,7 @@
           <a:p>
             <a:fld id="{C60B81E8-7334-464F-8B48-45CA70843E0C}" type="datetime1">
               <a:rPr lang="zh-TW" altLang="en-US" smtClean="0"/>
-              <a:t>2015/12/2</a:t>
+              <a:t>2016/12/3</a:t>
             </a:fld>
             <a:endParaRPr lang="zh-TW" altLang="en-US"/>
           </a:p>
@@ -12072,6 +12242,13 @@
   <p:clrMapOvr>
     <a:masterClrMapping/>
   </p:clrMapOvr>
+  <p:timing>
+    <p:tnLst>
+      <p:par>
+        <p:cTn id="1" dur="indefinite" restart="never" nodeType="tmRoot"/>
+      </p:par>
+    </p:tnLst>
+  </p:timing>
 </p:sld>
 </file>
 
@@ -12166,7 +12343,7 @@
           <a:p>
             <a:fld id="{C60B81E8-7334-464F-8B48-45CA70843E0C}" type="datetime1">
               <a:rPr lang="zh-TW" altLang="en-US" smtClean="0"/>
-              <a:t>2015/12/2</a:t>
+              <a:t>2016/12/3</a:t>
             </a:fld>
             <a:endParaRPr lang="zh-TW" altLang="en-US"/>
           </a:p>
@@ -12205,6 +12382,13 @@
   <p:clrMapOvr>
     <a:masterClrMapping/>
   </p:clrMapOvr>
+  <p:timing>
+    <p:tnLst>
+      <p:par>
+        <p:cTn id="1" dur="indefinite" restart="never" nodeType="tmRoot"/>
+      </p:par>
+    </p:tnLst>
+  </p:timing>
 </p:sld>
 </file>
 
@@ -12299,7 +12483,7 @@
           <a:p>
             <a:fld id="{C60B81E8-7334-464F-8B48-45CA70843E0C}" type="datetime1">
               <a:rPr lang="zh-TW" altLang="en-US" smtClean="0"/>
-              <a:t>2015/12/2</a:t>
+              <a:t>2016/12/3</a:t>
             </a:fld>
             <a:endParaRPr lang="zh-TW" altLang="en-US"/>
           </a:p>
@@ -12338,6 +12522,310 @@
   <p:clrMapOvr>
     <a:masterClrMapping/>
   </p:clrMapOvr>
+  <p:timing>
+    <p:tnLst>
+      <p:par>
+        <p:cTn id="1" dur="indefinite" restart="never" nodeType="tmRoot"/>
+      </p:par>
+    </p:tnLst>
+  </p:timing>
+</p:sld>
+</file>
+
+<file path=ppt/slides/slide19.xml><?xml version="1.0" encoding="utf-8"?>
+<p:sld xmlns:a="http://schemas.openxmlformats.org/drawingml/2006/main" xmlns:r="http://schemas.openxmlformats.org/officeDocument/2006/relationships" xmlns:p="http://schemas.openxmlformats.org/presentationml/2006/main">
+  <p:cSld>
+    <p:spTree>
+      <p:nvGrpSpPr>
+        <p:cNvPr id="1" name=""/>
+        <p:cNvGrpSpPr/>
+        <p:nvPr/>
+      </p:nvGrpSpPr>
+      <p:grpSpPr>
+        <a:xfrm>
+          <a:off x="0" y="0"/>
+          <a:ext cx="0" cy="0"/>
+          <a:chOff x="0" y="0"/>
+          <a:chExt cx="0" cy="0"/>
+        </a:xfrm>
+      </p:grpSpPr>
+      <p:sp>
+        <p:nvSpPr>
+          <p:cNvPr id="2" name="標題 1"/>
+          <p:cNvSpPr>
+            <a:spLocks noGrp="1"/>
+          </p:cNvSpPr>
+          <p:nvPr>
+            <p:ph type="title"/>
+          </p:nvPr>
+        </p:nvSpPr>
+        <p:spPr/>
+        <p:txBody>
+          <a:bodyPr/>
+          <a:lstStyle/>
+          <a:p>
+            <a:pPr algn="ctr"/>
+            <a:r>
+              <a:rPr lang="en-US" altLang="zh-TW" dirty="0" smtClean="0"/>
+              <a:t>Text Hyperlink Test</a:t>
+            </a:r>
+            <a:endParaRPr lang="zh-TW" altLang="en-US" dirty="0"/>
+          </a:p>
+        </p:txBody>
+      </p:sp>
+      <p:sp>
+        <p:nvSpPr>
+          <p:cNvPr id="3" name="內容版面配置區 2"/>
+          <p:cNvSpPr>
+            <a:spLocks noGrp="1"/>
+          </p:cNvSpPr>
+          <p:nvPr>
+            <p:ph idx="1"/>
+          </p:nvPr>
+        </p:nvSpPr>
+        <p:spPr/>
+        <p:txBody>
+          <a:bodyPr/>
+          <a:lstStyle/>
+          <a:p>
+            <a:r>
+              <a:rPr lang="en-US" altLang="zh-TW" dirty="0">
+                <a:hlinkClick r:id="rId2"/>
+              </a:rPr>
+              <a:t>http://g21589.github.io/PPTX2HTML</a:t>
+            </a:r>
+            <a:r>
+              <a:rPr lang="en-US" altLang="zh-TW" dirty="0" smtClean="0">
+                <a:hlinkClick r:id="rId2"/>
+              </a:rPr>
+              <a:t>/</a:t>
+            </a:r>
+            <a:endParaRPr lang="en-US" altLang="zh-TW" dirty="0" smtClean="0"/>
+          </a:p>
+          <a:p>
+            <a:r>
+              <a:rPr lang="en-US" altLang="zh-TW" dirty="0" smtClean="0">
+                <a:hlinkClick r:id="rId3"/>
+              </a:rPr>
+              <a:t>Email</a:t>
+            </a:r>
+            <a:endParaRPr lang="en-US" altLang="zh-TW" dirty="0" smtClean="0"/>
+          </a:p>
+          <a:p>
+            <a:endParaRPr lang="en-US" altLang="zh-TW" dirty="0"/>
+          </a:p>
+          <a:p>
+            <a:r>
+              <a:rPr lang="en-US" altLang="zh-TW" smtClean="0">
+                <a:hlinkClick r:id="rId4" action="ppaction://hlinksldjump"/>
+              </a:rPr>
+              <a:t>Inner Slide</a:t>
+            </a:r>
+            <a:r>
+              <a:rPr lang="en-US" altLang="zh-TW" smtClean="0"/>
+              <a:t> </a:t>
+            </a:r>
+            <a:r>
+              <a:rPr lang="en-US" altLang="zh-TW" dirty="0" smtClean="0"/>
+              <a:t>(unsupported)</a:t>
+            </a:r>
+          </a:p>
+          <a:p>
+            <a:r>
+              <a:rPr lang="en-US" altLang="zh-TW" dirty="0" smtClean="0">
+                <a:hlinkClick r:id="rId5" action="ppaction://hlinkpres?slideindex=1&amp;slidetitle="/>
+              </a:rPr>
+              <a:t>File</a:t>
+            </a:r>
+            <a:r>
+              <a:rPr lang="en-US" altLang="zh-TW" dirty="0" smtClean="0"/>
+              <a:t> (</a:t>
+            </a:r>
+            <a:r>
+              <a:rPr lang="en-US" altLang="zh-TW" dirty="0"/>
+              <a:t>unsupported</a:t>
+            </a:r>
+            <a:r>
+              <a:rPr lang="en-US" altLang="zh-TW" dirty="0" smtClean="0"/>
+              <a:t>)</a:t>
+            </a:r>
+            <a:endParaRPr lang="zh-TW" altLang="en-US" dirty="0"/>
+          </a:p>
+        </p:txBody>
+      </p:sp>
+      <p:sp>
+        <p:nvSpPr>
+          <p:cNvPr id="4" name="日期版面配置區 3"/>
+          <p:cNvSpPr>
+            <a:spLocks noGrp="1"/>
+          </p:cNvSpPr>
+          <p:nvPr>
+            <p:ph type="dt" sz="half" idx="10"/>
+          </p:nvPr>
+        </p:nvSpPr>
+        <p:spPr/>
+        <p:txBody>
+          <a:bodyPr/>
+          <a:lstStyle/>
+          <a:p>
+            <a:fld id="{C60B81E8-7334-464F-8B48-45CA70843E0C}" type="datetime1">
+              <a:rPr lang="zh-TW" altLang="en-US" smtClean="0"/>
+              <a:t>2016/12/3</a:t>
+            </a:fld>
+            <a:endParaRPr lang="zh-TW" altLang="en-US"/>
+          </a:p>
+        </p:txBody>
+      </p:sp>
+      <p:sp>
+        <p:nvSpPr>
+          <p:cNvPr id="5" name="投影片編號版面配置區 4"/>
+          <p:cNvSpPr>
+            <a:spLocks noGrp="1"/>
+          </p:cNvSpPr>
+          <p:nvPr>
+            <p:ph type="sldNum" sz="quarter" idx="12"/>
+          </p:nvPr>
+        </p:nvSpPr>
+        <p:spPr/>
+        <p:txBody>
+          <a:bodyPr/>
+          <a:lstStyle/>
+          <a:p>
+            <a:fld id="{6923F3CB-4711-4FC8-9867-5888834CD7FE}" type="slidenum">
+              <a:rPr lang="zh-TW" altLang="en-US" smtClean="0"/>
+              <a:t>19</a:t>
+            </a:fld>
+            <a:endParaRPr lang="zh-TW" altLang="en-US"/>
+          </a:p>
+        </p:txBody>
+      </p:sp>
+      <p:graphicFrame>
+        <p:nvGraphicFramePr>
+          <p:cNvPr id="6" name="表格 5"/>
+          <p:cNvGraphicFramePr>
+            <a:graphicFrameLocks noGrp="1"/>
+          </p:cNvGraphicFramePr>
+          <p:nvPr>
+            <p:extLst>
+              <p:ext uri="{D42A27DB-BD31-4B8C-83A1-F6EECF244321}">
+                <p14:modId xmlns:p14="http://schemas.microsoft.com/office/powerpoint/2010/main" val="3284163577"/>
+              </p:ext>
+            </p:extLst>
+          </p:nvPr>
+        </p:nvGraphicFramePr>
+        <p:xfrm>
+          <a:off x="4008412" y="4450753"/>
+          <a:ext cx="3930162" cy="1010920"/>
+        </p:xfrm>
+        <a:graphic>
+          <a:graphicData uri="http://schemas.openxmlformats.org/drawingml/2006/table">
+            <a:tbl>
+              <a:tblPr firstRow="1" bandRow="1">
+                <a:tableStyleId>{5940675A-B579-460E-94D1-54222C63F5DA}</a:tableStyleId>
+              </a:tblPr>
+              <a:tblGrid>
+                <a:gridCol w="2631539">
+                  <a:extLst>
+                    <a:ext uri="{9D8B030D-6E8A-4147-A177-3AD203B41FA5}">
+                      <a16:colId xmlns:a16="http://schemas.microsoft.com/office/drawing/2014/main" val="1361311480"/>
+                    </a:ext>
+                  </a:extLst>
+                </a:gridCol>
+                <a:gridCol w="1298623">
+                  <a:extLst>
+                    <a:ext uri="{9D8B030D-6E8A-4147-A177-3AD203B41FA5}">
+                      <a16:colId xmlns:a16="http://schemas.microsoft.com/office/drawing/2014/main" val="2631929079"/>
+                    </a:ext>
+                  </a:extLst>
+                </a:gridCol>
+              </a:tblGrid>
+              <a:tr h="370840">
+                <a:tc>
+                  <a:txBody>
+                    <a:bodyPr/>
+                    <a:lstStyle/>
+                    <a:p>
+                      <a:r>
+                        <a:rPr lang="en-US" altLang="zh-TW" dirty="0" smtClean="0">
+                          <a:hlinkClick r:id="rId2"/>
+                        </a:rPr>
+                        <a:t>http://g21589.github.io/PPTX2HTML/</a:t>
+                      </a:r>
+                      <a:endParaRPr lang="zh-TW" altLang="en-US" dirty="0"/>
+                    </a:p>
+                  </a:txBody>
+                  <a:tcPr/>
+                </a:tc>
+                <a:tc>
+                  <a:txBody>
+                    <a:bodyPr/>
+                    <a:lstStyle/>
+                    <a:p>
+                      <a:endParaRPr lang="zh-TW" altLang="en-US"/>
+                    </a:p>
+                  </a:txBody>
+                  <a:tcPr/>
+                </a:tc>
+                <a:extLst>
+                  <a:ext uri="{0D108BD9-81ED-4DB2-BD59-A6C34878D82A}">
+                    <a16:rowId xmlns:a16="http://schemas.microsoft.com/office/drawing/2014/main" val="984733166"/>
+                  </a:ext>
+                </a:extLst>
+              </a:tr>
+              <a:tr h="370840">
+                <a:tc>
+                  <a:txBody>
+                    <a:bodyPr/>
+                    <a:lstStyle/>
+                    <a:p>
+                      <a:endParaRPr lang="zh-TW" altLang="en-US"/>
+                    </a:p>
+                  </a:txBody>
+                  <a:tcPr/>
+                </a:tc>
+                <a:tc>
+                  <a:txBody>
+                    <a:bodyPr/>
+                    <a:lstStyle/>
+                    <a:p>
+                      <a:r>
+                        <a:rPr lang="en-US" altLang="zh-TW" dirty="0" smtClean="0">
+                          <a:hlinkClick r:id="rId3"/>
+                        </a:rPr>
+                        <a:t>Email</a:t>
+                      </a:r>
+                      <a:endParaRPr lang="zh-TW" altLang="en-US" dirty="0"/>
+                    </a:p>
+                  </a:txBody>
+                  <a:tcPr/>
+                </a:tc>
+                <a:extLst>
+                  <a:ext uri="{0D108BD9-81ED-4DB2-BD59-A6C34878D82A}">
+                    <a16:rowId xmlns:a16="http://schemas.microsoft.com/office/drawing/2014/main" val="1467389557"/>
+                  </a:ext>
+                </a:extLst>
+              </a:tr>
+            </a:tbl>
+          </a:graphicData>
+        </a:graphic>
+      </p:graphicFrame>
+    </p:spTree>
+    <p:extLst>
+      <p:ext uri="{BB962C8B-B14F-4D97-AF65-F5344CB8AC3E}">
+        <p14:creationId xmlns:p14="http://schemas.microsoft.com/office/powerpoint/2010/main" val="1324228888"/>
+      </p:ext>
+    </p:extLst>
+  </p:cSld>
+  <p:clrMapOvr>
+    <a:masterClrMapping/>
+  </p:clrMapOvr>
+  <p:timing>
+    <p:tnLst>
+      <p:par>
+        <p:cTn id="1" dur="indefinite" restart="never" nodeType="tmRoot"/>
+      </p:par>
+    </p:tnLst>
+  </p:timing>
 </p:sld>
 </file>
 
@@ -12433,7 +12921,7 @@
           <a:p>
             <a:fld id="{7D259E43-2377-4BD5-9EF1-8A04A4F66F0C}" type="datetime1">
               <a:rPr lang="zh-TW" altLang="en-US" smtClean="0"/>
-              <a:t>2015/12/2</a:t>
+              <a:t>2016/12/3</a:t>
             </a:fld>
             <a:endParaRPr lang="zh-TW" altLang="en-US"/>
           </a:p>
@@ -12472,6 +12960,13 @@
   <p:clrMapOvr>
     <a:masterClrMapping/>
   </p:clrMapOvr>
+  <p:timing>
+    <p:tnLst>
+      <p:par>
+        <p:cTn id="1" dur="indefinite" restart="never" nodeType="tmRoot"/>
+      </p:par>
+    </p:tnLst>
+  </p:timing>
 </p:sld>
 </file>
 
@@ -12559,7 +13054,7 @@
           <a:p>
             <a:fld id="{C60B81E8-7334-464F-8B48-45CA70843E0C}" type="datetime1">
               <a:rPr lang="zh-TW" altLang="en-US" smtClean="0"/>
-              <a:t>2015/12/2</a:t>
+              <a:t>2016/12/3</a:t>
             </a:fld>
             <a:endParaRPr lang="zh-TW" altLang="en-US"/>
           </a:p>
@@ -12598,6 +13093,13 @@
   <p:clrMapOvr>
     <a:masterClrMapping/>
   </p:clrMapOvr>
+  <p:timing>
+    <p:tnLst>
+      <p:par>
+        <p:cTn id="1" dur="indefinite" restart="never" nodeType="tmRoot"/>
+      </p:par>
+    </p:tnLst>
+  </p:timing>
 </p:sld>
 </file>
 
@@ -12694,7 +13196,7 @@
           <a:p>
             <a:fld id="{3E86548D-D54C-4064-8B18-89FB2D942122}" type="datetime1">
               <a:rPr lang="zh-TW" altLang="en-US" smtClean="0"/>
-              <a:t>2015/12/2</a:t>
+              <a:t>2016/12/3</a:t>
             </a:fld>
             <a:endParaRPr lang="zh-TW" altLang="en-US"/>
           </a:p>
@@ -12733,6 +13235,13 @@
   <p:clrMapOvr>
     <a:masterClrMapping/>
   </p:clrMapOvr>
+  <p:timing>
+    <p:tnLst>
+      <p:par>
+        <p:cTn id="1" dur="indefinite" restart="never" nodeType="tmRoot"/>
+      </p:par>
+    </p:tnLst>
+  </p:timing>
 </p:sld>
 </file>
 
@@ -12829,7 +13338,7 @@
           <a:p>
             <a:fld id="{3E86548D-D54C-4064-8B18-89FB2D942122}" type="datetime1">
               <a:rPr lang="zh-TW" altLang="en-US" smtClean="0"/>
-              <a:t>2015/12/2</a:t>
+              <a:t>2016/12/3</a:t>
             </a:fld>
             <a:endParaRPr lang="zh-TW" altLang="en-US"/>
           </a:p>
@@ -12898,6 +13407,13 @@
   <p:clrMapOvr>
     <a:masterClrMapping/>
   </p:clrMapOvr>
+  <p:timing>
+    <p:tnLst>
+      <p:par>
+        <p:cTn id="1" dur="indefinite" restart="never" nodeType="tmRoot"/>
+      </p:par>
+    </p:tnLst>
+  </p:timing>
 </p:sld>
 </file>
 
@@ -13338,7 +13854,7 @@
           <a:p>
             <a:fld id="{94FA48B1-D508-49FA-BBA0-5047EEF68D44}" type="datetime1">
               <a:rPr lang="zh-TW" altLang="en-US" smtClean="0"/>
-              <a:t>2015/12/2</a:t>
+              <a:t>2016/12/3</a:t>
             </a:fld>
             <a:endParaRPr lang="zh-TW" altLang="en-US"/>
           </a:p>
@@ -13377,6 +13893,13 @@
   <p:clrMapOvr>
     <a:masterClrMapping/>
   </p:clrMapOvr>
+  <p:timing>
+    <p:tnLst>
+      <p:par>
+        <p:cTn id="1" dur="indefinite" restart="never" nodeType="tmRoot"/>
+      </p:par>
+    </p:tnLst>
+  </p:timing>
 </p:sld>
 </file>
 
@@ -13574,7 +14097,7 @@
           <a:p>
             <a:fld id="{E0EFF268-3616-48FD-9778-BBA6A4676333}" type="datetime1">
               <a:rPr lang="zh-TW" altLang="en-US" smtClean="0"/>
-              <a:t>2015/12/2</a:t>
+              <a:t>2016/12/3</a:t>
             </a:fld>
             <a:endParaRPr lang="zh-TW" altLang="en-US"/>
           </a:p>
@@ -14688,6 +15211,13 @@
   <p:clrMapOvr>
     <a:masterClrMapping/>
   </p:clrMapOvr>
+  <p:timing>
+    <p:tnLst>
+      <p:par>
+        <p:cTn id="1" dur="indefinite" restart="never" nodeType="tmRoot"/>
+      </p:par>
+    </p:tnLst>
+  </p:timing>
 </p:sld>
 </file>
 
@@ -14771,10 +15301,34 @@
                 <a:tableStyleId>{5C22544A-7EE6-4342-B048-85BDC9FD1C3A}</a:tableStyleId>
               </a:tblPr>
               <a:tblGrid>
-                <a:gridCol w="1971675"/>
-                <a:gridCol w="1971675"/>
-                <a:gridCol w="1971675"/>
-                <a:gridCol w="1971675"/>
+                <a:gridCol w="1971675">
+                  <a:extLst>
+                    <a:ext uri="{9D8B030D-6E8A-4147-A177-3AD203B41FA5}">
+                      <a16:colId xmlns:a16="http://schemas.microsoft.com/office/drawing/2014/main" val="20000"/>
+                    </a:ext>
+                  </a:extLst>
+                </a:gridCol>
+                <a:gridCol w="1971675">
+                  <a:extLst>
+                    <a:ext uri="{9D8B030D-6E8A-4147-A177-3AD203B41FA5}">
+                      <a16:colId xmlns:a16="http://schemas.microsoft.com/office/drawing/2014/main" val="20001"/>
+                    </a:ext>
+                  </a:extLst>
+                </a:gridCol>
+                <a:gridCol w="1971675">
+                  <a:extLst>
+                    <a:ext uri="{9D8B030D-6E8A-4147-A177-3AD203B41FA5}">
+                      <a16:colId xmlns:a16="http://schemas.microsoft.com/office/drawing/2014/main" val="20002"/>
+                    </a:ext>
+                  </a:extLst>
+                </a:gridCol>
+                <a:gridCol w="1971675">
+                  <a:extLst>
+                    <a:ext uri="{9D8B030D-6E8A-4147-A177-3AD203B41FA5}">
+                      <a16:colId xmlns:a16="http://schemas.microsoft.com/office/drawing/2014/main" val="20003"/>
+                    </a:ext>
+                  </a:extLst>
+                </a:gridCol>
               </a:tblGrid>
               <a:tr h="370840">
                 <a:tc>
@@ -14837,6 +15391,11 @@
                   </a:txBody>
                   <a:tcPr/>
                 </a:tc>
+                <a:extLst>
+                  <a:ext uri="{0D108BD9-81ED-4DB2-BD59-A6C34878D82A}">
+                    <a16:rowId xmlns:a16="http://schemas.microsoft.com/office/drawing/2014/main" val="10000"/>
+                  </a:ext>
+                </a:extLst>
               </a:tr>
               <a:tr h="370840">
                 <a:tc>
@@ -14904,6 +15463,11 @@
                   </a:txBody>
                   <a:tcPr/>
                 </a:tc>
+                <a:extLst>
+                  <a:ext uri="{0D108BD9-81ED-4DB2-BD59-A6C34878D82A}">
+                    <a16:rowId xmlns:a16="http://schemas.microsoft.com/office/drawing/2014/main" val="10001"/>
+                  </a:ext>
+                </a:extLst>
               </a:tr>
               <a:tr h="370840">
                 <a:tc>
@@ -14971,6 +15535,11 @@
                   </a:txBody>
                   <a:tcPr/>
                 </a:tc>
+                <a:extLst>
+                  <a:ext uri="{0D108BD9-81ED-4DB2-BD59-A6C34878D82A}">
+                    <a16:rowId xmlns:a16="http://schemas.microsoft.com/office/drawing/2014/main" val="10002"/>
+                  </a:ext>
+                </a:extLst>
               </a:tr>
             </a:tbl>
           </a:graphicData>
@@ -14993,7 +15562,7 @@
           <a:p>
             <a:fld id="{5A0B17C9-1A35-4216-82FA-299D192A2D4E}" type="datetime1">
               <a:rPr lang="zh-TW" altLang="en-US" smtClean="0"/>
-              <a:t>2015/12/2</a:t>
+              <a:t>2016/12/3</a:t>
             </a:fld>
             <a:endParaRPr lang="zh-TW" altLang="en-US"/>
           </a:p>
@@ -15047,10 +15616,34 @@
                 <a:tableStyleId>{5C22544A-7EE6-4342-B048-85BDC9FD1C3A}</a:tableStyleId>
               </a:tblPr>
               <a:tblGrid>
-                <a:gridCol w="760925"/>
-                <a:gridCol w="760925"/>
-                <a:gridCol w="760925"/>
-                <a:gridCol w="760925"/>
+                <a:gridCol w="760925">
+                  <a:extLst>
+                    <a:ext uri="{9D8B030D-6E8A-4147-A177-3AD203B41FA5}">
+                      <a16:colId xmlns:a16="http://schemas.microsoft.com/office/drawing/2014/main" val="20000"/>
+                    </a:ext>
+                  </a:extLst>
+                </a:gridCol>
+                <a:gridCol w="760925">
+                  <a:extLst>
+                    <a:ext uri="{9D8B030D-6E8A-4147-A177-3AD203B41FA5}">
+                      <a16:colId xmlns:a16="http://schemas.microsoft.com/office/drawing/2014/main" val="20001"/>
+                    </a:ext>
+                  </a:extLst>
+                </a:gridCol>
+                <a:gridCol w="760925">
+                  <a:extLst>
+                    <a:ext uri="{9D8B030D-6E8A-4147-A177-3AD203B41FA5}">
+                      <a16:colId xmlns:a16="http://schemas.microsoft.com/office/drawing/2014/main" val="20002"/>
+                    </a:ext>
+                  </a:extLst>
+                </a:gridCol>
+                <a:gridCol w="760925">
+                  <a:extLst>
+                    <a:ext uri="{9D8B030D-6E8A-4147-A177-3AD203B41FA5}">
+                      <a16:colId xmlns:a16="http://schemas.microsoft.com/office/drawing/2014/main" val="20003"/>
+                    </a:ext>
+                  </a:extLst>
+                </a:gridCol>
               </a:tblGrid>
               <a:tr h="506507">
                 <a:tc>
@@ -15198,6 +15791,11 @@
                   </a:txBody>
                   <a:tcPr/>
                 </a:tc>
+                <a:extLst>
+                  <a:ext uri="{0D108BD9-81ED-4DB2-BD59-A6C34878D82A}">
+                    <a16:rowId xmlns:a16="http://schemas.microsoft.com/office/drawing/2014/main" val="10000"/>
+                  </a:ext>
+                </a:extLst>
               </a:tr>
               <a:tr h="506507">
                 <a:tc rowSpan="2">
@@ -15444,6 +16042,11 @@
                     <a:noFill/>
                   </a:tcPr>
                 </a:tc>
+                <a:extLst>
+                  <a:ext uri="{0D108BD9-81ED-4DB2-BD59-A6C34878D82A}">
+                    <a16:rowId xmlns:a16="http://schemas.microsoft.com/office/drawing/2014/main" val="10001"/>
+                  </a:ext>
+                </a:extLst>
               </a:tr>
               <a:tr h="506507">
                 <a:tc vMerge="1">
@@ -15639,6 +16242,11 @@
                     <a:noFill/>
                   </a:tcPr>
                 </a:tc>
+                <a:extLst>
+                  <a:ext uri="{0D108BD9-81ED-4DB2-BD59-A6C34878D82A}">
+                    <a16:rowId xmlns:a16="http://schemas.microsoft.com/office/drawing/2014/main" val="10002"/>
+                  </a:ext>
+                </a:extLst>
               </a:tr>
             </a:tbl>
           </a:graphicData>
@@ -15654,6 +16262,13 @@
   <p:clrMapOvr>
     <a:masterClrMapping/>
   </p:clrMapOvr>
+  <p:timing>
+    <p:tnLst>
+      <p:par>
+        <p:cTn id="1" dur="indefinite" restart="never" nodeType="tmRoot"/>
+      </p:par>
+    </p:tnLst>
+  </p:timing>
 </p:sld>
 </file>
 
@@ -15714,7 +16329,7 @@
           <a:p>
             <a:fld id="{C60B81E8-7334-464F-8B48-45CA70843E0C}" type="datetime1">
               <a:rPr lang="zh-TW" altLang="en-US" smtClean="0"/>
-              <a:t>2015/12/2</a:t>
+              <a:t>2016/12/3</a:t>
             </a:fld>
             <a:endParaRPr lang="zh-TW" altLang="en-US"/>
           </a:p>
@@ -16454,6 +17069,13 @@
   <p:clrMapOvr>
     <a:masterClrMapping/>
   </p:clrMapOvr>
+  <p:timing>
+    <p:tnLst>
+      <p:par>
+        <p:cTn id="1" dur="indefinite" restart="never" nodeType="tmRoot"/>
+      </p:par>
+    </p:tnLst>
+  </p:timing>
 </p:sld>
 </file>
 

</xml_diff>